<commit_message>
3rd slide made by Shuvayan
3rd slide made by Shuvayan
</commit_message>
<xml_diff>
--- a/Offline/BusinessManagement/Teach_Tech@anodiam/IT/CourseMaterials/Java/001JavaIntroduction.pptx
+++ b/Offline/BusinessManagement/Teach_Tech@anodiam/IT/CourseMaterials/Java/001JavaIntroduction.pptx
@@ -7,6 +7,7 @@
   <p:sldIdLst>
     <p:sldId id="256" r:id="rId2"/>
     <p:sldId id="257" r:id="rId3"/>
+    <p:sldId id="258" r:id="rId4"/>
   </p:sldIdLst>
   <p:sldSz cx="12192000" cy="6858000"/>
   <p:notesSz cx="6858000" cy="9144000"/>
@@ -135,7 +136,7 @@
           <p:cNvPr id="2" name="Title 1">
             <a:extLst>
               <a:ext uri="{FF2B5EF4-FFF2-40B4-BE49-F238E27FC236}">
-                <a16:creationId xmlns:a16="http://schemas.microsoft.com/office/drawing/2014/main" xmlns="" id="{2251324A-7793-49BC-A60F-907DAB9D7446}"/>
+                <a16:creationId xmlns:a16="http://schemas.microsoft.com/office/drawing/2014/main" id="{2251324A-7793-49BC-A60F-907DAB9D7446}"/>
               </a:ext>
             </a:extLst>
           </p:cNvPr>
@@ -173,7 +174,7 @@
           <p:cNvPr id="3" name="Subtitle 2">
             <a:extLst>
               <a:ext uri="{FF2B5EF4-FFF2-40B4-BE49-F238E27FC236}">
-                <a16:creationId xmlns:a16="http://schemas.microsoft.com/office/drawing/2014/main" xmlns="" id="{9DEE48AC-12CA-42E9-8869-A10BCD0F4D8C}"/>
+                <a16:creationId xmlns:a16="http://schemas.microsoft.com/office/drawing/2014/main" id="{9DEE48AC-12CA-42E9-8869-A10BCD0F4D8C}"/>
               </a:ext>
             </a:extLst>
           </p:cNvPr>
@@ -244,7 +245,7 @@
           <p:cNvPr id="4" name="Date Placeholder 3">
             <a:extLst>
               <a:ext uri="{FF2B5EF4-FFF2-40B4-BE49-F238E27FC236}">
-                <a16:creationId xmlns:a16="http://schemas.microsoft.com/office/drawing/2014/main" xmlns="" id="{B02D20DE-83CF-404F-81ED-E48568DD825A}"/>
+                <a16:creationId xmlns:a16="http://schemas.microsoft.com/office/drawing/2014/main" id="{B02D20DE-83CF-404F-81ED-E48568DD825A}"/>
               </a:ext>
             </a:extLst>
           </p:cNvPr>
@@ -262,7 +263,7 @@
           <a:p>
             <a:fld id="{C169E291-5783-4E82-882C-941255731AFB}" type="datetimeFigureOut">
               <a:rPr lang="en-AU" smtClean="0"/>
-              <a:t>5/07/2023</a:t>
+              <a:t>21/07/2023</a:t>
             </a:fld>
             <a:endParaRPr lang="en-AU"/>
           </a:p>
@@ -273,7 +274,7 @@
           <p:cNvPr id="5" name="Footer Placeholder 4">
             <a:extLst>
               <a:ext uri="{FF2B5EF4-FFF2-40B4-BE49-F238E27FC236}">
-                <a16:creationId xmlns:a16="http://schemas.microsoft.com/office/drawing/2014/main" xmlns="" id="{D84826B7-249B-408C-AA0B-4CD6D49B417D}"/>
+                <a16:creationId xmlns:a16="http://schemas.microsoft.com/office/drawing/2014/main" id="{D84826B7-249B-408C-AA0B-4CD6D49B417D}"/>
               </a:ext>
             </a:extLst>
           </p:cNvPr>
@@ -298,7 +299,7 @@
           <p:cNvPr id="6" name="Slide Number Placeholder 5">
             <a:extLst>
               <a:ext uri="{FF2B5EF4-FFF2-40B4-BE49-F238E27FC236}">
-                <a16:creationId xmlns:a16="http://schemas.microsoft.com/office/drawing/2014/main" xmlns="" id="{EF598B24-1B64-4B74-9D5F-5488AA650AEF}"/>
+                <a16:creationId xmlns:a16="http://schemas.microsoft.com/office/drawing/2014/main" id="{EF598B24-1B64-4B74-9D5F-5488AA650AEF}"/>
               </a:ext>
             </a:extLst>
           </p:cNvPr>
@@ -357,7 +358,7 @@
           <p:cNvPr id="2" name="Title 1">
             <a:extLst>
               <a:ext uri="{FF2B5EF4-FFF2-40B4-BE49-F238E27FC236}">
-                <a16:creationId xmlns:a16="http://schemas.microsoft.com/office/drawing/2014/main" xmlns="" id="{6F54CF0F-3175-40F1-AE72-E034E32AF576}"/>
+                <a16:creationId xmlns:a16="http://schemas.microsoft.com/office/drawing/2014/main" id="{6F54CF0F-3175-40F1-AE72-E034E32AF576}"/>
               </a:ext>
             </a:extLst>
           </p:cNvPr>
@@ -386,7 +387,7 @@
           <p:cNvPr id="3" name="Vertical Text Placeholder 2">
             <a:extLst>
               <a:ext uri="{FF2B5EF4-FFF2-40B4-BE49-F238E27FC236}">
-                <a16:creationId xmlns:a16="http://schemas.microsoft.com/office/drawing/2014/main" xmlns="" id="{FF1598EF-AB00-479D-8FF6-2AA7F601474A}"/>
+                <a16:creationId xmlns:a16="http://schemas.microsoft.com/office/drawing/2014/main" id="{FF1598EF-AB00-479D-8FF6-2AA7F601474A}"/>
               </a:ext>
             </a:extLst>
           </p:cNvPr>
@@ -444,7 +445,7 @@
           <p:cNvPr id="4" name="Date Placeholder 3">
             <a:extLst>
               <a:ext uri="{FF2B5EF4-FFF2-40B4-BE49-F238E27FC236}">
-                <a16:creationId xmlns:a16="http://schemas.microsoft.com/office/drawing/2014/main" xmlns="" id="{975B65D2-8D9E-4B38-B502-AE5D52AA38E0}"/>
+                <a16:creationId xmlns:a16="http://schemas.microsoft.com/office/drawing/2014/main" id="{975B65D2-8D9E-4B38-B502-AE5D52AA38E0}"/>
               </a:ext>
             </a:extLst>
           </p:cNvPr>
@@ -462,7 +463,7 @@
           <a:p>
             <a:fld id="{C169E291-5783-4E82-882C-941255731AFB}" type="datetimeFigureOut">
               <a:rPr lang="en-AU" smtClean="0"/>
-              <a:t>5/07/2023</a:t>
+              <a:t>21/07/2023</a:t>
             </a:fld>
             <a:endParaRPr lang="en-AU"/>
           </a:p>
@@ -473,7 +474,7 @@
           <p:cNvPr id="5" name="Footer Placeholder 4">
             <a:extLst>
               <a:ext uri="{FF2B5EF4-FFF2-40B4-BE49-F238E27FC236}">
-                <a16:creationId xmlns:a16="http://schemas.microsoft.com/office/drawing/2014/main" xmlns="" id="{0B4EEEE1-3FB8-482D-8967-5FE97A4A1844}"/>
+                <a16:creationId xmlns:a16="http://schemas.microsoft.com/office/drawing/2014/main" id="{0B4EEEE1-3FB8-482D-8967-5FE97A4A1844}"/>
               </a:ext>
             </a:extLst>
           </p:cNvPr>
@@ -498,7 +499,7 @@
           <p:cNvPr id="6" name="Slide Number Placeholder 5">
             <a:extLst>
               <a:ext uri="{FF2B5EF4-FFF2-40B4-BE49-F238E27FC236}">
-                <a16:creationId xmlns:a16="http://schemas.microsoft.com/office/drawing/2014/main" xmlns="" id="{EE364306-0952-48EC-944D-1266833105B2}"/>
+                <a16:creationId xmlns:a16="http://schemas.microsoft.com/office/drawing/2014/main" id="{EE364306-0952-48EC-944D-1266833105B2}"/>
               </a:ext>
             </a:extLst>
           </p:cNvPr>
@@ -557,7 +558,7 @@
           <p:cNvPr id="2" name="Vertical Title 1">
             <a:extLst>
               <a:ext uri="{FF2B5EF4-FFF2-40B4-BE49-F238E27FC236}">
-                <a16:creationId xmlns:a16="http://schemas.microsoft.com/office/drawing/2014/main" xmlns="" id="{48F6444D-5AC3-4827-9F63-AD9B048FBA64}"/>
+                <a16:creationId xmlns:a16="http://schemas.microsoft.com/office/drawing/2014/main" id="{48F6444D-5AC3-4827-9F63-AD9B048FBA64}"/>
               </a:ext>
             </a:extLst>
           </p:cNvPr>
@@ -591,7 +592,7 @@
           <p:cNvPr id="3" name="Vertical Text Placeholder 2">
             <a:extLst>
               <a:ext uri="{FF2B5EF4-FFF2-40B4-BE49-F238E27FC236}">
-                <a16:creationId xmlns:a16="http://schemas.microsoft.com/office/drawing/2014/main" xmlns="" id="{706FC9C0-AF10-4FC0-B845-F3EEF5670DFF}"/>
+                <a16:creationId xmlns:a16="http://schemas.microsoft.com/office/drawing/2014/main" id="{706FC9C0-AF10-4FC0-B845-F3EEF5670DFF}"/>
               </a:ext>
             </a:extLst>
           </p:cNvPr>
@@ -654,7 +655,7 @@
           <p:cNvPr id="4" name="Date Placeholder 3">
             <a:extLst>
               <a:ext uri="{FF2B5EF4-FFF2-40B4-BE49-F238E27FC236}">
-                <a16:creationId xmlns:a16="http://schemas.microsoft.com/office/drawing/2014/main" xmlns="" id="{184C5877-6C96-4CC4-AACD-AF2B0065CEEE}"/>
+                <a16:creationId xmlns:a16="http://schemas.microsoft.com/office/drawing/2014/main" id="{184C5877-6C96-4CC4-AACD-AF2B0065CEEE}"/>
               </a:ext>
             </a:extLst>
           </p:cNvPr>
@@ -672,7 +673,7 @@
           <a:p>
             <a:fld id="{C169E291-5783-4E82-882C-941255731AFB}" type="datetimeFigureOut">
               <a:rPr lang="en-AU" smtClean="0"/>
-              <a:t>5/07/2023</a:t>
+              <a:t>21/07/2023</a:t>
             </a:fld>
             <a:endParaRPr lang="en-AU"/>
           </a:p>
@@ -683,7 +684,7 @@
           <p:cNvPr id="5" name="Footer Placeholder 4">
             <a:extLst>
               <a:ext uri="{FF2B5EF4-FFF2-40B4-BE49-F238E27FC236}">
-                <a16:creationId xmlns:a16="http://schemas.microsoft.com/office/drawing/2014/main" xmlns="" id="{6EADBF9D-6B78-4384-8D6B-3E85708D0432}"/>
+                <a16:creationId xmlns:a16="http://schemas.microsoft.com/office/drawing/2014/main" id="{6EADBF9D-6B78-4384-8D6B-3E85708D0432}"/>
               </a:ext>
             </a:extLst>
           </p:cNvPr>
@@ -708,7 +709,7 @@
           <p:cNvPr id="6" name="Slide Number Placeholder 5">
             <a:extLst>
               <a:ext uri="{FF2B5EF4-FFF2-40B4-BE49-F238E27FC236}">
-                <a16:creationId xmlns:a16="http://schemas.microsoft.com/office/drawing/2014/main" xmlns="" id="{CA25186B-3289-49E4-B243-75AC2D6FA611}"/>
+                <a16:creationId xmlns:a16="http://schemas.microsoft.com/office/drawing/2014/main" id="{CA25186B-3289-49E4-B243-75AC2D6FA611}"/>
               </a:ext>
             </a:extLst>
           </p:cNvPr>
@@ -767,7 +768,7 @@
           <p:cNvPr id="2" name="Title 1">
             <a:extLst>
               <a:ext uri="{FF2B5EF4-FFF2-40B4-BE49-F238E27FC236}">
-                <a16:creationId xmlns:a16="http://schemas.microsoft.com/office/drawing/2014/main" xmlns="" id="{B9AA2A59-F4F8-4021-823D-FDA74004FE03}"/>
+                <a16:creationId xmlns:a16="http://schemas.microsoft.com/office/drawing/2014/main" id="{B9AA2A59-F4F8-4021-823D-FDA74004FE03}"/>
               </a:ext>
             </a:extLst>
           </p:cNvPr>
@@ -796,7 +797,7 @@
           <p:cNvPr id="3" name="Content Placeholder 2">
             <a:extLst>
               <a:ext uri="{FF2B5EF4-FFF2-40B4-BE49-F238E27FC236}">
-                <a16:creationId xmlns:a16="http://schemas.microsoft.com/office/drawing/2014/main" xmlns="" id="{B8E167D7-1F7E-47C3-92FB-3BE313EB6AF3}"/>
+                <a16:creationId xmlns:a16="http://schemas.microsoft.com/office/drawing/2014/main" id="{B8E167D7-1F7E-47C3-92FB-3BE313EB6AF3}"/>
               </a:ext>
             </a:extLst>
           </p:cNvPr>
@@ -854,7 +855,7 @@
           <p:cNvPr id="4" name="Date Placeholder 3">
             <a:extLst>
               <a:ext uri="{FF2B5EF4-FFF2-40B4-BE49-F238E27FC236}">
-                <a16:creationId xmlns:a16="http://schemas.microsoft.com/office/drawing/2014/main" xmlns="" id="{32F0EE72-0C00-41C2-AF7A-AD06D88149F0}"/>
+                <a16:creationId xmlns:a16="http://schemas.microsoft.com/office/drawing/2014/main" id="{32F0EE72-0C00-41C2-AF7A-AD06D88149F0}"/>
               </a:ext>
             </a:extLst>
           </p:cNvPr>
@@ -872,7 +873,7 @@
           <a:p>
             <a:fld id="{C169E291-5783-4E82-882C-941255731AFB}" type="datetimeFigureOut">
               <a:rPr lang="en-AU" smtClean="0"/>
-              <a:t>5/07/2023</a:t>
+              <a:t>21/07/2023</a:t>
             </a:fld>
             <a:endParaRPr lang="en-AU"/>
           </a:p>
@@ -883,7 +884,7 @@
           <p:cNvPr id="5" name="Footer Placeholder 4">
             <a:extLst>
               <a:ext uri="{FF2B5EF4-FFF2-40B4-BE49-F238E27FC236}">
-                <a16:creationId xmlns:a16="http://schemas.microsoft.com/office/drawing/2014/main" xmlns="" id="{924C1906-8712-4D14-A84C-268115122FF7}"/>
+                <a16:creationId xmlns:a16="http://schemas.microsoft.com/office/drawing/2014/main" id="{924C1906-8712-4D14-A84C-268115122FF7}"/>
               </a:ext>
             </a:extLst>
           </p:cNvPr>
@@ -908,7 +909,7 @@
           <p:cNvPr id="6" name="Slide Number Placeholder 5">
             <a:extLst>
               <a:ext uri="{FF2B5EF4-FFF2-40B4-BE49-F238E27FC236}">
-                <a16:creationId xmlns:a16="http://schemas.microsoft.com/office/drawing/2014/main" xmlns="" id="{EF581B9F-4520-4894-8887-B34D510AD3C0}"/>
+                <a16:creationId xmlns:a16="http://schemas.microsoft.com/office/drawing/2014/main" id="{EF581B9F-4520-4894-8887-B34D510AD3C0}"/>
               </a:ext>
             </a:extLst>
           </p:cNvPr>
@@ -967,7 +968,7 @@
           <p:cNvPr id="2" name="Title 1">
             <a:extLst>
               <a:ext uri="{FF2B5EF4-FFF2-40B4-BE49-F238E27FC236}">
-                <a16:creationId xmlns:a16="http://schemas.microsoft.com/office/drawing/2014/main" xmlns="" id="{BDC0C9F1-C5C8-46C6-B502-24B9097BC6FA}"/>
+                <a16:creationId xmlns:a16="http://schemas.microsoft.com/office/drawing/2014/main" id="{BDC0C9F1-C5C8-46C6-B502-24B9097BC6FA}"/>
               </a:ext>
             </a:extLst>
           </p:cNvPr>
@@ -1005,7 +1006,7 @@
           <p:cNvPr id="3" name="Text Placeholder 2">
             <a:extLst>
               <a:ext uri="{FF2B5EF4-FFF2-40B4-BE49-F238E27FC236}">
-                <a16:creationId xmlns:a16="http://schemas.microsoft.com/office/drawing/2014/main" xmlns="" id="{82DA8974-E100-44E6-A8C0-F9509740D574}"/>
+                <a16:creationId xmlns:a16="http://schemas.microsoft.com/office/drawing/2014/main" id="{82DA8974-E100-44E6-A8C0-F9509740D574}"/>
               </a:ext>
             </a:extLst>
           </p:cNvPr>
@@ -1130,7 +1131,7 @@
           <p:cNvPr id="4" name="Date Placeholder 3">
             <a:extLst>
               <a:ext uri="{FF2B5EF4-FFF2-40B4-BE49-F238E27FC236}">
-                <a16:creationId xmlns:a16="http://schemas.microsoft.com/office/drawing/2014/main" xmlns="" id="{F27FECF1-A8EC-4B92-9B45-2AF94967F4B4}"/>
+                <a16:creationId xmlns:a16="http://schemas.microsoft.com/office/drawing/2014/main" id="{F27FECF1-A8EC-4B92-9B45-2AF94967F4B4}"/>
               </a:ext>
             </a:extLst>
           </p:cNvPr>
@@ -1148,7 +1149,7 @@
           <a:p>
             <a:fld id="{C169E291-5783-4E82-882C-941255731AFB}" type="datetimeFigureOut">
               <a:rPr lang="en-AU" smtClean="0"/>
-              <a:t>5/07/2023</a:t>
+              <a:t>21/07/2023</a:t>
             </a:fld>
             <a:endParaRPr lang="en-AU"/>
           </a:p>
@@ -1159,7 +1160,7 @@
           <p:cNvPr id="5" name="Footer Placeholder 4">
             <a:extLst>
               <a:ext uri="{FF2B5EF4-FFF2-40B4-BE49-F238E27FC236}">
-                <a16:creationId xmlns:a16="http://schemas.microsoft.com/office/drawing/2014/main" xmlns="" id="{D5BAC015-3655-4F3B-9A27-9F712DAE8E41}"/>
+                <a16:creationId xmlns:a16="http://schemas.microsoft.com/office/drawing/2014/main" id="{D5BAC015-3655-4F3B-9A27-9F712DAE8E41}"/>
               </a:ext>
             </a:extLst>
           </p:cNvPr>
@@ -1184,7 +1185,7 @@
           <p:cNvPr id="6" name="Slide Number Placeholder 5">
             <a:extLst>
               <a:ext uri="{FF2B5EF4-FFF2-40B4-BE49-F238E27FC236}">
-                <a16:creationId xmlns:a16="http://schemas.microsoft.com/office/drawing/2014/main" xmlns="" id="{B7DE6F13-3141-4F8C-B042-5DA86E125882}"/>
+                <a16:creationId xmlns:a16="http://schemas.microsoft.com/office/drawing/2014/main" id="{B7DE6F13-3141-4F8C-B042-5DA86E125882}"/>
               </a:ext>
             </a:extLst>
           </p:cNvPr>
@@ -1243,7 +1244,7 @@
           <p:cNvPr id="2" name="Title 1">
             <a:extLst>
               <a:ext uri="{FF2B5EF4-FFF2-40B4-BE49-F238E27FC236}">
-                <a16:creationId xmlns:a16="http://schemas.microsoft.com/office/drawing/2014/main" xmlns="" id="{593CA6F9-6A5D-45B9-A54E-3D8945BE99BD}"/>
+                <a16:creationId xmlns:a16="http://schemas.microsoft.com/office/drawing/2014/main" id="{593CA6F9-6A5D-45B9-A54E-3D8945BE99BD}"/>
               </a:ext>
             </a:extLst>
           </p:cNvPr>
@@ -1272,7 +1273,7 @@
           <p:cNvPr id="3" name="Content Placeholder 2">
             <a:extLst>
               <a:ext uri="{FF2B5EF4-FFF2-40B4-BE49-F238E27FC236}">
-                <a16:creationId xmlns:a16="http://schemas.microsoft.com/office/drawing/2014/main" xmlns="" id="{0F0845E6-9278-4292-8952-7646B555A30F}"/>
+                <a16:creationId xmlns:a16="http://schemas.microsoft.com/office/drawing/2014/main" id="{0F0845E6-9278-4292-8952-7646B555A30F}"/>
               </a:ext>
             </a:extLst>
           </p:cNvPr>
@@ -1335,7 +1336,7 @@
           <p:cNvPr id="4" name="Content Placeholder 3">
             <a:extLst>
               <a:ext uri="{FF2B5EF4-FFF2-40B4-BE49-F238E27FC236}">
-                <a16:creationId xmlns:a16="http://schemas.microsoft.com/office/drawing/2014/main" xmlns="" id="{32AF459D-8978-40B3-82DF-2BC45042F974}"/>
+                <a16:creationId xmlns:a16="http://schemas.microsoft.com/office/drawing/2014/main" id="{32AF459D-8978-40B3-82DF-2BC45042F974}"/>
               </a:ext>
             </a:extLst>
           </p:cNvPr>
@@ -1398,7 +1399,7 @@
           <p:cNvPr id="5" name="Date Placeholder 4">
             <a:extLst>
               <a:ext uri="{FF2B5EF4-FFF2-40B4-BE49-F238E27FC236}">
-                <a16:creationId xmlns:a16="http://schemas.microsoft.com/office/drawing/2014/main" xmlns="" id="{3FA20EC9-1928-4FCF-816C-1784D8A07D8B}"/>
+                <a16:creationId xmlns:a16="http://schemas.microsoft.com/office/drawing/2014/main" id="{3FA20EC9-1928-4FCF-816C-1784D8A07D8B}"/>
               </a:ext>
             </a:extLst>
           </p:cNvPr>
@@ -1416,7 +1417,7 @@
           <a:p>
             <a:fld id="{C169E291-5783-4E82-882C-941255731AFB}" type="datetimeFigureOut">
               <a:rPr lang="en-AU" smtClean="0"/>
-              <a:t>5/07/2023</a:t>
+              <a:t>21/07/2023</a:t>
             </a:fld>
             <a:endParaRPr lang="en-AU"/>
           </a:p>
@@ -1427,7 +1428,7 @@
           <p:cNvPr id="6" name="Footer Placeholder 5">
             <a:extLst>
               <a:ext uri="{FF2B5EF4-FFF2-40B4-BE49-F238E27FC236}">
-                <a16:creationId xmlns:a16="http://schemas.microsoft.com/office/drawing/2014/main" xmlns="" id="{A7AC04CB-F699-445B-9DB1-1AA6365BC2A5}"/>
+                <a16:creationId xmlns:a16="http://schemas.microsoft.com/office/drawing/2014/main" id="{A7AC04CB-F699-445B-9DB1-1AA6365BC2A5}"/>
               </a:ext>
             </a:extLst>
           </p:cNvPr>
@@ -1452,7 +1453,7 @@
           <p:cNvPr id="7" name="Slide Number Placeholder 6">
             <a:extLst>
               <a:ext uri="{FF2B5EF4-FFF2-40B4-BE49-F238E27FC236}">
-                <a16:creationId xmlns:a16="http://schemas.microsoft.com/office/drawing/2014/main" xmlns="" id="{59152100-94B0-45A7-9D20-6E8A57DBB820}"/>
+                <a16:creationId xmlns:a16="http://schemas.microsoft.com/office/drawing/2014/main" id="{59152100-94B0-45A7-9D20-6E8A57DBB820}"/>
               </a:ext>
             </a:extLst>
           </p:cNvPr>
@@ -1511,7 +1512,7 @@
           <p:cNvPr id="2" name="Title 1">
             <a:extLst>
               <a:ext uri="{FF2B5EF4-FFF2-40B4-BE49-F238E27FC236}">
-                <a16:creationId xmlns:a16="http://schemas.microsoft.com/office/drawing/2014/main" xmlns="" id="{25832D18-85BE-4274-BF2D-978175A05C83}"/>
+                <a16:creationId xmlns:a16="http://schemas.microsoft.com/office/drawing/2014/main" id="{25832D18-85BE-4274-BF2D-978175A05C83}"/>
               </a:ext>
             </a:extLst>
           </p:cNvPr>
@@ -1545,7 +1546,7 @@
           <p:cNvPr id="3" name="Text Placeholder 2">
             <a:extLst>
               <a:ext uri="{FF2B5EF4-FFF2-40B4-BE49-F238E27FC236}">
-                <a16:creationId xmlns:a16="http://schemas.microsoft.com/office/drawing/2014/main" xmlns="" id="{8CE3A622-65BE-4BEF-9F24-5D01DBC3594A}"/>
+                <a16:creationId xmlns:a16="http://schemas.microsoft.com/office/drawing/2014/main" id="{8CE3A622-65BE-4BEF-9F24-5D01DBC3594A}"/>
               </a:ext>
             </a:extLst>
           </p:cNvPr>
@@ -1616,7 +1617,7 @@
           <p:cNvPr id="4" name="Content Placeholder 3">
             <a:extLst>
               <a:ext uri="{FF2B5EF4-FFF2-40B4-BE49-F238E27FC236}">
-                <a16:creationId xmlns:a16="http://schemas.microsoft.com/office/drawing/2014/main" xmlns="" id="{0B0BE855-7F6A-49FD-941C-F15BFDD10ECB}"/>
+                <a16:creationId xmlns:a16="http://schemas.microsoft.com/office/drawing/2014/main" id="{0B0BE855-7F6A-49FD-941C-F15BFDD10ECB}"/>
               </a:ext>
             </a:extLst>
           </p:cNvPr>
@@ -1679,7 +1680,7 @@
           <p:cNvPr id="5" name="Text Placeholder 4">
             <a:extLst>
               <a:ext uri="{FF2B5EF4-FFF2-40B4-BE49-F238E27FC236}">
-                <a16:creationId xmlns:a16="http://schemas.microsoft.com/office/drawing/2014/main" xmlns="" id="{DC722622-3962-4E7A-B4CC-F417CA047599}"/>
+                <a16:creationId xmlns:a16="http://schemas.microsoft.com/office/drawing/2014/main" id="{DC722622-3962-4E7A-B4CC-F417CA047599}"/>
               </a:ext>
             </a:extLst>
           </p:cNvPr>
@@ -1750,7 +1751,7 @@
           <p:cNvPr id="6" name="Content Placeholder 5">
             <a:extLst>
               <a:ext uri="{FF2B5EF4-FFF2-40B4-BE49-F238E27FC236}">
-                <a16:creationId xmlns:a16="http://schemas.microsoft.com/office/drawing/2014/main" xmlns="" id="{D2A0CA05-FAC2-4CBB-85E6-FCBD3A716092}"/>
+                <a16:creationId xmlns:a16="http://schemas.microsoft.com/office/drawing/2014/main" id="{D2A0CA05-FAC2-4CBB-85E6-FCBD3A716092}"/>
               </a:ext>
             </a:extLst>
           </p:cNvPr>
@@ -1813,7 +1814,7 @@
           <p:cNvPr id="7" name="Date Placeholder 6">
             <a:extLst>
               <a:ext uri="{FF2B5EF4-FFF2-40B4-BE49-F238E27FC236}">
-                <a16:creationId xmlns:a16="http://schemas.microsoft.com/office/drawing/2014/main" xmlns="" id="{6AE86014-24BD-4238-9160-93F6E8C26C17}"/>
+                <a16:creationId xmlns:a16="http://schemas.microsoft.com/office/drawing/2014/main" id="{6AE86014-24BD-4238-9160-93F6E8C26C17}"/>
               </a:ext>
             </a:extLst>
           </p:cNvPr>
@@ -1831,7 +1832,7 @@
           <a:p>
             <a:fld id="{C169E291-5783-4E82-882C-941255731AFB}" type="datetimeFigureOut">
               <a:rPr lang="en-AU" smtClean="0"/>
-              <a:t>5/07/2023</a:t>
+              <a:t>21/07/2023</a:t>
             </a:fld>
             <a:endParaRPr lang="en-AU"/>
           </a:p>
@@ -1842,7 +1843,7 @@
           <p:cNvPr id="8" name="Footer Placeholder 7">
             <a:extLst>
               <a:ext uri="{FF2B5EF4-FFF2-40B4-BE49-F238E27FC236}">
-                <a16:creationId xmlns:a16="http://schemas.microsoft.com/office/drawing/2014/main" xmlns="" id="{217274AB-B044-499F-A514-F14D3C3BA2A3}"/>
+                <a16:creationId xmlns:a16="http://schemas.microsoft.com/office/drawing/2014/main" id="{217274AB-B044-499F-A514-F14D3C3BA2A3}"/>
               </a:ext>
             </a:extLst>
           </p:cNvPr>
@@ -1867,7 +1868,7 @@
           <p:cNvPr id="9" name="Slide Number Placeholder 8">
             <a:extLst>
               <a:ext uri="{FF2B5EF4-FFF2-40B4-BE49-F238E27FC236}">
-                <a16:creationId xmlns:a16="http://schemas.microsoft.com/office/drawing/2014/main" xmlns="" id="{59AC322A-D958-44CF-A5BE-5BB074093CFC}"/>
+                <a16:creationId xmlns:a16="http://schemas.microsoft.com/office/drawing/2014/main" id="{59AC322A-D958-44CF-A5BE-5BB074093CFC}"/>
               </a:ext>
             </a:extLst>
           </p:cNvPr>
@@ -1926,7 +1927,7 @@
           <p:cNvPr id="2" name="Title 1">
             <a:extLst>
               <a:ext uri="{FF2B5EF4-FFF2-40B4-BE49-F238E27FC236}">
-                <a16:creationId xmlns:a16="http://schemas.microsoft.com/office/drawing/2014/main" xmlns="" id="{F797BBF9-E6CF-42BA-9CB5-CFA6AF23D584}"/>
+                <a16:creationId xmlns:a16="http://schemas.microsoft.com/office/drawing/2014/main" id="{F797BBF9-E6CF-42BA-9CB5-CFA6AF23D584}"/>
               </a:ext>
             </a:extLst>
           </p:cNvPr>
@@ -1955,7 +1956,7 @@
           <p:cNvPr id="3" name="Date Placeholder 2">
             <a:extLst>
               <a:ext uri="{FF2B5EF4-FFF2-40B4-BE49-F238E27FC236}">
-                <a16:creationId xmlns:a16="http://schemas.microsoft.com/office/drawing/2014/main" xmlns="" id="{ABF488AA-98C4-4CBE-BF0C-28394E76A784}"/>
+                <a16:creationId xmlns:a16="http://schemas.microsoft.com/office/drawing/2014/main" id="{ABF488AA-98C4-4CBE-BF0C-28394E76A784}"/>
               </a:ext>
             </a:extLst>
           </p:cNvPr>
@@ -1973,7 +1974,7 @@
           <a:p>
             <a:fld id="{C169E291-5783-4E82-882C-941255731AFB}" type="datetimeFigureOut">
               <a:rPr lang="en-AU" smtClean="0"/>
-              <a:t>5/07/2023</a:t>
+              <a:t>21/07/2023</a:t>
             </a:fld>
             <a:endParaRPr lang="en-AU"/>
           </a:p>
@@ -1984,7 +1985,7 @@
           <p:cNvPr id="4" name="Footer Placeholder 3">
             <a:extLst>
               <a:ext uri="{FF2B5EF4-FFF2-40B4-BE49-F238E27FC236}">
-                <a16:creationId xmlns:a16="http://schemas.microsoft.com/office/drawing/2014/main" xmlns="" id="{C954A7E5-466B-49D4-8D17-D47A437A31CA}"/>
+                <a16:creationId xmlns:a16="http://schemas.microsoft.com/office/drawing/2014/main" id="{C954A7E5-466B-49D4-8D17-D47A437A31CA}"/>
               </a:ext>
             </a:extLst>
           </p:cNvPr>
@@ -2009,7 +2010,7 @@
           <p:cNvPr id="5" name="Slide Number Placeholder 4">
             <a:extLst>
               <a:ext uri="{FF2B5EF4-FFF2-40B4-BE49-F238E27FC236}">
-                <a16:creationId xmlns:a16="http://schemas.microsoft.com/office/drawing/2014/main" xmlns="" id="{6AA1A73C-B7E5-4826-93A5-1BAAC4B51647}"/>
+                <a16:creationId xmlns:a16="http://schemas.microsoft.com/office/drawing/2014/main" id="{6AA1A73C-B7E5-4826-93A5-1BAAC4B51647}"/>
               </a:ext>
             </a:extLst>
           </p:cNvPr>
@@ -2068,7 +2069,7 @@
           <p:cNvPr id="2" name="Date Placeholder 1">
             <a:extLst>
               <a:ext uri="{FF2B5EF4-FFF2-40B4-BE49-F238E27FC236}">
-                <a16:creationId xmlns:a16="http://schemas.microsoft.com/office/drawing/2014/main" xmlns="" id="{27A8E304-60E1-4D2D-B83B-3F876C664749}"/>
+                <a16:creationId xmlns:a16="http://schemas.microsoft.com/office/drawing/2014/main" id="{27A8E304-60E1-4D2D-B83B-3F876C664749}"/>
               </a:ext>
             </a:extLst>
           </p:cNvPr>
@@ -2086,7 +2087,7 @@
           <a:p>
             <a:fld id="{C169E291-5783-4E82-882C-941255731AFB}" type="datetimeFigureOut">
               <a:rPr lang="en-AU" smtClean="0"/>
-              <a:t>5/07/2023</a:t>
+              <a:t>21/07/2023</a:t>
             </a:fld>
             <a:endParaRPr lang="en-AU"/>
           </a:p>
@@ -2097,7 +2098,7 @@
           <p:cNvPr id="3" name="Footer Placeholder 2">
             <a:extLst>
               <a:ext uri="{FF2B5EF4-FFF2-40B4-BE49-F238E27FC236}">
-                <a16:creationId xmlns:a16="http://schemas.microsoft.com/office/drawing/2014/main" xmlns="" id="{B79D68BA-6DC5-4637-9116-4FB0CB84B327}"/>
+                <a16:creationId xmlns:a16="http://schemas.microsoft.com/office/drawing/2014/main" id="{B79D68BA-6DC5-4637-9116-4FB0CB84B327}"/>
               </a:ext>
             </a:extLst>
           </p:cNvPr>
@@ -2122,7 +2123,7 @@
           <p:cNvPr id="4" name="Slide Number Placeholder 3">
             <a:extLst>
               <a:ext uri="{FF2B5EF4-FFF2-40B4-BE49-F238E27FC236}">
-                <a16:creationId xmlns:a16="http://schemas.microsoft.com/office/drawing/2014/main" xmlns="" id="{237DA611-D6AC-480A-B80A-E300A0AFE5F7}"/>
+                <a16:creationId xmlns:a16="http://schemas.microsoft.com/office/drawing/2014/main" id="{237DA611-D6AC-480A-B80A-E300A0AFE5F7}"/>
               </a:ext>
             </a:extLst>
           </p:cNvPr>
@@ -2181,7 +2182,7 @@
           <p:cNvPr id="2" name="Title 1">
             <a:extLst>
               <a:ext uri="{FF2B5EF4-FFF2-40B4-BE49-F238E27FC236}">
-                <a16:creationId xmlns:a16="http://schemas.microsoft.com/office/drawing/2014/main" xmlns="" id="{5D2CD4D7-D782-4C26-B82A-442A2230C6CE}"/>
+                <a16:creationId xmlns:a16="http://schemas.microsoft.com/office/drawing/2014/main" id="{5D2CD4D7-D782-4C26-B82A-442A2230C6CE}"/>
               </a:ext>
             </a:extLst>
           </p:cNvPr>
@@ -2219,7 +2220,7 @@
           <p:cNvPr id="3" name="Content Placeholder 2">
             <a:extLst>
               <a:ext uri="{FF2B5EF4-FFF2-40B4-BE49-F238E27FC236}">
-                <a16:creationId xmlns:a16="http://schemas.microsoft.com/office/drawing/2014/main" xmlns="" id="{BAF63710-26BB-4D2F-9417-7F515565CFC4}"/>
+                <a16:creationId xmlns:a16="http://schemas.microsoft.com/office/drawing/2014/main" id="{BAF63710-26BB-4D2F-9417-7F515565CFC4}"/>
               </a:ext>
             </a:extLst>
           </p:cNvPr>
@@ -2310,7 +2311,7 @@
           <p:cNvPr id="4" name="Text Placeholder 3">
             <a:extLst>
               <a:ext uri="{FF2B5EF4-FFF2-40B4-BE49-F238E27FC236}">
-                <a16:creationId xmlns:a16="http://schemas.microsoft.com/office/drawing/2014/main" xmlns="" id="{30E2E2A0-A33A-473F-A45E-630917915E9E}"/>
+                <a16:creationId xmlns:a16="http://schemas.microsoft.com/office/drawing/2014/main" id="{30E2E2A0-A33A-473F-A45E-630917915E9E}"/>
               </a:ext>
             </a:extLst>
           </p:cNvPr>
@@ -2381,7 +2382,7 @@
           <p:cNvPr id="5" name="Date Placeholder 4">
             <a:extLst>
               <a:ext uri="{FF2B5EF4-FFF2-40B4-BE49-F238E27FC236}">
-                <a16:creationId xmlns:a16="http://schemas.microsoft.com/office/drawing/2014/main" xmlns="" id="{808F92C6-AD52-4E80-8D24-763B32DF24C4}"/>
+                <a16:creationId xmlns:a16="http://schemas.microsoft.com/office/drawing/2014/main" id="{808F92C6-AD52-4E80-8D24-763B32DF24C4}"/>
               </a:ext>
             </a:extLst>
           </p:cNvPr>
@@ -2399,7 +2400,7 @@
           <a:p>
             <a:fld id="{C169E291-5783-4E82-882C-941255731AFB}" type="datetimeFigureOut">
               <a:rPr lang="en-AU" smtClean="0"/>
-              <a:t>5/07/2023</a:t>
+              <a:t>21/07/2023</a:t>
             </a:fld>
             <a:endParaRPr lang="en-AU"/>
           </a:p>
@@ -2410,7 +2411,7 @@
           <p:cNvPr id="6" name="Footer Placeholder 5">
             <a:extLst>
               <a:ext uri="{FF2B5EF4-FFF2-40B4-BE49-F238E27FC236}">
-                <a16:creationId xmlns:a16="http://schemas.microsoft.com/office/drawing/2014/main" xmlns="" id="{53AB23AC-8E33-4F39-BA10-240404658A71}"/>
+                <a16:creationId xmlns:a16="http://schemas.microsoft.com/office/drawing/2014/main" id="{53AB23AC-8E33-4F39-BA10-240404658A71}"/>
               </a:ext>
             </a:extLst>
           </p:cNvPr>
@@ -2435,7 +2436,7 @@
           <p:cNvPr id="7" name="Slide Number Placeholder 6">
             <a:extLst>
               <a:ext uri="{FF2B5EF4-FFF2-40B4-BE49-F238E27FC236}">
-                <a16:creationId xmlns:a16="http://schemas.microsoft.com/office/drawing/2014/main" xmlns="" id="{31ACB03A-40A7-423D-9DF4-4DFE816E4333}"/>
+                <a16:creationId xmlns:a16="http://schemas.microsoft.com/office/drawing/2014/main" id="{31ACB03A-40A7-423D-9DF4-4DFE816E4333}"/>
               </a:ext>
             </a:extLst>
           </p:cNvPr>
@@ -2494,7 +2495,7 @@
           <p:cNvPr id="2" name="Title 1">
             <a:extLst>
               <a:ext uri="{FF2B5EF4-FFF2-40B4-BE49-F238E27FC236}">
-                <a16:creationId xmlns:a16="http://schemas.microsoft.com/office/drawing/2014/main" xmlns="" id="{BE7608F9-F33B-4A6C-95C8-10CB74B79D4C}"/>
+                <a16:creationId xmlns:a16="http://schemas.microsoft.com/office/drawing/2014/main" id="{BE7608F9-F33B-4A6C-95C8-10CB74B79D4C}"/>
               </a:ext>
             </a:extLst>
           </p:cNvPr>
@@ -2532,7 +2533,7 @@
           <p:cNvPr id="3" name="Picture Placeholder 2">
             <a:extLst>
               <a:ext uri="{FF2B5EF4-FFF2-40B4-BE49-F238E27FC236}">
-                <a16:creationId xmlns:a16="http://schemas.microsoft.com/office/drawing/2014/main" xmlns="" id="{F189C68D-5F76-4234-B995-7F1CB010D46D}"/>
+                <a16:creationId xmlns:a16="http://schemas.microsoft.com/office/drawing/2014/main" id="{F189C68D-5F76-4234-B995-7F1CB010D46D}"/>
               </a:ext>
             </a:extLst>
           </p:cNvPr>
@@ -2599,7 +2600,7 @@
           <p:cNvPr id="4" name="Text Placeholder 3">
             <a:extLst>
               <a:ext uri="{FF2B5EF4-FFF2-40B4-BE49-F238E27FC236}">
-                <a16:creationId xmlns:a16="http://schemas.microsoft.com/office/drawing/2014/main" xmlns="" id="{2860FFC7-28A6-44EB-BF35-C93454765A69}"/>
+                <a16:creationId xmlns:a16="http://schemas.microsoft.com/office/drawing/2014/main" id="{2860FFC7-28A6-44EB-BF35-C93454765A69}"/>
               </a:ext>
             </a:extLst>
           </p:cNvPr>
@@ -2670,7 +2671,7 @@
           <p:cNvPr id="5" name="Date Placeholder 4">
             <a:extLst>
               <a:ext uri="{FF2B5EF4-FFF2-40B4-BE49-F238E27FC236}">
-                <a16:creationId xmlns:a16="http://schemas.microsoft.com/office/drawing/2014/main" xmlns="" id="{DBD64114-0430-4E55-8284-387B8769C357}"/>
+                <a16:creationId xmlns:a16="http://schemas.microsoft.com/office/drawing/2014/main" id="{DBD64114-0430-4E55-8284-387B8769C357}"/>
               </a:ext>
             </a:extLst>
           </p:cNvPr>
@@ -2688,7 +2689,7 @@
           <a:p>
             <a:fld id="{C169E291-5783-4E82-882C-941255731AFB}" type="datetimeFigureOut">
               <a:rPr lang="en-AU" smtClean="0"/>
-              <a:t>5/07/2023</a:t>
+              <a:t>21/07/2023</a:t>
             </a:fld>
             <a:endParaRPr lang="en-AU"/>
           </a:p>
@@ -2699,7 +2700,7 @@
           <p:cNvPr id="6" name="Footer Placeholder 5">
             <a:extLst>
               <a:ext uri="{FF2B5EF4-FFF2-40B4-BE49-F238E27FC236}">
-                <a16:creationId xmlns:a16="http://schemas.microsoft.com/office/drawing/2014/main" xmlns="" id="{E89C353A-FE62-4DE1-92CB-617F920E3D03}"/>
+                <a16:creationId xmlns:a16="http://schemas.microsoft.com/office/drawing/2014/main" id="{E89C353A-FE62-4DE1-92CB-617F920E3D03}"/>
               </a:ext>
             </a:extLst>
           </p:cNvPr>
@@ -2724,7 +2725,7 @@
           <p:cNvPr id="7" name="Slide Number Placeholder 6">
             <a:extLst>
               <a:ext uri="{FF2B5EF4-FFF2-40B4-BE49-F238E27FC236}">
-                <a16:creationId xmlns:a16="http://schemas.microsoft.com/office/drawing/2014/main" xmlns="" id="{B532025E-C489-44D4-B722-67586F2AC109}"/>
+                <a16:creationId xmlns:a16="http://schemas.microsoft.com/office/drawing/2014/main" id="{B532025E-C489-44D4-B722-67586F2AC109}"/>
               </a:ext>
             </a:extLst>
           </p:cNvPr>
@@ -2788,7 +2789,7 @@
           <p:cNvPr id="2" name="Title Placeholder 1">
             <a:extLst>
               <a:ext uri="{FF2B5EF4-FFF2-40B4-BE49-F238E27FC236}">
-                <a16:creationId xmlns:a16="http://schemas.microsoft.com/office/drawing/2014/main" xmlns="" id="{0B197B9B-5871-4B81-AD65-F84902AC63C5}"/>
+                <a16:creationId xmlns:a16="http://schemas.microsoft.com/office/drawing/2014/main" id="{0B197B9B-5871-4B81-AD65-F84902AC63C5}"/>
               </a:ext>
             </a:extLst>
           </p:cNvPr>
@@ -2827,7 +2828,7 @@
           <p:cNvPr id="3" name="Text Placeholder 2">
             <a:extLst>
               <a:ext uri="{FF2B5EF4-FFF2-40B4-BE49-F238E27FC236}">
-                <a16:creationId xmlns:a16="http://schemas.microsoft.com/office/drawing/2014/main" xmlns="" id="{3207BEFE-8A0F-48B9-A0AC-F2A4B0A068EF}"/>
+                <a16:creationId xmlns:a16="http://schemas.microsoft.com/office/drawing/2014/main" id="{3207BEFE-8A0F-48B9-A0AC-F2A4B0A068EF}"/>
               </a:ext>
             </a:extLst>
           </p:cNvPr>
@@ -2895,7 +2896,7 @@
           <p:cNvPr id="4" name="Date Placeholder 3">
             <a:extLst>
               <a:ext uri="{FF2B5EF4-FFF2-40B4-BE49-F238E27FC236}">
-                <a16:creationId xmlns:a16="http://schemas.microsoft.com/office/drawing/2014/main" xmlns="" id="{76C13274-96D9-422C-B8DB-6D687919745C}"/>
+                <a16:creationId xmlns:a16="http://schemas.microsoft.com/office/drawing/2014/main" id="{76C13274-96D9-422C-B8DB-6D687919745C}"/>
               </a:ext>
             </a:extLst>
           </p:cNvPr>
@@ -2931,7 +2932,7 @@
           <a:p>
             <a:fld id="{C169E291-5783-4E82-882C-941255731AFB}" type="datetimeFigureOut">
               <a:rPr lang="en-AU" smtClean="0"/>
-              <a:t>5/07/2023</a:t>
+              <a:t>21/07/2023</a:t>
             </a:fld>
             <a:endParaRPr lang="en-AU"/>
           </a:p>
@@ -2942,7 +2943,7 @@
           <p:cNvPr id="5" name="Footer Placeholder 4">
             <a:extLst>
               <a:ext uri="{FF2B5EF4-FFF2-40B4-BE49-F238E27FC236}">
-                <a16:creationId xmlns:a16="http://schemas.microsoft.com/office/drawing/2014/main" xmlns="" id="{B7123C8A-A853-4C2D-97B9-08D88C0A358A}"/>
+                <a16:creationId xmlns:a16="http://schemas.microsoft.com/office/drawing/2014/main" id="{B7123C8A-A853-4C2D-97B9-08D88C0A358A}"/>
               </a:ext>
             </a:extLst>
           </p:cNvPr>
@@ -2985,7 +2986,7 @@
           <p:cNvPr id="6" name="Slide Number Placeholder 5">
             <a:extLst>
               <a:ext uri="{FF2B5EF4-FFF2-40B4-BE49-F238E27FC236}">
-                <a16:creationId xmlns:a16="http://schemas.microsoft.com/office/drawing/2014/main" xmlns="" id="{BBDDD757-1CF8-4FC5-9613-BD71AE10D08D}"/>
+                <a16:creationId xmlns:a16="http://schemas.microsoft.com/office/drawing/2014/main" id="{BBDDD757-1CF8-4FC5-9613-BD71AE10D08D}"/>
               </a:ext>
             </a:extLst>
           </p:cNvPr>
@@ -3353,7 +3354,7 @@
           <p:cNvPr id="38" name="Rectangle 37">
             <a:extLst>
               <a:ext uri="{FF2B5EF4-FFF2-40B4-BE49-F238E27FC236}">
-                <a16:creationId xmlns:a16="http://schemas.microsoft.com/office/drawing/2014/main" xmlns="" id="{0AE9EA83-0AEE-4C92-ACC4-49DAFA53FBAF}"/>
+                <a16:creationId xmlns:a16="http://schemas.microsoft.com/office/drawing/2014/main" id="{0AE9EA83-0AEE-4C92-ACC4-49DAFA53FBAF}"/>
               </a:ext>
             </a:extLst>
           </p:cNvPr>
@@ -3399,7 +3400,7 @@
           <p:cNvPr id="6" name="Rounded Rectangle 32">
             <a:extLst>
               <a:ext uri="{FF2B5EF4-FFF2-40B4-BE49-F238E27FC236}">
-                <a16:creationId xmlns:a16="http://schemas.microsoft.com/office/drawing/2014/main" xmlns="" id="{35F64075-BCA6-43B0-864D-A4E10D235C8D}"/>
+                <a16:creationId xmlns:a16="http://schemas.microsoft.com/office/drawing/2014/main" id="{35F64075-BCA6-43B0-864D-A4E10D235C8D}"/>
               </a:ext>
             </a:extLst>
           </p:cNvPr>
@@ -3457,7 +3458,7 @@
           <p:cNvPr id="7" name="Rectangle 6">
             <a:extLst>
               <a:ext uri="{FF2B5EF4-FFF2-40B4-BE49-F238E27FC236}">
-                <a16:creationId xmlns:a16="http://schemas.microsoft.com/office/drawing/2014/main" xmlns="" id="{241D8F26-367A-4EE2-BC9B-4A97EE475F57}"/>
+                <a16:creationId xmlns:a16="http://schemas.microsoft.com/office/drawing/2014/main" id="{241D8F26-367A-4EE2-BC9B-4A97EE475F57}"/>
               </a:ext>
             </a:extLst>
           </p:cNvPr>
@@ -3531,7 +3532,7 @@
           <p:cNvPr id="8" name="Rectangle 7">
             <a:extLst>
               <a:ext uri="{FF2B5EF4-FFF2-40B4-BE49-F238E27FC236}">
-                <a16:creationId xmlns:a16="http://schemas.microsoft.com/office/drawing/2014/main" xmlns="" id="{583FBC17-A62F-4E87-B8DE-0F79DF4336A0}"/>
+                <a16:creationId xmlns:a16="http://schemas.microsoft.com/office/drawing/2014/main" id="{583FBC17-A62F-4E87-B8DE-0F79DF4336A0}"/>
               </a:ext>
             </a:extLst>
           </p:cNvPr>
@@ -3591,7 +3592,7 @@
           <p:cNvPr id="19" name="Group 18">
             <a:extLst>
               <a:ext uri="{FF2B5EF4-FFF2-40B4-BE49-F238E27FC236}">
-                <a16:creationId xmlns:a16="http://schemas.microsoft.com/office/drawing/2014/main" xmlns="" id="{C587FE1B-2243-4627-BC52-851BDA62444B}"/>
+                <a16:creationId xmlns:a16="http://schemas.microsoft.com/office/drawing/2014/main" id="{C587FE1B-2243-4627-BC52-851BDA62444B}"/>
               </a:ext>
             </a:extLst>
           </p:cNvPr>
@@ -3611,7 +3612,7 @@
             <p:cNvPr id="20" name="Picture 19">
               <a:extLst>
                 <a:ext uri="{FF2B5EF4-FFF2-40B4-BE49-F238E27FC236}">
-                  <a16:creationId xmlns:a16="http://schemas.microsoft.com/office/drawing/2014/main" xmlns="" id="{0F2E3E05-4A48-4C06-BA49-75E2E366C715}"/>
+                  <a16:creationId xmlns:a16="http://schemas.microsoft.com/office/drawing/2014/main" id="{0F2E3E05-4A48-4C06-BA49-75E2E366C715}"/>
                 </a:ext>
               </a:extLst>
             </p:cNvPr>
@@ -3641,7 +3642,7 @@
             <p:cNvPr id="21" name="Freeform 22">
               <a:extLst>
                 <a:ext uri="{FF2B5EF4-FFF2-40B4-BE49-F238E27FC236}">
-                  <a16:creationId xmlns:a16="http://schemas.microsoft.com/office/drawing/2014/main" xmlns="" id="{8413CF68-A7E3-43A0-B613-5438D5382AB1}"/>
+                  <a16:creationId xmlns:a16="http://schemas.microsoft.com/office/drawing/2014/main" id="{8413CF68-A7E3-43A0-B613-5438D5382AB1}"/>
                 </a:ext>
               </a:extLst>
             </p:cNvPr>
@@ -4053,7 +4054,7 @@
           <p:cNvPr id="22" name="TextBox 21">
             <a:extLst>
               <a:ext uri="{FF2B5EF4-FFF2-40B4-BE49-F238E27FC236}">
-                <a16:creationId xmlns:a16="http://schemas.microsoft.com/office/drawing/2014/main" xmlns="" id="{97653B96-F2E2-406B-A513-F42319FDB50F}"/>
+                <a16:creationId xmlns:a16="http://schemas.microsoft.com/office/drawing/2014/main" id="{97653B96-F2E2-406B-A513-F42319FDB50F}"/>
               </a:ext>
             </a:extLst>
           </p:cNvPr>
@@ -4096,7 +4097,7 @@
           <p:cNvPr id="23" name="Rectangle 22">
             <a:extLst>
               <a:ext uri="{FF2B5EF4-FFF2-40B4-BE49-F238E27FC236}">
-                <a16:creationId xmlns:a16="http://schemas.microsoft.com/office/drawing/2014/main" xmlns="" id="{3F004282-A136-4309-87A9-EA7DAA8C0919}"/>
+                <a16:creationId xmlns:a16="http://schemas.microsoft.com/office/drawing/2014/main" id="{3F004282-A136-4309-87A9-EA7DAA8C0919}"/>
               </a:ext>
             </a:extLst>
           </p:cNvPr>
@@ -4159,7 +4160,7 @@
           <p:cNvPr id="24" name="Rectangle 23">
             <a:extLst>
               <a:ext uri="{FF2B5EF4-FFF2-40B4-BE49-F238E27FC236}">
-                <a16:creationId xmlns:a16="http://schemas.microsoft.com/office/drawing/2014/main" xmlns="" id="{EC299E46-A9B5-4908-8BB9-FA2E5B1E6C0A}"/>
+                <a16:creationId xmlns:a16="http://schemas.microsoft.com/office/drawing/2014/main" id="{EC299E46-A9B5-4908-8BB9-FA2E5B1E6C0A}"/>
               </a:ext>
             </a:extLst>
           </p:cNvPr>
@@ -4329,7 +4330,7 @@
           <p:cNvPr id="33" name="Rectangle 32">
             <a:extLst>
               <a:ext uri="{FF2B5EF4-FFF2-40B4-BE49-F238E27FC236}">
-                <a16:creationId xmlns:a16="http://schemas.microsoft.com/office/drawing/2014/main" xmlns="" id="{E02B0EB1-C543-469A-90DE-9FA0F478E35F}"/>
+                <a16:creationId xmlns:a16="http://schemas.microsoft.com/office/drawing/2014/main" id="{E02B0EB1-C543-469A-90DE-9FA0F478E35F}"/>
               </a:ext>
             </a:extLst>
           </p:cNvPr>
@@ -4451,7 +4452,7 @@
           <p:cNvPr id="37" name="Picture 36">
             <a:extLst>
               <a:ext uri="{FF2B5EF4-FFF2-40B4-BE49-F238E27FC236}">
-                <a16:creationId xmlns:a16="http://schemas.microsoft.com/office/drawing/2014/main" xmlns="" id="{5FFDE39E-FECF-4D38-85AA-5F63230B9154}"/>
+                <a16:creationId xmlns:a16="http://schemas.microsoft.com/office/drawing/2014/main" id="{5FFDE39E-FECF-4D38-85AA-5F63230B9154}"/>
               </a:ext>
             </a:extLst>
           </p:cNvPr>
@@ -4481,7 +4482,7 @@
           <p:cNvPr id="1028" name="Picture 4" descr="James Arthur Gosling – GLOBAL PROGRAMMERS STORIES">
             <a:extLst>
               <a:ext uri="{FF2B5EF4-FFF2-40B4-BE49-F238E27FC236}">
-                <a16:creationId xmlns:a16="http://schemas.microsoft.com/office/drawing/2014/main" xmlns="" id="{F50B2B8C-B1E2-4FFD-AC8D-2BC1CF0FD607}"/>
+                <a16:creationId xmlns:a16="http://schemas.microsoft.com/office/drawing/2014/main" id="{F50B2B8C-B1E2-4FFD-AC8D-2BC1CF0FD607}"/>
               </a:ext>
             </a:extLst>
           </p:cNvPr>
@@ -4528,7 +4529,7 @@
           <p:cNvPr id="50" name="Rectangle 49">
             <a:extLst>
               <a:ext uri="{FF2B5EF4-FFF2-40B4-BE49-F238E27FC236}">
-                <a16:creationId xmlns:a16="http://schemas.microsoft.com/office/drawing/2014/main" xmlns="" id="{907BEB2A-D93E-46CB-95DF-04E16F0D1C0C}"/>
+                <a16:creationId xmlns:a16="http://schemas.microsoft.com/office/drawing/2014/main" id="{907BEB2A-D93E-46CB-95DF-04E16F0D1C0C}"/>
               </a:ext>
             </a:extLst>
           </p:cNvPr>
@@ -4603,7 +4604,7 @@
           <p:cNvPr id="53" name="TextBox 52">
             <a:extLst>
               <a:ext uri="{FF2B5EF4-FFF2-40B4-BE49-F238E27FC236}">
-                <a16:creationId xmlns:a16="http://schemas.microsoft.com/office/drawing/2014/main" xmlns="" id="{97E62140-1BE6-4659-9F83-22F2EE84A187}"/>
+                <a16:creationId xmlns:a16="http://schemas.microsoft.com/office/drawing/2014/main" id="{97E62140-1BE6-4659-9F83-22F2EE84A187}"/>
               </a:ext>
             </a:extLst>
           </p:cNvPr>
@@ -4676,7 +4677,7 @@
           <p:cNvPr id="56" name="Rounded Rectangle 33">
             <a:extLst>
               <a:ext uri="{FF2B5EF4-FFF2-40B4-BE49-F238E27FC236}">
-                <a16:creationId xmlns:a16="http://schemas.microsoft.com/office/drawing/2014/main" xmlns="" id="{7FF497DB-E694-458D-A891-9C1C5B46F501}"/>
+                <a16:creationId xmlns:a16="http://schemas.microsoft.com/office/drawing/2014/main" id="{7FF497DB-E694-458D-A891-9C1C5B46F501}"/>
               </a:ext>
             </a:extLst>
           </p:cNvPr>
@@ -4732,7 +4733,7 @@
           <p:cNvPr id="57" name="Rectangle 56">
             <a:extLst>
               <a:ext uri="{FF2B5EF4-FFF2-40B4-BE49-F238E27FC236}">
-                <a16:creationId xmlns:a16="http://schemas.microsoft.com/office/drawing/2014/main" xmlns="" id="{12FA83B6-2C9A-4C25-AA87-2D96491186D4}"/>
+                <a16:creationId xmlns:a16="http://schemas.microsoft.com/office/drawing/2014/main" id="{12FA83B6-2C9A-4C25-AA87-2D96491186D4}"/>
               </a:ext>
             </a:extLst>
           </p:cNvPr>
@@ -4801,7 +4802,7 @@
           <p:cNvPr id="58" name="Rectangle 57">
             <a:extLst>
               <a:ext uri="{FF2B5EF4-FFF2-40B4-BE49-F238E27FC236}">
-                <a16:creationId xmlns:a16="http://schemas.microsoft.com/office/drawing/2014/main" xmlns="" id="{5E92C9BC-9928-425D-9A7E-945E2516C972}"/>
+                <a16:creationId xmlns:a16="http://schemas.microsoft.com/office/drawing/2014/main" id="{5E92C9BC-9928-425D-9A7E-945E2516C972}"/>
               </a:ext>
             </a:extLst>
           </p:cNvPr>
@@ -4979,7 +4980,7 @@
           <p:cNvPr id="39" name="Rounded Rectangle 32">
             <a:extLst>
               <a:ext uri="{FF2B5EF4-FFF2-40B4-BE49-F238E27FC236}">
-                <a16:creationId xmlns:a16="http://schemas.microsoft.com/office/drawing/2014/main" xmlns="" id="{67494A8B-84F8-4589-A7C2-144157B38080}"/>
+                <a16:creationId xmlns:a16="http://schemas.microsoft.com/office/drawing/2014/main" id="{67494A8B-84F8-4589-A7C2-144157B38080}"/>
               </a:ext>
             </a:extLst>
           </p:cNvPr>
@@ -5037,7 +5038,7 @@
           <p:cNvPr id="40" name="Rectangle 39">
             <a:extLst>
               <a:ext uri="{FF2B5EF4-FFF2-40B4-BE49-F238E27FC236}">
-                <a16:creationId xmlns:a16="http://schemas.microsoft.com/office/drawing/2014/main" xmlns="" id="{DB5E68C8-8222-4645-A671-F970E83B7BA3}"/>
+                <a16:creationId xmlns:a16="http://schemas.microsoft.com/office/drawing/2014/main" id="{DB5E68C8-8222-4645-A671-F970E83B7BA3}"/>
               </a:ext>
             </a:extLst>
           </p:cNvPr>
@@ -5108,7 +5109,7 @@
           <p:cNvPr id="41" name="Rectangle 40">
             <a:extLst>
               <a:ext uri="{FF2B5EF4-FFF2-40B4-BE49-F238E27FC236}">
-                <a16:creationId xmlns:a16="http://schemas.microsoft.com/office/drawing/2014/main" xmlns="" id="{E979B7D3-30A0-41B4-990C-B750D66636E6}"/>
+                <a16:creationId xmlns:a16="http://schemas.microsoft.com/office/drawing/2014/main" id="{E979B7D3-30A0-41B4-990C-B750D66636E6}"/>
               </a:ext>
             </a:extLst>
           </p:cNvPr>
@@ -5157,7 +5158,7 @@
           <p:cNvPr id="35" name="Rounded Rectangle 32">
             <a:extLst>
               <a:ext uri="{FF2B5EF4-FFF2-40B4-BE49-F238E27FC236}">
-                <a16:creationId xmlns:a16="http://schemas.microsoft.com/office/drawing/2014/main" xmlns="" id="{08514579-093A-4E92-B859-ECF253136F29}"/>
+                <a16:creationId xmlns:a16="http://schemas.microsoft.com/office/drawing/2014/main" id="{08514579-093A-4E92-B859-ECF253136F29}"/>
               </a:ext>
             </a:extLst>
           </p:cNvPr>
@@ -5215,7 +5216,7 @@
           <p:cNvPr id="32" name="Rounded Rectangle 32">
             <a:extLst>
               <a:ext uri="{FF2B5EF4-FFF2-40B4-BE49-F238E27FC236}">
-                <a16:creationId xmlns:a16="http://schemas.microsoft.com/office/drawing/2014/main" xmlns="" id="{539D51A3-1763-4478-9BB4-86711F59982A}"/>
+                <a16:creationId xmlns:a16="http://schemas.microsoft.com/office/drawing/2014/main" id="{539D51A3-1763-4478-9BB4-86711F59982A}"/>
               </a:ext>
             </a:extLst>
           </p:cNvPr>
@@ -5273,7 +5274,7 @@
           <p:cNvPr id="8" name="Rectangle 7">
             <a:extLst>
               <a:ext uri="{FF2B5EF4-FFF2-40B4-BE49-F238E27FC236}">
-                <a16:creationId xmlns:a16="http://schemas.microsoft.com/office/drawing/2014/main" xmlns="" id="{583FBC17-A62F-4E87-B8DE-0F79DF4336A0}"/>
+                <a16:creationId xmlns:a16="http://schemas.microsoft.com/office/drawing/2014/main" id="{583FBC17-A62F-4E87-B8DE-0F79DF4336A0}"/>
               </a:ext>
             </a:extLst>
           </p:cNvPr>
@@ -5333,7 +5334,7 @@
           <p:cNvPr id="19" name="Group 18">
             <a:extLst>
               <a:ext uri="{FF2B5EF4-FFF2-40B4-BE49-F238E27FC236}">
-                <a16:creationId xmlns:a16="http://schemas.microsoft.com/office/drawing/2014/main" xmlns="" id="{C587FE1B-2243-4627-BC52-851BDA62444B}"/>
+                <a16:creationId xmlns:a16="http://schemas.microsoft.com/office/drawing/2014/main" id="{C587FE1B-2243-4627-BC52-851BDA62444B}"/>
               </a:ext>
             </a:extLst>
           </p:cNvPr>
@@ -5353,7 +5354,7 @@
             <p:cNvPr id="20" name="Picture 19">
               <a:extLst>
                 <a:ext uri="{FF2B5EF4-FFF2-40B4-BE49-F238E27FC236}">
-                  <a16:creationId xmlns:a16="http://schemas.microsoft.com/office/drawing/2014/main" xmlns="" id="{0F2E3E05-4A48-4C06-BA49-75E2E366C715}"/>
+                  <a16:creationId xmlns:a16="http://schemas.microsoft.com/office/drawing/2014/main" id="{0F2E3E05-4A48-4C06-BA49-75E2E366C715}"/>
                 </a:ext>
               </a:extLst>
             </p:cNvPr>
@@ -5383,7 +5384,7 @@
             <p:cNvPr id="21" name="Freeform 22">
               <a:extLst>
                 <a:ext uri="{FF2B5EF4-FFF2-40B4-BE49-F238E27FC236}">
-                  <a16:creationId xmlns:a16="http://schemas.microsoft.com/office/drawing/2014/main" xmlns="" id="{8413CF68-A7E3-43A0-B613-5438D5382AB1}"/>
+                  <a16:creationId xmlns:a16="http://schemas.microsoft.com/office/drawing/2014/main" id="{8413CF68-A7E3-43A0-B613-5438D5382AB1}"/>
                 </a:ext>
               </a:extLst>
             </p:cNvPr>
@@ -5795,7 +5796,7 @@
           <p:cNvPr id="22" name="TextBox 21">
             <a:extLst>
               <a:ext uri="{FF2B5EF4-FFF2-40B4-BE49-F238E27FC236}">
-                <a16:creationId xmlns:a16="http://schemas.microsoft.com/office/drawing/2014/main" xmlns="" id="{97653B96-F2E2-406B-A513-F42319FDB50F}"/>
+                <a16:creationId xmlns:a16="http://schemas.microsoft.com/office/drawing/2014/main" id="{97653B96-F2E2-406B-A513-F42319FDB50F}"/>
               </a:ext>
             </a:extLst>
           </p:cNvPr>
@@ -5838,7 +5839,7 @@
           <p:cNvPr id="33" name="Rectangle 32">
             <a:extLst>
               <a:ext uri="{FF2B5EF4-FFF2-40B4-BE49-F238E27FC236}">
-                <a16:creationId xmlns:a16="http://schemas.microsoft.com/office/drawing/2014/main" xmlns="" id="{E02B0EB1-C543-469A-90DE-9FA0F478E35F}"/>
+                <a16:creationId xmlns:a16="http://schemas.microsoft.com/office/drawing/2014/main" id="{E02B0EB1-C543-469A-90DE-9FA0F478E35F}"/>
               </a:ext>
             </a:extLst>
           </p:cNvPr>
@@ -5960,7 +5961,7 @@
           <p:cNvPr id="52" name="Picture 51">
             <a:extLst>
               <a:ext uri="{FF2B5EF4-FFF2-40B4-BE49-F238E27FC236}">
-                <a16:creationId xmlns:a16="http://schemas.microsoft.com/office/drawing/2014/main" xmlns="" id="{30CA3164-0494-491E-9850-E95589911E39}"/>
+                <a16:creationId xmlns:a16="http://schemas.microsoft.com/office/drawing/2014/main" id="{30CA3164-0494-491E-9850-E95589911E39}"/>
               </a:ext>
             </a:extLst>
           </p:cNvPr>
@@ -5990,7 +5991,7 @@
           <p:cNvPr id="2" name="Rectangle 1">
             <a:extLst>
               <a:ext uri="{FF2B5EF4-FFF2-40B4-BE49-F238E27FC236}">
-                <a16:creationId xmlns:a16="http://schemas.microsoft.com/office/drawing/2014/main" xmlns="" id="{4CCC6592-C31F-4A5F-B358-A9380D6B238F}"/>
+                <a16:creationId xmlns:a16="http://schemas.microsoft.com/office/drawing/2014/main" id="{4CCC6592-C31F-4A5F-B358-A9380D6B238F}"/>
               </a:ext>
             </a:extLst>
           </p:cNvPr>
@@ -6228,7 +6229,7 @@
           <p:cNvPr id="3" name="Rectangle 2">
             <a:extLst>
               <a:ext uri="{FF2B5EF4-FFF2-40B4-BE49-F238E27FC236}">
-                <a16:creationId xmlns:a16="http://schemas.microsoft.com/office/drawing/2014/main" xmlns="" id="{7D51986C-99A5-4382-B3BC-BFF4C0224D3C}"/>
+                <a16:creationId xmlns:a16="http://schemas.microsoft.com/office/drawing/2014/main" id="{7D51986C-99A5-4382-B3BC-BFF4C0224D3C}"/>
               </a:ext>
             </a:extLst>
           </p:cNvPr>
@@ -6277,7 +6278,7 @@
           <p:cNvPr id="9" name="Arrow: Down 8">
             <a:extLst>
               <a:ext uri="{FF2B5EF4-FFF2-40B4-BE49-F238E27FC236}">
-                <a16:creationId xmlns:a16="http://schemas.microsoft.com/office/drawing/2014/main" xmlns="" id="{2CFFDA68-7A8A-4A46-9B72-C14FA4ED56D8}"/>
+                <a16:creationId xmlns:a16="http://schemas.microsoft.com/office/drawing/2014/main" id="{2CFFDA68-7A8A-4A46-9B72-C14FA4ED56D8}"/>
               </a:ext>
             </a:extLst>
           </p:cNvPr>
@@ -6326,7 +6327,7 @@
           <p:cNvPr id="10" name="Rectangle 9">
             <a:extLst>
               <a:ext uri="{FF2B5EF4-FFF2-40B4-BE49-F238E27FC236}">
-                <a16:creationId xmlns:a16="http://schemas.microsoft.com/office/drawing/2014/main" xmlns="" id="{CACC4F07-BA92-4CB1-B2E0-B2CFFF66C3A1}"/>
+                <a16:creationId xmlns:a16="http://schemas.microsoft.com/office/drawing/2014/main" id="{CACC4F07-BA92-4CB1-B2E0-B2CFFF66C3A1}"/>
               </a:ext>
             </a:extLst>
           </p:cNvPr>
@@ -6385,7 +6386,7 @@
           <p:cNvPr id="28" name="Rectangle 27">
             <a:extLst>
               <a:ext uri="{FF2B5EF4-FFF2-40B4-BE49-F238E27FC236}">
-                <a16:creationId xmlns:a16="http://schemas.microsoft.com/office/drawing/2014/main" xmlns="" id="{965C5BC0-D239-49B2-8BEB-2D7C0E67465C}"/>
+                <a16:creationId xmlns:a16="http://schemas.microsoft.com/office/drawing/2014/main" id="{965C5BC0-D239-49B2-8BEB-2D7C0E67465C}"/>
               </a:ext>
             </a:extLst>
           </p:cNvPr>
@@ -6494,7 +6495,7 @@
           <p:cNvPr id="29" name="Rectangle 28">
             <a:extLst>
               <a:ext uri="{FF2B5EF4-FFF2-40B4-BE49-F238E27FC236}">
-                <a16:creationId xmlns:a16="http://schemas.microsoft.com/office/drawing/2014/main" xmlns="" id="{A7B1BCC4-C91A-49F2-82BB-84FA72878D75}"/>
+                <a16:creationId xmlns:a16="http://schemas.microsoft.com/office/drawing/2014/main" id="{A7B1BCC4-C91A-49F2-82BB-84FA72878D75}"/>
               </a:ext>
             </a:extLst>
           </p:cNvPr>
@@ -6544,7 +6545,7 @@
           <p:cNvPr id="30" name="Arrow: Down 29">
             <a:extLst>
               <a:ext uri="{FF2B5EF4-FFF2-40B4-BE49-F238E27FC236}">
-                <a16:creationId xmlns:a16="http://schemas.microsoft.com/office/drawing/2014/main" xmlns="" id="{3DE79B8C-B6E4-4E70-8CBC-FDA10F5C8F2B}"/>
+                <a16:creationId xmlns:a16="http://schemas.microsoft.com/office/drawing/2014/main" id="{3DE79B8C-B6E4-4E70-8CBC-FDA10F5C8F2B}"/>
               </a:ext>
             </a:extLst>
           </p:cNvPr>
@@ -6593,7 +6594,7 @@
           <p:cNvPr id="31" name="Rectangle 30">
             <a:extLst>
               <a:ext uri="{FF2B5EF4-FFF2-40B4-BE49-F238E27FC236}">
-                <a16:creationId xmlns:a16="http://schemas.microsoft.com/office/drawing/2014/main" xmlns="" id="{754700D2-5E01-4247-9879-97C7590D7579}"/>
+                <a16:creationId xmlns:a16="http://schemas.microsoft.com/office/drawing/2014/main" id="{754700D2-5E01-4247-9879-97C7590D7579}"/>
               </a:ext>
             </a:extLst>
           </p:cNvPr>
@@ -6652,7 +6653,7 @@
           <p:cNvPr id="34" name="Rectangle 33">
             <a:extLst>
               <a:ext uri="{FF2B5EF4-FFF2-40B4-BE49-F238E27FC236}">
-                <a16:creationId xmlns:a16="http://schemas.microsoft.com/office/drawing/2014/main" xmlns="" id="{163910D5-C953-43F3-9F0E-6643B54DECF7}"/>
+                <a16:creationId xmlns:a16="http://schemas.microsoft.com/office/drawing/2014/main" id="{163910D5-C953-43F3-9F0E-6643B54DECF7}"/>
               </a:ext>
             </a:extLst>
           </p:cNvPr>
@@ -6716,7 +6717,7 @@
           <p:cNvPr id="36" name="Rectangle 35">
             <a:extLst>
               <a:ext uri="{FF2B5EF4-FFF2-40B4-BE49-F238E27FC236}">
-                <a16:creationId xmlns:a16="http://schemas.microsoft.com/office/drawing/2014/main" xmlns="" id="{1270B330-D1E4-443A-AF54-D135E85547CC}"/>
+                <a16:creationId xmlns:a16="http://schemas.microsoft.com/office/drawing/2014/main" id="{1270B330-D1E4-443A-AF54-D135E85547CC}"/>
               </a:ext>
             </a:extLst>
           </p:cNvPr>
@@ -6780,7 +6781,7 @@
           <p:cNvPr id="42" name="Rectangle 41">
             <a:extLst>
               <a:ext uri="{FF2B5EF4-FFF2-40B4-BE49-F238E27FC236}">
-                <a16:creationId xmlns:a16="http://schemas.microsoft.com/office/drawing/2014/main" xmlns="" id="{D04DA425-BD96-448A-853F-828C2C82A04B}"/>
+                <a16:creationId xmlns:a16="http://schemas.microsoft.com/office/drawing/2014/main" id="{D04DA425-BD96-448A-853F-828C2C82A04B}"/>
               </a:ext>
             </a:extLst>
           </p:cNvPr>
@@ -6844,7 +6845,7 @@
           <p:cNvPr id="43" name="Rectangle 42">
             <a:extLst>
               <a:ext uri="{FF2B5EF4-FFF2-40B4-BE49-F238E27FC236}">
-                <a16:creationId xmlns:a16="http://schemas.microsoft.com/office/drawing/2014/main" xmlns="" id="{D34E9A21-1A58-46AB-9B04-B395A902D5FE}"/>
+                <a16:creationId xmlns:a16="http://schemas.microsoft.com/office/drawing/2014/main" id="{D34E9A21-1A58-46AB-9B04-B395A902D5FE}"/>
               </a:ext>
             </a:extLst>
           </p:cNvPr>
@@ -6903,7 +6904,7 @@
           <p:cNvPr id="44" name="Rectangle 43">
             <a:extLst>
               <a:ext uri="{FF2B5EF4-FFF2-40B4-BE49-F238E27FC236}">
-                <a16:creationId xmlns:a16="http://schemas.microsoft.com/office/drawing/2014/main" xmlns="" id="{2E06A917-F00D-45FD-BC29-B104B39745B8}"/>
+                <a16:creationId xmlns:a16="http://schemas.microsoft.com/office/drawing/2014/main" id="{2E06A917-F00D-45FD-BC29-B104B39745B8}"/>
               </a:ext>
             </a:extLst>
           </p:cNvPr>
@@ -6951,6 +6952,841 @@
     <p:extLst>
       <p:ext uri="{BB962C8B-B14F-4D97-AF65-F5344CB8AC3E}">
         <p14:creationId xmlns:p14="http://schemas.microsoft.com/office/powerpoint/2010/main" val="4256432844"/>
+      </p:ext>
+    </p:extLst>
+  </p:cSld>
+  <p:clrMapOvr>
+    <a:masterClrMapping/>
+  </p:clrMapOvr>
+</p:sld>
+</file>
+
+<file path=ppt/slides/slide3.xml><?xml version="1.0" encoding="utf-8"?>
+<p:sld xmlns:a="http://schemas.openxmlformats.org/drawingml/2006/main" xmlns:r="http://schemas.openxmlformats.org/officeDocument/2006/relationships" xmlns:p="http://schemas.openxmlformats.org/presentationml/2006/main">
+  <p:cSld>
+    <p:spTree>
+      <p:nvGrpSpPr>
+        <p:cNvPr id="1" name=""/>
+        <p:cNvGrpSpPr/>
+        <p:nvPr/>
+      </p:nvGrpSpPr>
+      <p:grpSpPr>
+        <a:xfrm>
+          <a:off x="0" y="0"/>
+          <a:ext cx="0" cy="0"/>
+          <a:chOff x="0" y="0"/>
+          <a:chExt cx="0" cy="0"/>
+        </a:xfrm>
+      </p:grpSpPr>
+      <p:sp>
+        <p:nvSpPr>
+          <p:cNvPr id="8" name="Rectangle 7">
+            <a:extLst>
+              <a:ext uri="{FF2B5EF4-FFF2-40B4-BE49-F238E27FC236}">
+                <a16:creationId xmlns:a16="http://schemas.microsoft.com/office/drawing/2014/main" id="{583FBC17-A62F-4E87-B8DE-0F79DF4336A0}"/>
+              </a:ext>
+            </a:extLst>
+          </p:cNvPr>
+          <p:cNvSpPr/>
+          <p:nvPr/>
+        </p:nvSpPr>
+        <p:spPr>
+          <a:xfrm>
+            <a:off x="3824624" y="5691"/>
+            <a:ext cx="8367376" cy="770637"/>
+          </a:xfrm>
+          <a:prstGeom prst="rect">
+            <a:avLst/>
+          </a:prstGeom>
+          <a:solidFill>
+            <a:schemeClr val="bg1">
+              <a:lumMod val="95000"/>
+            </a:schemeClr>
+          </a:solidFill>
+          <a:ln>
+            <a:noFill/>
+          </a:ln>
+        </p:spPr>
+        <p:style>
+          <a:lnRef idx="2">
+            <a:schemeClr val="accent1">
+              <a:shade val="50000"/>
+            </a:schemeClr>
+          </a:lnRef>
+          <a:fillRef idx="1">
+            <a:schemeClr val="accent1"/>
+          </a:fillRef>
+          <a:effectRef idx="0">
+            <a:schemeClr val="accent1"/>
+          </a:effectRef>
+          <a:fontRef idx="minor">
+            <a:schemeClr val="lt1"/>
+          </a:fontRef>
+        </p:style>
+        <p:txBody>
+          <a:bodyPr rtlCol="0" anchor="ctr"/>
+          <a:lstStyle/>
+          <a:p>
+            <a:endParaRPr lang="en-AU" sz="800" dirty="0">
+              <a:solidFill>
+                <a:schemeClr val="bg1">
+                  <a:lumMod val="50000"/>
+                </a:schemeClr>
+              </a:solidFill>
+              <a:latin typeface="Oxygen" panose="02000503000000000000" pitchFamily="2" charset="0"/>
+            </a:endParaRPr>
+          </a:p>
+        </p:txBody>
+      </p:sp>
+      <p:grpSp>
+        <p:nvGrpSpPr>
+          <p:cNvPr id="19" name="Group 18">
+            <a:extLst>
+              <a:ext uri="{FF2B5EF4-FFF2-40B4-BE49-F238E27FC236}">
+                <a16:creationId xmlns:a16="http://schemas.microsoft.com/office/drawing/2014/main" id="{C587FE1B-2243-4627-BC52-851BDA62444B}"/>
+              </a:ext>
+            </a:extLst>
+          </p:cNvPr>
+          <p:cNvGrpSpPr/>
+          <p:nvPr/>
+        </p:nvGrpSpPr>
+        <p:grpSpPr>
+          <a:xfrm>
+            <a:off x="687804" y="156881"/>
+            <a:ext cx="2471777" cy="1145371"/>
+            <a:chOff x="4600575" y="2600315"/>
+            <a:chExt cx="2990850" cy="1385897"/>
+          </a:xfrm>
+        </p:grpSpPr>
+        <p:pic>
+          <p:nvPicPr>
+            <p:cNvPr id="20" name="Picture 19">
+              <a:extLst>
+                <a:ext uri="{FF2B5EF4-FFF2-40B4-BE49-F238E27FC236}">
+                  <a16:creationId xmlns:a16="http://schemas.microsoft.com/office/drawing/2014/main" id="{0F2E3E05-4A48-4C06-BA49-75E2E366C715}"/>
+                </a:ext>
+              </a:extLst>
+            </p:cNvPr>
+            <p:cNvPicPr>
+              <a:picLocks noChangeAspect="1"/>
+            </p:cNvPicPr>
+            <p:nvPr/>
+          </p:nvPicPr>
+          <p:blipFill>
+            <a:blip r:embed="rId2"/>
+            <a:stretch>
+              <a:fillRect/>
+            </a:stretch>
+          </p:blipFill>
+          <p:spPr>
+            <a:xfrm>
+              <a:off x="4600575" y="2871787"/>
+              <a:ext cx="2990850" cy="1114425"/>
+            </a:xfrm>
+            <a:prstGeom prst="rect">
+              <a:avLst/>
+            </a:prstGeom>
+          </p:spPr>
+        </p:pic>
+        <p:sp>
+          <p:nvSpPr>
+            <p:cNvPr id="21" name="Freeform 22">
+              <a:extLst>
+                <a:ext uri="{FF2B5EF4-FFF2-40B4-BE49-F238E27FC236}">
+                  <a16:creationId xmlns:a16="http://schemas.microsoft.com/office/drawing/2014/main" id="{8413CF68-A7E3-43A0-B613-5438D5382AB1}"/>
+                </a:ext>
+              </a:extLst>
+            </p:cNvPr>
+            <p:cNvSpPr/>
+            <p:nvPr/>
+          </p:nvSpPr>
+          <p:spPr>
+            <a:xfrm>
+              <a:off x="4739363" y="2600315"/>
+              <a:ext cx="971569" cy="971569"/>
+            </a:xfrm>
+            <a:custGeom>
+              <a:avLst/>
+              <a:gdLst>
+                <a:gd name="connsiteX0" fmla="*/ 1080000 w 2160000"/>
+                <a:gd name="connsiteY0" fmla="*/ 0 h 2160000"/>
+                <a:gd name="connsiteX1" fmla="*/ 2154424 w 2160000"/>
+                <a:gd name="connsiteY1" fmla="*/ 969576 h 2160000"/>
+                <a:gd name="connsiteX2" fmla="*/ 2157027 w 2160000"/>
+                <a:gd name="connsiteY2" fmla="*/ 1021127 h 2160000"/>
+                <a:gd name="connsiteX3" fmla="*/ 2159999 w 2160000"/>
+                <a:gd name="connsiteY3" fmla="*/ 1021127 h 2160000"/>
+                <a:gd name="connsiteX4" fmla="*/ 2159999 w 2160000"/>
+                <a:gd name="connsiteY4" fmla="*/ 1079980 h 2160000"/>
+                <a:gd name="connsiteX5" fmla="*/ 2160000 w 2160000"/>
+                <a:gd name="connsiteY5" fmla="*/ 1080000 h 2160000"/>
+                <a:gd name="connsiteX6" fmla="*/ 2159999 w 2160000"/>
+                <a:gd name="connsiteY6" fmla="*/ 1080021 h 2160000"/>
+                <a:gd name="connsiteX7" fmla="*/ 2159999 w 2160000"/>
+                <a:gd name="connsiteY7" fmla="*/ 1716639 h 2160000"/>
+                <a:gd name="connsiteX8" fmla="*/ 2157838 w 2160000"/>
+                <a:gd name="connsiteY8" fmla="*/ 1716639 h 2160000"/>
+                <a:gd name="connsiteX9" fmla="*/ 2160000 w 2160000"/>
+                <a:gd name="connsiteY9" fmla="*/ 1738544 h 2160000"/>
+                <a:gd name="connsiteX10" fmla="*/ 1891921 w 2160000"/>
+                <a:gd name="connsiteY10" fmla="*/ 2012333 h 2160000"/>
+                <a:gd name="connsiteX11" fmla="*/ 1623842 w 2160000"/>
+                <a:gd name="connsiteY11" fmla="*/ 1738544 h 2160000"/>
+                <a:gd name="connsiteX12" fmla="*/ 1626005 w 2160000"/>
+                <a:gd name="connsiteY12" fmla="*/ 1716639 h 2160000"/>
+                <a:gd name="connsiteX13" fmla="*/ 1620298 w 2160000"/>
+                <a:gd name="connsiteY13" fmla="*/ 1716639 h 2160000"/>
+                <a:gd name="connsiteX14" fmla="*/ 1620298 w 2160000"/>
+                <a:gd name="connsiteY14" fmla="*/ 1090950 h 2160000"/>
+                <a:gd name="connsiteX15" fmla="*/ 1618898 w 2160000"/>
+                <a:gd name="connsiteY15" fmla="*/ 1090937 h 2160000"/>
+                <a:gd name="connsiteX16" fmla="*/ 1620000 w 2160000"/>
+                <a:gd name="connsiteY16" fmla="*/ 1080000 h 2160000"/>
+                <a:gd name="connsiteX17" fmla="*/ 1080000 w 2160000"/>
+                <a:gd name="connsiteY17" fmla="*/ 540000 h 2160000"/>
+                <a:gd name="connsiteX18" fmla="*/ 540000 w 2160000"/>
+                <a:gd name="connsiteY18" fmla="*/ 1080000 h 2160000"/>
+                <a:gd name="connsiteX19" fmla="*/ 1080000 w 2160000"/>
+                <a:gd name="connsiteY19" fmla="*/ 1620000 h 2160000"/>
+                <a:gd name="connsiteX20" fmla="*/ 1172144 w 2160000"/>
+                <a:gd name="connsiteY20" fmla="*/ 1610711 h 2160000"/>
+                <a:gd name="connsiteX21" fmla="*/ 1192722 w 2160000"/>
+                <a:gd name="connsiteY21" fmla="*/ 1599542 h 2160000"/>
+                <a:gd name="connsiteX22" fmla="*/ 1205334 w 2160000"/>
+                <a:gd name="connsiteY22" fmla="*/ 1595627 h 2160000"/>
+                <a:gd name="connsiteX23" fmla="*/ 1218649 w 2160000"/>
+                <a:gd name="connsiteY23" fmla="*/ 1594482 h 2160000"/>
+                <a:gd name="connsiteX24" fmla="*/ 1273176 w 2160000"/>
+                <a:gd name="connsiteY24" fmla="*/ 1581875 h 2160000"/>
+                <a:gd name="connsiteX25" fmla="*/ 1277433 w 2160000"/>
+                <a:gd name="connsiteY25" fmla="*/ 1580379 h 2160000"/>
+                <a:gd name="connsiteX26" fmla="*/ 1297818 w 2160000"/>
+                <a:gd name="connsiteY26" fmla="*/ 1578324 h 2160000"/>
+                <a:gd name="connsiteX27" fmla="*/ 1567818 w 2160000"/>
+                <a:gd name="connsiteY27" fmla="*/ 1848324 h 2160000"/>
+                <a:gd name="connsiteX28" fmla="*/ 1469563 w 2160000"/>
+                <a:gd name="connsiteY28" fmla="*/ 2056669 h 2160000"/>
+                <a:gd name="connsiteX29" fmla="*/ 1412948 w 2160000"/>
+                <a:gd name="connsiteY29" fmla="*/ 2091019 h 2160000"/>
+                <a:gd name="connsiteX30" fmla="*/ 1398272 w 2160000"/>
+                <a:gd name="connsiteY30" fmla="*/ 2101498 h 2160000"/>
+                <a:gd name="connsiteX31" fmla="*/ 1374464 w 2160000"/>
+                <a:gd name="connsiteY31" fmla="*/ 2110955 h 2160000"/>
+                <a:gd name="connsiteX32" fmla="*/ 1376211 w 2160000"/>
+                <a:gd name="connsiteY32" fmla="*/ 2117860 h 2160000"/>
+                <a:gd name="connsiteX33" fmla="*/ 1321962 w 2160000"/>
+                <a:gd name="connsiteY33" fmla="*/ 2131809 h 2160000"/>
+                <a:gd name="connsiteX34" fmla="*/ 1306247 w 2160000"/>
+                <a:gd name="connsiteY34" fmla="*/ 2138051 h 2160000"/>
+                <a:gd name="connsiteX35" fmla="*/ 1267530 w 2160000"/>
+                <a:gd name="connsiteY35" fmla="*/ 2142656 h 2160000"/>
+                <a:gd name="connsiteX36" fmla="*/ 1190424 w 2160000"/>
+                <a:gd name="connsiteY36" fmla="*/ 2154424 h 2160000"/>
+                <a:gd name="connsiteX37" fmla="*/ 1080000 w 2160000"/>
+                <a:gd name="connsiteY37" fmla="*/ 2160000 h 2160000"/>
+                <a:gd name="connsiteX38" fmla="*/ 0 w 2160000"/>
+                <a:gd name="connsiteY38" fmla="*/ 1080000 h 2160000"/>
+                <a:gd name="connsiteX39" fmla="*/ 1080000 w 2160000"/>
+                <a:gd name="connsiteY39" fmla="*/ 0 h 2160000"/>
+              </a:gdLst>
+              <a:ahLst/>
+              <a:cxnLst>
+                <a:cxn ang="0">
+                  <a:pos x="connsiteX0" y="connsiteY0"/>
+                </a:cxn>
+                <a:cxn ang="0">
+                  <a:pos x="connsiteX1" y="connsiteY1"/>
+                </a:cxn>
+                <a:cxn ang="0">
+                  <a:pos x="connsiteX2" y="connsiteY2"/>
+                </a:cxn>
+                <a:cxn ang="0">
+                  <a:pos x="connsiteX3" y="connsiteY3"/>
+                </a:cxn>
+                <a:cxn ang="0">
+                  <a:pos x="connsiteX4" y="connsiteY4"/>
+                </a:cxn>
+                <a:cxn ang="0">
+                  <a:pos x="connsiteX5" y="connsiteY5"/>
+                </a:cxn>
+                <a:cxn ang="0">
+                  <a:pos x="connsiteX6" y="connsiteY6"/>
+                </a:cxn>
+                <a:cxn ang="0">
+                  <a:pos x="connsiteX7" y="connsiteY7"/>
+                </a:cxn>
+                <a:cxn ang="0">
+                  <a:pos x="connsiteX8" y="connsiteY8"/>
+                </a:cxn>
+                <a:cxn ang="0">
+                  <a:pos x="connsiteX9" y="connsiteY9"/>
+                </a:cxn>
+                <a:cxn ang="0">
+                  <a:pos x="connsiteX10" y="connsiteY10"/>
+                </a:cxn>
+                <a:cxn ang="0">
+                  <a:pos x="connsiteX11" y="connsiteY11"/>
+                </a:cxn>
+                <a:cxn ang="0">
+                  <a:pos x="connsiteX12" y="connsiteY12"/>
+                </a:cxn>
+                <a:cxn ang="0">
+                  <a:pos x="connsiteX13" y="connsiteY13"/>
+                </a:cxn>
+                <a:cxn ang="0">
+                  <a:pos x="connsiteX14" y="connsiteY14"/>
+                </a:cxn>
+                <a:cxn ang="0">
+                  <a:pos x="connsiteX15" y="connsiteY15"/>
+                </a:cxn>
+                <a:cxn ang="0">
+                  <a:pos x="connsiteX16" y="connsiteY16"/>
+                </a:cxn>
+                <a:cxn ang="0">
+                  <a:pos x="connsiteX17" y="connsiteY17"/>
+                </a:cxn>
+                <a:cxn ang="0">
+                  <a:pos x="connsiteX18" y="connsiteY18"/>
+                </a:cxn>
+                <a:cxn ang="0">
+                  <a:pos x="connsiteX19" y="connsiteY19"/>
+                </a:cxn>
+                <a:cxn ang="0">
+                  <a:pos x="connsiteX20" y="connsiteY20"/>
+                </a:cxn>
+                <a:cxn ang="0">
+                  <a:pos x="connsiteX21" y="connsiteY21"/>
+                </a:cxn>
+                <a:cxn ang="0">
+                  <a:pos x="connsiteX22" y="connsiteY22"/>
+                </a:cxn>
+                <a:cxn ang="0">
+                  <a:pos x="connsiteX23" y="connsiteY23"/>
+                </a:cxn>
+                <a:cxn ang="0">
+                  <a:pos x="connsiteX24" y="connsiteY24"/>
+                </a:cxn>
+                <a:cxn ang="0">
+                  <a:pos x="connsiteX25" y="connsiteY25"/>
+                </a:cxn>
+                <a:cxn ang="0">
+                  <a:pos x="connsiteX26" y="connsiteY26"/>
+                </a:cxn>
+                <a:cxn ang="0">
+                  <a:pos x="connsiteX27" y="connsiteY27"/>
+                </a:cxn>
+                <a:cxn ang="0">
+                  <a:pos x="connsiteX28" y="connsiteY28"/>
+                </a:cxn>
+                <a:cxn ang="0">
+                  <a:pos x="connsiteX29" y="connsiteY29"/>
+                </a:cxn>
+                <a:cxn ang="0">
+                  <a:pos x="connsiteX30" y="connsiteY30"/>
+                </a:cxn>
+                <a:cxn ang="0">
+                  <a:pos x="connsiteX31" y="connsiteY31"/>
+                </a:cxn>
+                <a:cxn ang="0">
+                  <a:pos x="connsiteX32" y="connsiteY32"/>
+                </a:cxn>
+                <a:cxn ang="0">
+                  <a:pos x="connsiteX33" y="connsiteY33"/>
+                </a:cxn>
+                <a:cxn ang="0">
+                  <a:pos x="connsiteX34" y="connsiteY34"/>
+                </a:cxn>
+                <a:cxn ang="0">
+                  <a:pos x="connsiteX35" y="connsiteY35"/>
+                </a:cxn>
+                <a:cxn ang="0">
+                  <a:pos x="connsiteX36" y="connsiteY36"/>
+                </a:cxn>
+                <a:cxn ang="0">
+                  <a:pos x="connsiteX37" y="connsiteY37"/>
+                </a:cxn>
+                <a:cxn ang="0">
+                  <a:pos x="connsiteX38" y="connsiteY38"/>
+                </a:cxn>
+                <a:cxn ang="0">
+                  <a:pos x="connsiteX39" y="connsiteY39"/>
+                </a:cxn>
+              </a:cxnLst>
+              <a:rect l="l" t="t" r="r" b="b"/>
+              <a:pathLst>
+                <a:path w="2160000" h="2160000">
+                  <a:moveTo>
+                    <a:pt x="1080000" y="0"/>
+                  </a:moveTo>
+                  <a:cubicBezTo>
+                    <a:pt x="1639189" y="0"/>
+                    <a:pt x="2099117" y="424979"/>
+                    <a:pt x="2154424" y="969576"/>
+                  </a:cubicBezTo>
+                  <a:lnTo>
+                    <a:pt x="2157027" y="1021127"/>
+                  </a:lnTo>
+                  <a:lnTo>
+                    <a:pt x="2159999" y="1021127"/>
+                  </a:lnTo>
+                  <a:lnTo>
+                    <a:pt x="2159999" y="1079980"/>
+                  </a:lnTo>
+                  <a:lnTo>
+                    <a:pt x="2160000" y="1080000"/>
+                  </a:lnTo>
+                  <a:lnTo>
+                    <a:pt x="2159999" y="1080021"/>
+                  </a:lnTo>
+                  <a:lnTo>
+                    <a:pt x="2159999" y="1716639"/>
+                  </a:lnTo>
+                  <a:lnTo>
+                    <a:pt x="2157838" y="1716639"/>
+                  </a:lnTo>
+                  <a:lnTo>
+                    <a:pt x="2160000" y="1738544"/>
+                  </a:lnTo>
+                  <a:cubicBezTo>
+                    <a:pt x="2160000" y="1889753"/>
+                    <a:pt x="2039977" y="2012333"/>
+                    <a:pt x="1891921" y="2012333"/>
+                  </a:cubicBezTo>
+                  <a:cubicBezTo>
+                    <a:pt x="1743865" y="2012333"/>
+                    <a:pt x="1623842" y="1889753"/>
+                    <a:pt x="1623842" y="1738544"/>
+                  </a:cubicBezTo>
+                  <a:lnTo>
+                    <a:pt x="1626005" y="1716639"/>
+                  </a:lnTo>
+                  <a:lnTo>
+                    <a:pt x="1620298" y="1716639"/>
+                  </a:lnTo>
+                  <a:lnTo>
+                    <a:pt x="1620298" y="1090950"/>
+                  </a:lnTo>
+                  <a:lnTo>
+                    <a:pt x="1618898" y="1090937"/>
+                  </a:lnTo>
+                  <a:lnTo>
+                    <a:pt x="1620000" y="1080000"/>
+                  </a:lnTo>
+                  <a:cubicBezTo>
+                    <a:pt x="1620000" y="781766"/>
+                    <a:pt x="1378234" y="540000"/>
+                    <a:pt x="1080000" y="540000"/>
+                  </a:cubicBezTo>
+                  <a:cubicBezTo>
+                    <a:pt x="781766" y="540000"/>
+                    <a:pt x="540000" y="781766"/>
+                    <a:pt x="540000" y="1080000"/>
+                  </a:cubicBezTo>
+                  <a:cubicBezTo>
+                    <a:pt x="540000" y="1378234"/>
+                    <a:pt x="781766" y="1620000"/>
+                    <a:pt x="1080000" y="1620000"/>
+                  </a:cubicBezTo>
+                  <a:lnTo>
+                    <a:pt x="1172144" y="1610711"/>
+                  </a:lnTo>
+                  <a:lnTo>
+                    <a:pt x="1192722" y="1599542"/>
+                  </a:lnTo>
+                  <a:lnTo>
+                    <a:pt x="1205334" y="1595627"/>
+                  </a:lnTo>
+                  <a:lnTo>
+                    <a:pt x="1218649" y="1594482"/>
+                  </a:lnTo>
+                  <a:cubicBezTo>
+                    <a:pt x="1237851" y="1591023"/>
+                    <a:pt x="1256099" y="1586790"/>
+                    <a:pt x="1273176" y="1581875"/>
+                  </a:cubicBezTo>
+                  <a:lnTo>
+                    <a:pt x="1277433" y="1580379"/>
+                  </a:lnTo>
+                  <a:lnTo>
+                    <a:pt x="1297818" y="1578324"/>
+                  </a:lnTo>
+                  <a:cubicBezTo>
+                    <a:pt x="1446935" y="1578324"/>
+                    <a:pt x="1567818" y="1699207"/>
+                    <a:pt x="1567818" y="1848324"/>
+                  </a:cubicBezTo>
+                  <a:cubicBezTo>
+                    <a:pt x="1567818" y="1932202"/>
+                    <a:pt x="1529570" y="2007147"/>
+                    <a:pt x="1469563" y="2056669"/>
+                  </a:cubicBezTo>
+                  <a:lnTo>
+                    <a:pt x="1412948" y="2091019"/>
+                  </a:lnTo>
+                  <a:lnTo>
+                    <a:pt x="1398272" y="2101498"/>
+                  </a:lnTo>
+                  <a:lnTo>
+                    <a:pt x="1374464" y="2110955"/>
+                  </a:lnTo>
+                  <a:lnTo>
+                    <a:pt x="1376211" y="2117860"/>
+                  </a:lnTo>
+                  <a:lnTo>
+                    <a:pt x="1321962" y="2131809"/>
+                  </a:lnTo>
+                  <a:lnTo>
+                    <a:pt x="1306247" y="2138051"/>
+                  </a:lnTo>
+                  <a:lnTo>
+                    <a:pt x="1267530" y="2142656"/>
+                  </a:lnTo>
+                  <a:lnTo>
+                    <a:pt x="1190424" y="2154424"/>
+                  </a:lnTo>
+                  <a:cubicBezTo>
+                    <a:pt x="1154118" y="2158111"/>
+                    <a:pt x="1117280" y="2160000"/>
+                    <a:pt x="1080000" y="2160000"/>
+                  </a:cubicBezTo>
+                  <a:cubicBezTo>
+                    <a:pt x="483532" y="2160000"/>
+                    <a:pt x="0" y="1676468"/>
+                    <a:pt x="0" y="1080000"/>
+                  </a:cubicBezTo>
+                  <a:cubicBezTo>
+                    <a:pt x="0" y="483532"/>
+                    <a:pt x="483532" y="0"/>
+                    <a:pt x="1080000" y="0"/>
+                  </a:cubicBezTo>
+                  <a:close/>
+                </a:path>
+              </a:pathLst>
+            </a:custGeom>
+            <a:solidFill>
+              <a:srgbClr val="FF8C52"/>
+            </a:solidFill>
+            <a:ln>
+              <a:solidFill>
+                <a:srgbClr val="FF8C52"/>
+              </a:solidFill>
+            </a:ln>
+          </p:spPr>
+          <p:style>
+            <a:lnRef idx="2">
+              <a:schemeClr val="accent1">
+                <a:shade val="50000"/>
+              </a:schemeClr>
+            </a:lnRef>
+            <a:fillRef idx="1">
+              <a:schemeClr val="accent1"/>
+            </a:fillRef>
+            <a:effectRef idx="0">
+              <a:schemeClr val="accent1"/>
+            </a:effectRef>
+            <a:fontRef idx="minor">
+              <a:schemeClr val="lt1"/>
+            </a:fontRef>
+          </p:style>
+          <p:txBody>
+            <a:bodyPr rtlCol="0" anchor="ctr"/>
+            <a:lstStyle/>
+            <a:p>
+              <a:pPr algn="ctr"/>
+              <a:endParaRPr lang="en-AU" dirty="0">
+                <a:latin typeface="Oxygen" panose="02000503000000000000" pitchFamily="2" charset="0"/>
+              </a:endParaRPr>
+            </a:p>
+          </p:txBody>
+        </p:sp>
+      </p:grpSp>
+      <p:sp>
+        <p:nvSpPr>
+          <p:cNvPr id="22" name="TextBox 21">
+            <a:extLst>
+              <a:ext uri="{FF2B5EF4-FFF2-40B4-BE49-F238E27FC236}">
+                <a16:creationId xmlns:a16="http://schemas.microsoft.com/office/drawing/2014/main" id="{97653B96-F2E2-406B-A513-F42319FDB50F}"/>
+              </a:ext>
+            </a:extLst>
+          </p:cNvPr>
+          <p:cNvSpPr txBox="1"/>
+          <p:nvPr/>
+        </p:nvSpPr>
+        <p:spPr>
+          <a:xfrm>
+            <a:off x="4698840" y="156881"/>
+            <a:ext cx="3764172" cy="369332"/>
+          </a:xfrm>
+          <a:prstGeom prst="rect">
+            <a:avLst/>
+          </a:prstGeom>
+          <a:noFill/>
+        </p:spPr>
+        <p:txBody>
+          <a:bodyPr wrap="none" rtlCol="0">
+            <a:spAutoFit/>
+          </a:bodyPr>
+          <a:lstStyle/>
+          <a:p>
+            <a:r>
+              <a:rPr lang="en-AU" b="1" dirty="0">
+                <a:solidFill>
+                  <a:schemeClr val="bg2">
+                    <a:lumMod val="75000"/>
+                  </a:schemeClr>
+                </a:solidFill>
+                <a:latin typeface="Oxygen" panose="02000503000000000000" pitchFamily="2" charset="0"/>
+                <a:cs typeface="Arial" panose="020B0604020202020204" pitchFamily="34" charset="0"/>
+              </a:rPr>
+              <a:t>Variables, Data Types and Arrays</a:t>
+            </a:r>
+          </a:p>
+        </p:txBody>
+      </p:sp>
+      <p:sp>
+        <p:nvSpPr>
+          <p:cNvPr id="33" name="Rectangle 32">
+            <a:extLst>
+              <a:ext uri="{FF2B5EF4-FFF2-40B4-BE49-F238E27FC236}">
+                <a16:creationId xmlns:a16="http://schemas.microsoft.com/office/drawing/2014/main" id="{E02B0EB1-C543-469A-90DE-9FA0F478E35F}"/>
+              </a:ext>
+            </a:extLst>
+          </p:cNvPr>
+          <p:cNvSpPr/>
+          <p:nvPr/>
+        </p:nvSpPr>
+        <p:spPr>
+          <a:xfrm>
+            <a:off x="0" y="6543676"/>
+            <a:ext cx="12192000" cy="314325"/>
+          </a:xfrm>
+          <a:prstGeom prst="rect">
+            <a:avLst/>
+          </a:prstGeom>
+          <a:solidFill>
+            <a:schemeClr val="bg1">
+              <a:lumMod val="95000"/>
+            </a:schemeClr>
+          </a:solidFill>
+          <a:ln>
+            <a:noFill/>
+          </a:ln>
+        </p:spPr>
+        <p:style>
+          <a:lnRef idx="2">
+            <a:schemeClr val="accent1">
+              <a:shade val="50000"/>
+            </a:schemeClr>
+          </a:lnRef>
+          <a:fillRef idx="1">
+            <a:schemeClr val="accent1"/>
+          </a:fillRef>
+          <a:effectRef idx="0">
+            <a:schemeClr val="accent1"/>
+          </a:effectRef>
+          <a:fontRef idx="minor">
+            <a:schemeClr val="lt1"/>
+          </a:fontRef>
+        </p:style>
+        <p:txBody>
+          <a:bodyPr rtlCol="0" anchor="ctr"/>
+          <a:lstStyle/>
+          <a:p>
+            <a:r>
+              <a:rPr lang="en-US" sz="800" dirty="0">
+                <a:solidFill>
+                  <a:schemeClr val="bg1">
+                    <a:lumMod val="50000"/>
+                  </a:schemeClr>
+                </a:solidFill>
+                <a:latin typeface="Oxygen" panose="02000503000000000000" pitchFamily="2" charset="0"/>
+              </a:rPr>
+              <a:t>                                                                                                                            </a:t>
+            </a:r>
+            <a:r>
+              <a:rPr lang="en-US" sz="800" b="1" dirty="0">
+                <a:solidFill>
+                  <a:schemeClr val="bg1">
+                    <a:lumMod val="50000"/>
+                  </a:schemeClr>
+                </a:solidFill>
+                <a:latin typeface="Oxygen" panose="02000503000000000000" pitchFamily="2" charset="0"/>
+              </a:rPr>
+              <a:t> </a:t>
+            </a:r>
+            <a:r>
+              <a:rPr lang="en-US" sz="800" b="1" dirty="0">
+                <a:solidFill>
+                  <a:srgbClr val="FF8C52"/>
+                </a:solidFill>
+                <a:latin typeface="Oxygen" panose="02000503000000000000" pitchFamily="2" charset="0"/>
+              </a:rPr>
+              <a:t>CONCEPTION      &gt;&gt;      PRACTICE        &gt;&gt;        CONFIDENCE      &gt;&gt;       HIGHEST GRADES</a:t>
+            </a:r>
+            <a:r>
+              <a:rPr lang="en-US" sz="800" dirty="0">
+                <a:solidFill>
+                  <a:srgbClr val="FF8C52"/>
+                </a:solidFill>
+                <a:latin typeface="Oxygen" panose="02000503000000000000" pitchFamily="2" charset="0"/>
+              </a:rPr>
+              <a:t>                                                                             </a:t>
+            </a:r>
+            <a:r>
+              <a:rPr lang="en-US" sz="700" dirty="0">
+                <a:solidFill>
+                  <a:schemeClr val="bg1">
+                    <a:lumMod val="50000"/>
+                  </a:schemeClr>
+                </a:solidFill>
+                <a:latin typeface="Oxygen" panose="02000503000000000000" pitchFamily="2" charset="0"/>
+              </a:rPr>
+              <a:t>© </a:t>
+            </a:r>
+            <a:r>
+              <a:rPr lang="pt-BR" sz="700" dirty="0">
+                <a:solidFill>
+                  <a:schemeClr val="bg1">
+                    <a:lumMod val="50000"/>
+                  </a:schemeClr>
+                </a:solidFill>
+                <a:latin typeface="Oxygen" panose="02000503000000000000" pitchFamily="2" charset="0"/>
+              </a:rPr>
+              <a:t>PROTECTED ANODIAM 2023     ||     PRIVATE &amp; CONFIDENTIAL</a:t>
+            </a:r>
+            <a:endParaRPr lang="en-AU" sz="700" dirty="0">
+              <a:solidFill>
+                <a:schemeClr val="bg1">
+                  <a:lumMod val="50000"/>
+                </a:schemeClr>
+              </a:solidFill>
+              <a:latin typeface="Oxygen" panose="02000503000000000000" pitchFamily="2" charset="0"/>
+            </a:endParaRPr>
+          </a:p>
+        </p:txBody>
+      </p:sp>
+      <p:pic>
+        <p:nvPicPr>
+          <p:cNvPr id="5" name="Picture 4">
+            <a:extLst>
+              <a:ext uri="{FF2B5EF4-FFF2-40B4-BE49-F238E27FC236}">
+                <a16:creationId xmlns:a16="http://schemas.microsoft.com/office/drawing/2014/main" id="{8ACA1744-6AFE-83EE-AE44-BD8037F7B7AD}"/>
+              </a:ext>
+            </a:extLst>
+          </p:cNvPr>
+          <p:cNvPicPr>
+            <a:picLocks noChangeAspect="1"/>
+          </p:cNvPicPr>
+          <p:nvPr/>
+        </p:nvPicPr>
+        <p:blipFill>
+          <a:blip r:embed="rId3">
+            <a:extLst>
+              <a:ext uri="{28A0092B-C50C-407E-A947-70E740481C1C}">
+                <a14:useLocalDpi xmlns:a14="http://schemas.microsoft.com/office/drawing/2010/main" val="0"/>
+              </a:ext>
+            </a:extLst>
+          </a:blip>
+          <a:stretch>
+            <a:fillRect/>
+          </a:stretch>
+        </p:blipFill>
+        <p:spPr>
+          <a:xfrm>
+            <a:off x="1250950" y="1689100"/>
+            <a:ext cx="3994150" cy="1625612"/>
+          </a:xfrm>
+          <a:prstGeom prst="rect">
+            <a:avLst/>
+          </a:prstGeom>
+          <a:ln>
+            <a:solidFill>
+              <a:schemeClr val="accent2"/>
+            </a:solidFill>
+          </a:ln>
+        </p:spPr>
+      </p:pic>
+      <p:pic>
+        <p:nvPicPr>
+          <p:cNvPr id="7" name="Picture 6">
+            <a:extLst>
+              <a:ext uri="{FF2B5EF4-FFF2-40B4-BE49-F238E27FC236}">
+                <a16:creationId xmlns:a16="http://schemas.microsoft.com/office/drawing/2014/main" id="{F404EAFB-2D66-F44C-CA64-7928759EE0BE}"/>
+              </a:ext>
+            </a:extLst>
+          </p:cNvPr>
+          <p:cNvPicPr>
+            <a:picLocks noChangeAspect="1"/>
+          </p:cNvPicPr>
+          <p:nvPr/>
+        </p:nvPicPr>
+        <p:blipFill>
+          <a:blip r:embed="rId4">
+            <a:extLst>
+              <a:ext uri="{28A0092B-C50C-407E-A947-70E740481C1C}">
+                <a14:useLocalDpi xmlns:a14="http://schemas.microsoft.com/office/drawing/2010/main" val="0"/>
+              </a:ext>
+            </a:extLst>
+          </a:blip>
+          <a:stretch>
+            <a:fillRect/>
+          </a:stretch>
+        </p:blipFill>
+        <p:spPr>
+          <a:xfrm>
+            <a:off x="5313422" y="1689099"/>
+            <a:ext cx="6299179" cy="4322365"/>
+          </a:xfrm>
+          <a:prstGeom prst="rect">
+            <a:avLst/>
+          </a:prstGeom>
+          <a:ln>
+            <a:solidFill>
+              <a:schemeClr val="accent2"/>
+            </a:solidFill>
+          </a:ln>
+        </p:spPr>
+      </p:pic>
+      <p:pic>
+        <p:nvPicPr>
+          <p:cNvPr id="15" name="Picture 14">
+            <a:extLst>
+              <a:ext uri="{FF2B5EF4-FFF2-40B4-BE49-F238E27FC236}">
+                <a16:creationId xmlns:a16="http://schemas.microsoft.com/office/drawing/2014/main" id="{5AC50144-AF05-C85A-104D-1288F48190FC}"/>
+              </a:ext>
+            </a:extLst>
+          </p:cNvPr>
+          <p:cNvPicPr>
+            <a:picLocks noChangeAspect="1"/>
+          </p:cNvPicPr>
+          <p:nvPr/>
+        </p:nvPicPr>
+        <p:blipFill>
+          <a:blip r:embed="rId5">
+            <a:extLst>
+              <a:ext uri="{28A0092B-C50C-407E-A947-70E740481C1C}">
+                <a14:useLocalDpi xmlns:a14="http://schemas.microsoft.com/office/drawing/2010/main" val="0"/>
+              </a:ext>
+            </a:extLst>
+          </a:blip>
+          <a:stretch>
+            <a:fillRect/>
+          </a:stretch>
+        </p:blipFill>
+        <p:spPr>
+          <a:xfrm>
+            <a:off x="1250950" y="3429000"/>
+            <a:ext cx="3994150" cy="2582465"/>
+          </a:xfrm>
+          <a:prstGeom prst="rect">
+            <a:avLst/>
+          </a:prstGeom>
+        </p:spPr>
+      </p:pic>
+    </p:spTree>
+    <p:extLst>
+      <p:ext uri="{BB962C8B-B14F-4D97-AF65-F5344CB8AC3E}">
+        <p14:creationId xmlns:p14="http://schemas.microsoft.com/office/powerpoint/2010/main" val="1140587063"/>
       </p:ext>
     </p:extLst>
   </p:cSld>

</xml_diff>

<commit_message>
Advertisement in facebook is in progress
Advertisement in facebook is in progress
</commit_message>
<xml_diff>
--- a/Offline/BusinessManagement/Teach_Tech@anodiam/IT/CourseMaterials/Java/001JavaIntroduction.pptx
+++ b/Offline/BusinessManagement/Teach_Tech@anodiam/IT/CourseMaterials/Java/001JavaIntroduction.pptx
@@ -8,6 +8,8 @@
     <p:sldId id="256" r:id="rId2"/>
     <p:sldId id="257" r:id="rId3"/>
     <p:sldId id="258" r:id="rId4"/>
+    <p:sldId id="259" r:id="rId5"/>
+    <p:sldId id="260" r:id="rId6"/>
   </p:sldIdLst>
   <p:sldSz cx="12192000" cy="6858000"/>
   <p:notesSz cx="6858000" cy="9144000"/>
@@ -136,7 +138,7 @@
           <p:cNvPr id="2" name="Title 1">
             <a:extLst>
               <a:ext uri="{FF2B5EF4-FFF2-40B4-BE49-F238E27FC236}">
-                <a16:creationId xmlns:a16="http://schemas.microsoft.com/office/drawing/2014/main" id="{2251324A-7793-49BC-A60F-907DAB9D7446}"/>
+                <a16:creationId xmlns="" xmlns:a16="http://schemas.microsoft.com/office/drawing/2014/main" id="{2251324A-7793-49BC-A60F-907DAB9D7446}"/>
               </a:ext>
             </a:extLst>
           </p:cNvPr>
@@ -174,7 +176,7 @@
           <p:cNvPr id="3" name="Subtitle 2">
             <a:extLst>
               <a:ext uri="{FF2B5EF4-FFF2-40B4-BE49-F238E27FC236}">
-                <a16:creationId xmlns:a16="http://schemas.microsoft.com/office/drawing/2014/main" id="{9DEE48AC-12CA-42E9-8869-A10BCD0F4D8C}"/>
+                <a16:creationId xmlns="" xmlns:a16="http://schemas.microsoft.com/office/drawing/2014/main" id="{9DEE48AC-12CA-42E9-8869-A10BCD0F4D8C}"/>
               </a:ext>
             </a:extLst>
           </p:cNvPr>
@@ -245,7 +247,7 @@
           <p:cNvPr id="4" name="Date Placeholder 3">
             <a:extLst>
               <a:ext uri="{FF2B5EF4-FFF2-40B4-BE49-F238E27FC236}">
-                <a16:creationId xmlns:a16="http://schemas.microsoft.com/office/drawing/2014/main" id="{B02D20DE-83CF-404F-81ED-E48568DD825A}"/>
+                <a16:creationId xmlns="" xmlns:a16="http://schemas.microsoft.com/office/drawing/2014/main" id="{B02D20DE-83CF-404F-81ED-E48568DD825A}"/>
               </a:ext>
             </a:extLst>
           </p:cNvPr>
@@ -263,7 +265,7 @@
           <a:p>
             <a:fld id="{C169E291-5783-4E82-882C-941255731AFB}" type="datetimeFigureOut">
               <a:rPr lang="en-AU" smtClean="0"/>
-              <a:t>21/07/2023</a:t>
+              <a:t>27/07/2023</a:t>
             </a:fld>
             <a:endParaRPr lang="en-AU"/>
           </a:p>
@@ -274,7 +276,7 @@
           <p:cNvPr id="5" name="Footer Placeholder 4">
             <a:extLst>
               <a:ext uri="{FF2B5EF4-FFF2-40B4-BE49-F238E27FC236}">
-                <a16:creationId xmlns:a16="http://schemas.microsoft.com/office/drawing/2014/main" id="{D84826B7-249B-408C-AA0B-4CD6D49B417D}"/>
+                <a16:creationId xmlns="" xmlns:a16="http://schemas.microsoft.com/office/drawing/2014/main" id="{D84826B7-249B-408C-AA0B-4CD6D49B417D}"/>
               </a:ext>
             </a:extLst>
           </p:cNvPr>
@@ -299,7 +301,7 @@
           <p:cNvPr id="6" name="Slide Number Placeholder 5">
             <a:extLst>
               <a:ext uri="{FF2B5EF4-FFF2-40B4-BE49-F238E27FC236}">
-                <a16:creationId xmlns:a16="http://schemas.microsoft.com/office/drawing/2014/main" id="{EF598B24-1B64-4B74-9D5F-5488AA650AEF}"/>
+                <a16:creationId xmlns="" xmlns:a16="http://schemas.microsoft.com/office/drawing/2014/main" id="{EF598B24-1B64-4B74-9D5F-5488AA650AEF}"/>
               </a:ext>
             </a:extLst>
           </p:cNvPr>
@@ -358,7 +360,7 @@
           <p:cNvPr id="2" name="Title 1">
             <a:extLst>
               <a:ext uri="{FF2B5EF4-FFF2-40B4-BE49-F238E27FC236}">
-                <a16:creationId xmlns:a16="http://schemas.microsoft.com/office/drawing/2014/main" id="{6F54CF0F-3175-40F1-AE72-E034E32AF576}"/>
+                <a16:creationId xmlns="" xmlns:a16="http://schemas.microsoft.com/office/drawing/2014/main" id="{6F54CF0F-3175-40F1-AE72-E034E32AF576}"/>
               </a:ext>
             </a:extLst>
           </p:cNvPr>
@@ -387,7 +389,7 @@
           <p:cNvPr id="3" name="Vertical Text Placeholder 2">
             <a:extLst>
               <a:ext uri="{FF2B5EF4-FFF2-40B4-BE49-F238E27FC236}">
-                <a16:creationId xmlns:a16="http://schemas.microsoft.com/office/drawing/2014/main" id="{FF1598EF-AB00-479D-8FF6-2AA7F601474A}"/>
+                <a16:creationId xmlns="" xmlns:a16="http://schemas.microsoft.com/office/drawing/2014/main" id="{FF1598EF-AB00-479D-8FF6-2AA7F601474A}"/>
               </a:ext>
             </a:extLst>
           </p:cNvPr>
@@ -445,7 +447,7 @@
           <p:cNvPr id="4" name="Date Placeholder 3">
             <a:extLst>
               <a:ext uri="{FF2B5EF4-FFF2-40B4-BE49-F238E27FC236}">
-                <a16:creationId xmlns:a16="http://schemas.microsoft.com/office/drawing/2014/main" id="{975B65D2-8D9E-4B38-B502-AE5D52AA38E0}"/>
+                <a16:creationId xmlns="" xmlns:a16="http://schemas.microsoft.com/office/drawing/2014/main" id="{975B65D2-8D9E-4B38-B502-AE5D52AA38E0}"/>
               </a:ext>
             </a:extLst>
           </p:cNvPr>
@@ -463,7 +465,7 @@
           <a:p>
             <a:fld id="{C169E291-5783-4E82-882C-941255731AFB}" type="datetimeFigureOut">
               <a:rPr lang="en-AU" smtClean="0"/>
-              <a:t>21/07/2023</a:t>
+              <a:t>27/07/2023</a:t>
             </a:fld>
             <a:endParaRPr lang="en-AU"/>
           </a:p>
@@ -474,7 +476,7 @@
           <p:cNvPr id="5" name="Footer Placeholder 4">
             <a:extLst>
               <a:ext uri="{FF2B5EF4-FFF2-40B4-BE49-F238E27FC236}">
-                <a16:creationId xmlns:a16="http://schemas.microsoft.com/office/drawing/2014/main" id="{0B4EEEE1-3FB8-482D-8967-5FE97A4A1844}"/>
+                <a16:creationId xmlns="" xmlns:a16="http://schemas.microsoft.com/office/drawing/2014/main" id="{0B4EEEE1-3FB8-482D-8967-5FE97A4A1844}"/>
               </a:ext>
             </a:extLst>
           </p:cNvPr>
@@ -499,7 +501,7 @@
           <p:cNvPr id="6" name="Slide Number Placeholder 5">
             <a:extLst>
               <a:ext uri="{FF2B5EF4-FFF2-40B4-BE49-F238E27FC236}">
-                <a16:creationId xmlns:a16="http://schemas.microsoft.com/office/drawing/2014/main" id="{EE364306-0952-48EC-944D-1266833105B2}"/>
+                <a16:creationId xmlns="" xmlns:a16="http://schemas.microsoft.com/office/drawing/2014/main" id="{EE364306-0952-48EC-944D-1266833105B2}"/>
               </a:ext>
             </a:extLst>
           </p:cNvPr>
@@ -558,7 +560,7 @@
           <p:cNvPr id="2" name="Vertical Title 1">
             <a:extLst>
               <a:ext uri="{FF2B5EF4-FFF2-40B4-BE49-F238E27FC236}">
-                <a16:creationId xmlns:a16="http://schemas.microsoft.com/office/drawing/2014/main" id="{48F6444D-5AC3-4827-9F63-AD9B048FBA64}"/>
+                <a16:creationId xmlns="" xmlns:a16="http://schemas.microsoft.com/office/drawing/2014/main" id="{48F6444D-5AC3-4827-9F63-AD9B048FBA64}"/>
               </a:ext>
             </a:extLst>
           </p:cNvPr>
@@ -592,7 +594,7 @@
           <p:cNvPr id="3" name="Vertical Text Placeholder 2">
             <a:extLst>
               <a:ext uri="{FF2B5EF4-FFF2-40B4-BE49-F238E27FC236}">
-                <a16:creationId xmlns:a16="http://schemas.microsoft.com/office/drawing/2014/main" id="{706FC9C0-AF10-4FC0-B845-F3EEF5670DFF}"/>
+                <a16:creationId xmlns="" xmlns:a16="http://schemas.microsoft.com/office/drawing/2014/main" id="{706FC9C0-AF10-4FC0-B845-F3EEF5670DFF}"/>
               </a:ext>
             </a:extLst>
           </p:cNvPr>
@@ -655,7 +657,7 @@
           <p:cNvPr id="4" name="Date Placeholder 3">
             <a:extLst>
               <a:ext uri="{FF2B5EF4-FFF2-40B4-BE49-F238E27FC236}">
-                <a16:creationId xmlns:a16="http://schemas.microsoft.com/office/drawing/2014/main" id="{184C5877-6C96-4CC4-AACD-AF2B0065CEEE}"/>
+                <a16:creationId xmlns="" xmlns:a16="http://schemas.microsoft.com/office/drawing/2014/main" id="{184C5877-6C96-4CC4-AACD-AF2B0065CEEE}"/>
               </a:ext>
             </a:extLst>
           </p:cNvPr>
@@ -673,7 +675,7 @@
           <a:p>
             <a:fld id="{C169E291-5783-4E82-882C-941255731AFB}" type="datetimeFigureOut">
               <a:rPr lang="en-AU" smtClean="0"/>
-              <a:t>21/07/2023</a:t>
+              <a:t>27/07/2023</a:t>
             </a:fld>
             <a:endParaRPr lang="en-AU"/>
           </a:p>
@@ -684,7 +686,7 @@
           <p:cNvPr id="5" name="Footer Placeholder 4">
             <a:extLst>
               <a:ext uri="{FF2B5EF4-FFF2-40B4-BE49-F238E27FC236}">
-                <a16:creationId xmlns:a16="http://schemas.microsoft.com/office/drawing/2014/main" id="{6EADBF9D-6B78-4384-8D6B-3E85708D0432}"/>
+                <a16:creationId xmlns="" xmlns:a16="http://schemas.microsoft.com/office/drawing/2014/main" id="{6EADBF9D-6B78-4384-8D6B-3E85708D0432}"/>
               </a:ext>
             </a:extLst>
           </p:cNvPr>
@@ -709,7 +711,7 @@
           <p:cNvPr id="6" name="Slide Number Placeholder 5">
             <a:extLst>
               <a:ext uri="{FF2B5EF4-FFF2-40B4-BE49-F238E27FC236}">
-                <a16:creationId xmlns:a16="http://schemas.microsoft.com/office/drawing/2014/main" id="{CA25186B-3289-49E4-B243-75AC2D6FA611}"/>
+                <a16:creationId xmlns="" xmlns:a16="http://schemas.microsoft.com/office/drawing/2014/main" id="{CA25186B-3289-49E4-B243-75AC2D6FA611}"/>
               </a:ext>
             </a:extLst>
           </p:cNvPr>
@@ -768,7 +770,7 @@
           <p:cNvPr id="2" name="Title 1">
             <a:extLst>
               <a:ext uri="{FF2B5EF4-FFF2-40B4-BE49-F238E27FC236}">
-                <a16:creationId xmlns:a16="http://schemas.microsoft.com/office/drawing/2014/main" id="{B9AA2A59-F4F8-4021-823D-FDA74004FE03}"/>
+                <a16:creationId xmlns="" xmlns:a16="http://schemas.microsoft.com/office/drawing/2014/main" id="{B9AA2A59-F4F8-4021-823D-FDA74004FE03}"/>
               </a:ext>
             </a:extLst>
           </p:cNvPr>
@@ -797,7 +799,7 @@
           <p:cNvPr id="3" name="Content Placeholder 2">
             <a:extLst>
               <a:ext uri="{FF2B5EF4-FFF2-40B4-BE49-F238E27FC236}">
-                <a16:creationId xmlns:a16="http://schemas.microsoft.com/office/drawing/2014/main" id="{B8E167D7-1F7E-47C3-92FB-3BE313EB6AF3}"/>
+                <a16:creationId xmlns="" xmlns:a16="http://schemas.microsoft.com/office/drawing/2014/main" id="{B8E167D7-1F7E-47C3-92FB-3BE313EB6AF3}"/>
               </a:ext>
             </a:extLst>
           </p:cNvPr>
@@ -855,7 +857,7 @@
           <p:cNvPr id="4" name="Date Placeholder 3">
             <a:extLst>
               <a:ext uri="{FF2B5EF4-FFF2-40B4-BE49-F238E27FC236}">
-                <a16:creationId xmlns:a16="http://schemas.microsoft.com/office/drawing/2014/main" id="{32F0EE72-0C00-41C2-AF7A-AD06D88149F0}"/>
+                <a16:creationId xmlns="" xmlns:a16="http://schemas.microsoft.com/office/drawing/2014/main" id="{32F0EE72-0C00-41C2-AF7A-AD06D88149F0}"/>
               </a:ext>
             </a:extLst>
           </p:cNvPr>
@@ -873,7 +875,7 @@
           <a:p>
             <a:fld id="{C169E291-5783-4E82-882C-941255731AFB}" type="datetimeFigureOut">
               <a:rPr lang="en-AU" smtClean="0"/>
-              <a:t>21/07/2023</a:t>
+              <a:t>27/07/2023</a:t>
             </a:fld>
             <a:endParaRPr lang="en-AU"/>
           </a:p>
@@ -884,7 +886,7 @@
           <p:cNvPr id="5" name="Footer Placeholder 4">
             <a:extLst>
               <a:ext uri="{FF2B5EF4-FFF2-40B4-BE49-F238E27FC236}">
-                <a16:creationId xmlns:a16="http://schemas.microsoft.com/office/drawing/2014/main" id="{924C1906-8712-4D14-A84C-268115122FF7}"/>
+                <a16:creationId xmlns="" xmlns:a16="http://schemas.microsoft.com/office/drawing/2014/main" id="{924C1906-8712-4D14-A84C-268115122FF7}"/>
               </a:ext>
             </a:extLst>
           </p:cNvPr>
@@ -909,7 +911,7 @@
           <p:cNvPr id="6" name="Slide Number Placeholder 5">
             <a:extLst>
               <a:ext uri="{FF2B5EF4-FFF2-40B4-BE49-F238E27FC236}">
-                <a16:creationId xmlns:a16="http://schemas.microsoft.com/office/drawing/2014/main" id="{EF581B9F-4520-4894-8887-B34D510AD3C0}"/>
+                <a16:creationId xmlns="" xmlns:a16="http://schemas.microsoft.com/office/drawing/2014/main" id="{EF581B9F-4520-4894-8887-B34D510AD3C0}"/>
               </a:ext>
             </a:extLst>
           </p:cNvPr>
@@ -968,7 +970,7 @@
           <p:cNvPr id="2" name="Title 1">
             <a:extLst>
               <a:ext uri="{FF2B5EF4-FFF2-40B4-BE49-F238E27FC236}">
-                <a16:creationId xmlns:a16="http://schemas.microsoft.com/office/drawing/2014/main" id="{BDC0C9F1-C5C8-46C6-B502-24B9097BC6FA}"/>
+                <a16:creationId xmlns="" xmlns:a16="http://schemas.microsoft.com/office/drawing/2014/main" id="{BDC0C9F1-C5C8-46C6-B502-24B9097BC6FA}"/>
               </a:ext>
             </a:extLst>
           </p:cNvPr>
@@ -1006,7 +1008,7 @@
           <p:cNvPr id="3" name="Text Placeholder 2">
             <a:extLst>
               <a:ext uri="{FF2B5EF4-FFF2-40B4-BE49-F238E27FC236}">
-                <a16:creationId xmlns:a16="http://schemas.microsoft.com/office/drawing/2014/main" id="{82DA8974-E100-44E6-A8C0-F9509740D574}"/>
+                <a16:creationId xmlns="" xmlns:a16="http://schemas.microsoft.com/office/drawing/2014/main" id="{82DA8974-E100-44E6-A8C0-F9509740D574}"/>
               </a:ext>
             </a:extLst>
           </p:cNvPr>
@@ -1131,7 +1133,7 @@
           <p:cNvPr id="4" name="Date Placeholder 3">
             <a:extLst>
               <a:ext uri="{FF2B5EF4-FFF2-40B4-BE49-F238E27FC236}">
-                <a16:creationId xmlns:a16="http://schemas.microsoft.com/office/drawing/2014/main" id="{F27FECF1-A8EC-4B92-9B45-2AF94967F4B4}"/>
+                <a16:creationId xmlns="" xmlns:a16="http://schemas.microsoft.com/office/drawing/2014/main" id="{F27FECF1-A8EC-4B92-9B45-2AF94967F4B4}"/>
               </a:ext>
             </a:extLst>
           </p:cNvPr>
@@ -1149,7 +1151,7 @@
           <a:p>
             <a:fld id="{C169E291-5783-4E82-882C-941255731AFB}" type="datetimeFigureOut">
               <a:rPr lang="en-AU" smtClean="0"/>
-              <a:t>21/07/2023</a:t>
+              <a:t>27/07/2023</a:t>
             </a:fld>
             <a:endParaRPr lang="en-AU"/>
           </a:p>
@@ -1160,7 +1162,7 @@
           <p:cNvPr id="5" name="Footer Placeholder 4">
             <a:extLst>
               <a:ext uri="{FF2B5EF4-FFF2-40B4-BE49-F238E27FC236}">
-                <a16:creationId xmlns:a16="http://schemas.microsoft.com/office/drawing/2014/main" id="{D5BAC015-3655-4F3B-9A27-9F712DAE8E41}"/>
+                <a16:creationId xmlns="" xmlns:a16="http://schemas.microsoft.com/office/drawing/2014/main" id="{D5BAC015-3655-4F3B-9A27-9F712DAE8E41}"/>
               </a:ext>
             </a:extLst>
           </p:cNvPr>
@@ -1185,7 +1187,7 @@
           <p:cNvPr id="6" name="Slide Number Placeholder 5">
             <a:extLst>
               <a:ext uri="{FF2B5EF4-FFF2-40B4-BE49-F238E27FC236}">
-                <a16:creationId xmlns:a16="http://schemas.microsoft.com/office/drawing/2014/main" id="{B7DE6F13-3141-4F8C-B042-5DA86E125882}"/>
+                <a16:creationId xmlns="" xmlns:a16="http://schemas.microsoft.com/office/drawing/2014/main" id="{B7DE6F13-3141-4F8C-B042-5DA86E125882}"/>
               </a:ext>
             </a:extLst>
           </p:cNvPr>
@@ -1244,7 +1246,7 @@
           <p:cNvPr id="2" name="Title 1">
             <a:extLst>
               <a:ext uri="{FF2B5EF4-FFF2-40B4-BE49-F238E27FC236}">
-                <a16:creationId xmlns:a16="http://schemas.microsoft.com/office/drawing/2014/main" id="{593CA6F9-6A5D-45B9-A54E-3D8945BE99BD}"/>
+                <a16:creationId xmlns="" xmlns:a16="http://schemas.microsoft.com/office/drawing/2014/main" id="{593CA6F9-6A5D-45B9-A54E-3D8945BE99BD}"/>
               </a:ext>
             </a:extLst>
           </p:cNvPr>
@@ -1273,7 +1275,7 @@
           <p:cNvPr id="3" name="Content Placeholder 2">
             <a:extLst>
               <a:ext uri="{FF2B5EF4-FFF2-40B4-BE49-F238E27FC236}">
-                <a16:creationId xmlns:a16="http://schemas.microsoft.com/office/drawing/2014/main" id="{0F0845E6-9278-4292-8952-7646B555A30F}"/>
+                <a16:creationId xmlns="" xmlns:a16="http://schemas.microsoft.com/office/drawing/2014/main" id="{0F0845E6-9278-4292-8952-7646B555A30F}"/>
               </a:ext>
             </a:extLst>
           </p:cNvPr>
@@ -1336,7 +1338,7 @@
           <p:cNvPr id="4" name="Content Placeholder 3">
             <a:extLst>
               <a:ext uri="{FF2B5EF4-FFF2-40B4-BE49-F238E27FC236}">
-                <a16:creationId xmlns:a16="http://schemas.microsoft.com/office/drawing/2014/main" id="{32AF459D-8978-40B3-82DF-2BC45042F974}"/>
+                <a16:creationId xmlns="" xmlns:a16="http://schemas.microsoft.com/office/drawing/2014/main" id="{32AF459D-8978-40B3-82DF-2BC45042F974}"/>
               </a:ext>
             </a:extLst>
           </p:cNvPr>
@@ -1399,7 +1401,7 @@
           <p:cNvPr id="5" name="Date Placeholder 4">
             <a:extLst>
               <a:ext uri="{FF2B5EF4-FFF2-40B4-BE49-F238E27FC236}">
-                <a16:creationId xmlns:a16="http://schemas.microsoft.com/office/drawing/2014/main" id="{3FA20EC9-1928-4FCF-816C-1784D8A07D8B}"/>
+                <a16:creationId xmlns="" xmlns:a16="http://schemas.microsoft.com/office/drawing/2014/main" id="{3FA20EC9-1928-4FCF-816C-1784D8A07D8B}"/>
               </a:ext>
             </a:extLst>
           </p:cNvPr>
@@ -1417,7 +1419,7 @@
           <a:p>
             <a:fld id="{C169E291-5783-4E82-882C-941255731AFB}" type="datetimeFigureOut">
               <a:rPr lang="en-AU" smtClean="0"/>
-              <a:t>21/07/2023</a:t>
+              <a:t>27/07/2023</a:t>
             </a:fld>
             <a:endParaRPr lang="en-AU"/>
           </a:p>
@@ -1428,7 +1430,7 @@
           <p:cNvPr id="6" name="Footer Placeholder 5">
             <a:extLst>
               <a:ext uri="{FF2B5EF4-FFF2-40B4-BE49-F238E27FC236}">
-                <a16:creationId xmlns:a16="http://schemas.microsoft.com/office/drawing/2014/main" id="{A7AC04CB-F699-445B-9DB1-1AA6365BC2A5}"/>
+                <a16:creationId xmlns="" xmlns:a16="http://schemas.microsoft.com/office/drawing/2014/main" id="{A7AC04CB-F699-445B-9DB1-1AA6365BC2A5}"/>
               </a:ext>
             </a:extLst>
           </p:cNvPr>
@@ -1453,7 +1455,7 @@
           <p:cNvPr id="7" name="Slide Number Placeholder 6">
             <a:extLst>
               <a:ext uri="{FF2B5EF4-FFF2-40B4-BE49-F238E27FC236}">
-                <a16:creationId xmlns:a16="http://schemas.microsoft.com/office/drawing/2014/main" id="{59152100-94B0-45A7-9D20-6E8A57DBB820}"/>
+                <a16:creationId xmlns="" xmlns:a16="http://schemas.microsoft.com/office/drawing/2014/main" id="{59152100-94B0-45A7-9D20-6E8A57DBB820}"/>
               </a:ext>
             </a:extLst>
           </p:cNvPr>
@@ -1512,7 +1514,7 @@
           <p:cNvPr id="2" name="Title 1">
             <a:extLst>
               <a:ext uri="{FF2B5EF4-FFF2-40B4-BE49-F238E27FC236}">
-                <a16:creationId xmlns:a16="http://schemas.microsoft.com/office/drawing/2014/main" id="{25832D18-85BE-4274-BF2D-978175A05C83}"/>
+                <a16:creationId xmlns="" xmlns:a16="http://schemas.microsoft.com/office/drawing/2014/main" id="{25832D18-85BE-4274-BF2D-978175A05C83}"/>
               </a:ext>
             </a:extLst>
           </p:cNvPr>
@@ -1546,7 +1548,7 @@
           <p:cNvPr id="3" name="Text Placeholder 2">
             <a:extLst>
               <a:ext uri="{FF2B5EF4-FFF2-40B4-BE49-F238E27FC236}">
-                <a16:creationId xmlns:a16="http://schemas.microsoft.com/office/drawing/2014/main" id="{8CE3A622-65BE-4BEF-9F24-5D01DBC3594A}"/>
+                <a16:creationId xmlns="" xmlns:a16="http://schemas.microsoft.com/office/drawing/2014/main" id="{8CE3A622-65BE-4BEF-9F24-5D01DBC3594A}"/>
               </a:ext>
             </a:extLst>
           </p:cNvPr>
@@ -1617,7 +1619,7 @@
           <p:cNvPr id="4" name="Content Placeholder 3">
             <a:extLst>
               <a:ext uri="{FF2B5EF4-FFF2-40B4-BE49-F238E27FC236}">
-                <a16:creationId xmlns:a16="http://schemas.microsoft.com/office/drawing/2014/main" id="{0B0BE855-7F6A-49FD-941C-F15BFDD10ECB}"/>
+                <a16:creationId xmlns="" xmlns:a16="http://schemas.microsoft.com/office/drawing/2014/main" id="{0B0BE855-7F6A-49FD-941C-F15BFDD10ECB}"/>
               </a:ext>
             </a:extLst>
           </p:cNvPr>
@@ -1680,7 +1682,7 @@
           <p:cNvPr id="5" name="Text Placeholder 4">
             <a:extLst>
               <a:ext uri="{FF2B5EF4-FFF2-40B4-BE49-F238E27FC236}">
-                <a16:creationId xmlns:a16="http://schemas.microsoft.com/office/drawing/2014/main" id="{DC722622-3962-4E7A-B4CC-F417CA047599}"/>
+                <a16:creationId xmlns="" xmlns:a16="http://schemas.microsoft.com/office/drawing/2014/main" id="{DC722622-3962-4E7A-B4CC-F417CA047599}"/>
               </a:ext>
             </a:extLst>
           </p:cNvPr>
@@ -1751,7 +1753,7 @@
           <p:cNvPr id="6" name="Content Placeholder 5">
             <a:extLst>
               <a:ext uri="{FF2B5EF4-FFF2-40B4-BE49-F238E27FC236}">
-                <a16:creationId xmlns:a16="http://schemas.microsoft.com/office/drawing/2014/main" id="{D2A0CA05-FAC2-4CBB-85E6-FCBD3A716092}"/>
+                <a16:creationId xmlns="" xmlns:a16="http://schemas.microsoft.com/office/drawing/2014/main" id="{D2A0CA05-FAC2-4CBB-85E6-FCBD3A716092}"/>
               </a:ext>
             </a:extLst>
           </p:cNvPr>
@@ -1814,7 +1816,7 @@
           <p:cNvPr id="7" name="Date Placeholder 6">
             <a:extLst>
               <a:ext uri="{FF2B5EF4-FFF2-40B4-BE49-F238E27FC236}">
-                <a16:creationId xmlns:a16="http://schemas.microsoft.com/office/drawing/2014/main" id="{6AE86014-24BD-4238-9160-93F6E8C26C17}"/>
+                <a16:creationId xmlns="" xmlns:a16="http://schemas.microsoft.com/office/drawing/2014/main" id="{6AE86014-24BD-4238-9160-93F6E8C26C17}"/>
               </a:ext>
             </a:extLst>
           </p:cNvPr>
@@ -1832,7 +1834,7 @@
           <a:p>
             <a:fld id="{C169E291-5783-4E82-882C-941255731AFB}" type="datetimeFigureOut">
               <a:rPr lang="en-AU" smtClean="0"/>
-              <a:t>21/07/2023</a:t>
+              <a:t>27/07/2023</a:t>
             </a:fld>
             <a:endParaRPr lang="en-AU"/>
           </a:p>
@@ -1843,7 +1845,7 @@
           <p:cNvPr id="8" name="Footer Placeholder 7">
             <a:extLst>
               <a:ext uri="{FF2B5EF4-FFF2-40B4-BE49-F238E27FC236}">
-                <a16:creationId xmlns:a16="http://schemas.microsoft.com/office/drawing/2014/main" id="{217274AB-B044-499F-A514-F14D3C3BA2A3}"/>
+                <a16:creationId xmlns="" xmlns:a16="http://schemas.microsoft.com/office/drawing/2014/main" id="{217274AB-B044-499F-A514-F14D3C3BA2A3}"/>
               </a:ext>
             </a:extLst>
           </p:cNvPr>
@@ -1868,7 +1870,7 @@
           <p:cNvPr id="9" name="Slide Number Placeholder 8">
             <a:extLst>
               <a:ext uri="{FF2B5EF4-FFF2-40B4-BE49-F238E27FC236}">
-                <a16:creationId xmlns:a16="http://schemas.microsoft.com/office/drawing/2014/main" id="{59AC322A-D958-44CF-A5BE-5BB074093CFC}"/>
+                <a16:creationId xmlns="" xmlns:a16="http://schemas.microsoft.com/office/drawing/2014/main" id="{59AC322A-D958-44CF-A5BE-5BB074093CFC}"/>
               </a:ext>
             </a:extLst>
           </p:cNvPr>
@@ -1927,7 +1929,7 @@
           <p:cNvPr id="2" name="Title 1">
             <a:extLst>
               <a:ext uri="{FF2B5EF4-FFF2-40B4-BE49-F238E27FC236}">
-                <a16:creationId xmlns:a16="http://schemas.microsoft.com/office/drawing/2014/main" id="{F797BBF9-E6CF-42BA-9CB5-CFA6AF23D584}"/>
+                <a16:creationId xmlns="" xmlns:a16="http://schemas.microsoft.com/office/drawing/2014/main" id="{F797BBF9-E6CF-42BA-9CB5-CFA6AF23D584}"/>
               </a:ext>
             </a:extLst>
           </p:cNvPr>
@@ -1956,7 +1958,7 @@
           <p:cNvPr id="3" name="Date Placeholder 2">
             <a:extLst>
               <a:ext uri="{FF2B5EF4-FFF2-40B4-BE49-F238E27FC236}">
-                <a16:creationId xmlns:a16="http://schemas.microsoft.com/office/drawing/2014/main" id="{ABF488AA-98C4-4CBE-BF0C-28394E76A784}"/>
+                <a16:creationId xmlns="" xmlns:a16="http://schemas.microsoft.com/office/drawing/2014/main" id="{ABF488AA-98C4-4CBE-BF0C-28394E76A784}"/>
               </a:ext>
             </a:extLst>
           </p:cNvPr>
@@ -1974,7 +1976,7 @@
           <a:p>
             <a:fld id="{C169E291-5783-4E82-882C-941255731AFB}" type="datetimeFigureOut">
               <a:rPr lang="en-AU" smtClean="0"/>
-              <a:t>21/07/2023</a:t>
+              <a:t>27/07/2023</a:t>
             </a:fld>
             <a:endParaRPr lang="en-AU"/>
           </a:p>
@@ -1985,7 +1987,7 @@
           <p:cNvPr id="4" name="Footer Placeholder 3">
             <a:extLst>
               <a:ext uri="{FF2B5EF4-FFF2-40B4-BE49-F238E27FC236}">
-                <a16:creationId xmlns:a16="http://schemas.microsoft.com/office/drawing/2014/main" id="{C954A7E5-466B-49D4-8D17-D47A437A31CA}"/>
+                <a16:creationId xmlns="" xmlns:a16="http://schemas.microsoft.com/office/drawing/2014/main" id="{C954A7E5-466B-49D4-8D17-D47A437A31CA}"/>
               </a:ext>
             </a:extLst>
           </p:cNvPr>
@@ -2010,7 +2012,7 @@
           <p:cNvPr id="5" name="Slide Number Placeholder 4">
             <a:extLst>
               <a:ext uri="{FF2B5EF4-FFF2-40B4-BE49-F238E27FC236}">
-                <a16:creationId xmlns:a16="http://schemas.microsoft.com/office/drawing/2014/main" id="{6AA1A73C-B7E5-4826-93A5-1BAAC4B51647}"/>
+                <a16:creationId xmlns="" xmlns:a16="http://schemas.microsoft.com/office/drawing/2014/main" id="{6AA1A73C-B7E5-4826-93A5-1BAAC4B51647}"/>
               </a:ext>
             </a:extLst>
           </p:cNvPr>
@@ -2069,7 +2071,7 @@
           <p:cNvPr id="2" name="Date Placeholder 1">
             <a:extLst>
               <a:ext uri="{FF2B5EF4-FFF2-40B4-BE49-F238E27FC236}">
-                <a16:creationId xmlns:a16="http://schemas.microsoft.com/office/drawing/2014/main" id="{27A8E304-60E1-4D2D-B83B-3F876C664749}"/>
+                <a16:creationId xmlns="" xmlns:a16="http://schemas.microsoft.com/office/drawing/2014/main" id="{27A8E304-60E1-4D2D-B83B-3F876C664749}"/>
               </a:ext>
             </a:extLst>
           </p:cNvPr>
@@ -2087,7 +2089,7 @@
           <a:p>
             <a:fld id="{C169E291-5783-4E82-882C-941255731AFB}" type="datetimeFigureOut">
               <a:rPr lang="en-AU" smtClean="0"/>
-              <a:t>21/07/2023</a:t>
+              <a:t>27/07/2023</a:t>
             </a:fld>
             <a:endParaRPr lang="en-AU"/>
           </a:p>
@@ -2098,7 +2100,7 @@
           <p:cNvPr id="3" name="Footer Placeholder 2">
             <a:extLst>
               <a:ext uri="{FF2B5EF4-FFF2-40B4-BE49-F238E27FC236}">
-                <a16:creationId xmlns:a16="http://schemas.microsoft.com/office/drawing/2014/main" id="{B79D68BA-6DC5-4637-9116-4FB0CB84B327}"/>
+                <a16:creationId xmlns="" xmlns:a16="http://schemas.microsoft.com/office/drawing/2014/main" id="{B79D68BA-6DC5-4637-9116-4FB0CB84B327}"/>
               </a:ext>
             </a:extLst>
           </p:cNvPr>
@@ -2123,7 +2125,7 @@
           <p:cNvPr id="4" name="Slide Number Placeholder 3">
             <a:extLst>
               <a:ext uri="{FF2B5EF4-FFF2-40B4-BE49-F238E27FC236}">
-                <a16:creationId xmlns:a16="http://schemas.microsoft.com/office/drawing/2014/main" id="{237DA611-D6AC-480A-B80A-E300A0AFE5F7}"/>
+                <a16:creationId xmlns="" xmlns:a16="http://schemas.microsoft.com/office/drawing/2014/main" id="{237DA611-D6AC-480A-B80A-E300A0AFE5F7}"/>
               </a:ext>
             </a:extLst>
           </p:cNvPr>
@@ -2182,7 +2184,7 @@
           <p:cNvPr id="2" name="Title 1">
             <a:extLst>
               <a:ext uri="{FF2B5EF4-FFF2-40B4-BE49-F238E27FC236}">
-                <a16:creationId xmlns:a16="http://schemas.microsoft.com/office/drawing/2014/main" id="{5D2CD4D7-D782-4C26-B82A-442A2230C6CE}"/>
+                <a16:creationId xmlns="" xmlns:a16="http://schemas.microsoft.com/office/drawing/2014/main" id="{5D2CD4D7-D782-4C26-B82A-442A2230C6CE}"/>
               </a:ext>
             </a:extLst>
           </p:cNvPr>
@@ -2220,7 +2222,7 @@
           <p:cNvPr id="3" name="Content Placeholder 2">
             <a:extLst>
               <a:ext uri="{FF2B5EF4-FFF2-40B4-BE49-F238E27FC236}">
-                <a16:creationId xmlns:a16="http://schemas.microsoft.com/office/drawing/2014/main" id="{BAF63710-26BB-4D2F-9417-7F515565CFC4}"/>
+                <a16:creationId xmlns="" xmlns:a16="http://schemas.microsoft.com/office/drawing/2014/main" id="{BAF63710-26BB-4D2F-9417-7F515565CFC4}"/>
               </a:ext>
             </a:extLst>
           </p:cNvPr>
@@ -2311,7 +2313,7 @@
           <p:cNvPr id="4" name="Text Placeholder 3">
             <a:extLst>
               <a:ext uri="{FF2B5EF4-FFF2-40B4-BE49-F238E27FC236}">
-                <a16:creationId xmlns:a16="http://schemas.microsoft.com/office/drawing/2014/main" id="{30E2E2A0-A33A-473F-A45E-630917915E9E}"/>
+                <a16:creationId xmlns="" xmlns:a16="http://schemas.microsoft.com/office/drawing/2014/main" id="{30E2E2A0-A33A-473F-A45E-630917915E9E}"/>
               </a:ext>
             </a:extLst>
           </p:cNvPr>
@@ -2382,7 +2384,7 @@
           <p:cNvPr id="5" name="Date Placeholder 4">
             <a:extLst>
               <a:ext uri="{FF2B5EF4-FFF2-40B4-BE49-F238E27FC236}">
-                <a16:creationId xmlns:a16="http://schemas.microsoft.com/office/drawing/2014/main" id="{808F92C6-AD52-4E80-8D24-763B32DF24C4}"/>
+                <a16:creationId xmlns="" xmlns:a16="http://schemas.microsoft.com/office/drawing/2014/main" id="{808F92C6-AD52-4E80-8D24-763B32DF24C4}"/>
               </a:ext>
             </a:extLst>
           </p:cNvPr>
@@ -2400,7 +2402,7 @@
           <a:p>
             <a:fld id="{C169E291-5783-4E82-882C-941255731AFB}" type="datetimeFigureOut">
               <a:rPr lang="en-AU" smtClean="0"/>
-              <a:t>21/07/2023</a:t>
+              <a:t>27/07/2023</a:t>
             </a:fld>
             <a:endParaRPr lang="en-AU"/>
           </a:p>
@@ -2411,7 +2413,7 @@
           <p:cNvPr id="6" name="Footer Placeholder 5">
             <a:extLst>
               <a:ext uri="{FF2B5EF4-FFF2-40B4-BE49-F238E27FC236}">
-                <a16:creationId xmlns:a16="http://schemas.microsoft.com/office/drawing/2014/main" id="{53AB23AC-8E33-4F39-BA10-240404658A71}"/>
+                <a16:creationId xmlns="" xmlns:a16="http://schemas.microsoft.com/office/drawing/2014/main" id="{53AB23AC-8E33-4F39-BA10-240404658A71}"/>
               </a:ext>
             </a:extLst>
           </p:cNvPr>
@@ -2436,7 +2438,7 @@
           <p:cNvPr id="7" name="Slide Number Placeholder 6">
             <a:extLst>
               <a:ext uri="{FF2B5EF4-FFF2-40B4-BE49-F238E27FC236}">
-                <a16:creationId xmlns:a16="http://schemas.microsoft.com/office/drawing/2014/main" id="{31ACB03A-40A7-423D-9DF4-4DFE816E4333}"/>
+                <a16:creationId xmlns="" xmlns:a16="http://schemas.microsoft.com/office/drawing/2014/main" id="{31ACB03A-40A7-423D-9DF4-4DFE816E4333}"/>
               </a:ext>
             </a:extLst>
           </p:cNvPr>
@@ -2495,7 +2497,7 @@
           <p:cNvPr id="2" name="Title 1">
             <a:extLst>
               <a:ext uri="{FF2B5EF4-FFF2-40B4-BE49-F238E27FC236}">
-                <a16:creationId xmlns:a16="http://schemas.microsoft.com/office/drawing/2014/main" id="{BE7608F9-F33B-4A6C-95C8-10CB74B79D4C}"/>
+                <a16:creationId xmlns="" xmlns:a16="http://schemas.microsoft.com/office/drawing/2014/main" id="{BE7608F9-F33B-4A6C-95C8-10CB74B79D4C}"/>
               </a:ext>
             </a:extLst>
           </p:cNvPr>
@@ -2533,7 +2535,7 @@
           <p:cNvPr id="3" name="Picture Placeholder 2">
             <a:extLst>
               <a:ext uri="{FF2B5EF4-FFF2-40B4-BE49-F238E27FC236}">
-                <a16:creationId xmlns:a16="http://schemas.microsoft.com/office/drawing/2014/main" id="{F189C68D-5F76-4234-B995-7F1CB010D46D}"/>
+                <a16:creationId xmlns="" xmlns:a16="http://schemas.microsoft.com/office/drawing/2014/main" id="{F189C68D-5F76-4234-B995-7F1CB010D46D}"/>
               </a:ext>
             </a:extLst>
           </p:cNvPr>
@@ -2600,7 +2602,7 @@
           <p:cNvPr id="4" name="Text Placeholder 3">
             <a:extLst>
               <a:ext uri="{FF2B5EF4-FFF2-40B4-BE49-F238E27FC236}">
-                <a16:creationId xmlns:a16="http://schemas.microsoft.com/office/drawing/2014/main" id="{2860FFC7-28A6-44EB-BF35-C93454765A69}"/>
+                <a16:creationId xmlns="" xmlns:a16="http://schemas.microsoft.com/office/drawing/2014/main" id="{2860FFC7-28A6-44EB-BF35-C93454765A69}"/>
               </a:ext>
             </a:extLst>
           </p:cNvPr>
@@ -2671,7 +2673,7 @@
           <p:cNvPr id="5" name="Date Placeholder 4">
             <a:extLst>
               <a:ext uri="{FF2B5EF4-FFF2-40B4-BE49-F238E27FC236}">
-                <a16:creationId xmlns:a16="http://schemas.microsoft.com/office/drawing/2014/main" id="{DBD64114-0430-4E55-8284-387B8769C357}"/>
+                <a16:creationId xmlns="" xmlns:a16="http://schemas.microsoft.com/office/drawing/2014/main" id="{DBD64114-0430-4E55-8284-387B8769C357}"/>
               </a:ext>
             </a:extLst>
           </p:cNvPr>
@@ -2689,7 +2691,7 @@
           <a:p>
             <a:fld id="{C169E291-5783-4E82-882C-941255731AFB}" type="datetimeFigureOut">
               <a:rPr lang="en-AU" smtClean="0"/>
-              <a:t>21/07/2023</a:t>
+              <a:t>27/07/2023</a:t>
             </a:fld>
             <a:endParaRPr lang="en-AU"/>
           </a:p>
@@ -2700,7 +2702,7 @@
           <p:cNvPr id="6" name="Footer Placeholder 5">
             <a:extLst>
               <a:ext uri="{FF2B5EF4-FFF2-40B4-BE49-F238E27FC236}">
-                <a16:creationId xmlns:a16="http://schemas.microsoft.com/office/drawing/2014/main" id="{E89C353A-FE62-4DE1-92CB-617F920E3D03}"/>
+                <a16:creationId xmlns="" xmlns:a16="http://schemas.microsoft.com/office/drawing/2014/main" id="{E89C353A-FE62-4DE1-92CB-617F920E3D03}"/>
               </a:ext>
             </a:extLst>
           </p:cNvPr>
@@ -2725,7 +2727,7 @@
           <p:cNvPr id="7" name="Slide Number Placeholder 6">
             <a:extLst>
               <a:ext uri="{FF2B5EF4-FFF2-40B4-BE49-F238E27FC236}">
-                <a16:creationId xmlns:a16="http://schemas.microsoft.com/office/drawing/2014/main" id="{B532025E-C489-44D4-B722-67586F2AC109}"/>
+                <a16:creationId xmlns="" xmlns:a16="http://schemas.microsoft.com/office/drawing/2014/main" id="{B532025E-C489-44D4-B722-67586F2AC109}"/>
               </a:ext>
             </a:extLst>
           </p:cNvPr>
@@ -2789,7 +2791,7 @@
           <p:cNvPr id="2" name="Title Placeholder 1">
             <a:extLst>
               <a:ext uri="{FF2B5EF4-FFF2-40B4-BE49-F238E27FC236}">
-                <a16:creationId xmlns:a16="http://schemas.microsoft.com/office/drawing/2014/main" id="{0B197B9B-5871-4B81-AD65-F84902AC63C5}"/>
+                <a16:creationId xmlns="" xmlns:a16="http://schemas.microsoft.com/office/drawing/2014/main" id="{0B197B9B-5871-4B81-AD65-F84902AC63C5}"/>
               </a:ext>
             </a:extLst>
           </p:cNvPr>
@@ -2828,7 +2830,7 @@
           <p:cNvPr id="3" name="Text Placeholder 2">
             <a:extLst>
               <a:ext uri="{FF2B5EF4-FFF2-40B4-BE49-F238E27FC236}">
-                <a16:creationId xmlns:a16="http://schemas.microsoft.com/office/drawing/2014/main" id="{3207BEFE-8A0F-48B9-A0AC-F2A4B0A068EF}"/>
+                <a16:creationId xmlns="" xmlns:a16="http://schemas.microsoft.com/office/drawing/2014/main" id="{3207BEFE-8A0F-48B9-A0AC-F2A4B0A068EF}"/>
               </a:ext>
             </a:extLst>
           </p:cNvPr>
@@ -2896,7 +2898,7 @@
           <p:cNvPr id="4" name="Date Placeholder 3">
             <a:extLst>
               <a:ext uri="{FF2B5EF4-FFF2-40B4-BE49-F238E27FC236}">
-                <a16:creationId xmlns:a16="http://schemas.microsoft.com/office/drawing/2014/main" id="{76C13274-96D9-422C-B8DB-6D687919745C}"/>
+                <a16:creationId xmlns="" xmlns:a16="http://schemas.microsoft.com/office/drawing/2014/main" id="{76C13274-96D9-422C-B8DB-6D687919745C}"/>
               </a:ext>
             </a:extLst>
           </p:cNvPr>
@@ -2932,7 +2934,7 @@
           <a:p>
             <a:fld id="{C169E291-5783-4E82-882C-941255731AFB}" type="datetimeFigureOut">
               <a:rPr lang="en-AU" smtClean="0"/>
-              <a:t>21/07/2023</a:t>
+              <a:t>27/07/2023</a:t>
             </a:fld>
             <a:endParaRPr lang="en-AU"/>
           </a:p>
@@ -2943,7 +2945,7 @@
           <p:cNvPr id="5" name="Footer Placeholder 4">
             <a:extLst>
               <a:ext uri="{FF2B5EF4-FFF2-40B4-BE49-F238E27FC236}">
-                <a16:creationId xmlns:a16="http://schemas.microsoft.com/office/drawing/2014/main" id="{B7123C8A-A853-4C2D-97B9-08D88C0A358A}"/>
+                <a16:creationId xmlns="" xmlns:a16="http://schemas.microsoft.com/office/drawing/2014/main" id="{B7123C8A-A853-4C2D-97B9-08D88C0A358A}"/>
               </a:ext>
             </a:extLst>
           </p:cNvPr>
@@ -2986,7 +2988,7 @@
           <p:cNvPr id="6" name="Slide Number Placeholder 5">
             <a:extLst>
               <a:ext uri="{FF2B5EF4-FFF2-40B4-BE49-F238E27FC236}">
-                <a16:creationId xmlns:a16="http://schemas.microsoft.com/office/drawing/2014/main" id="{BBDDD757-1CF8-4FC5-9613-BD71AE10D08D}"/>
+                <a16:creationId xmlns="" xmlns:a16="http://schemas.microsoft.com/office/drawing/2014/main" id="{BBDDD757-1CF8-4FC5-9613-BD71AE10D08D}"/>
               </a:ext>
             </a:extLst>
           </p:cNvPr>
@@ -3354,7 +3356,7 @@
           <p:cNvPr id="38" name="Rectangle 37">
             <a:extLst>
               <a:ext uri="{FF2B5EF4-FFF2-40B4-BE49-F238E27FC236}">
-                <a16:creationId xmlns:a16="http://schemas.microsoft.com/office/drawing/2014/main" id="{0AE9EA83-0AEE-4C92-ACC4-49DAFA53FBAF}"/>
+                <a16:creationId xmlns="" xmlns:a16="http://schemas.microsoft.com/office/drawing/2014/main" id="{0AE9EA83-0AEE-4C92-ACC4-49DAFA53FBAF}"/>
               </a:ext>
             </a:extLst>
           </p:cNvPr>
@@ -3400,7 +3402,7 @@
           <p:cNvPr id="6" name="Rounded Rectangle 32">
             <a:extLst>
               <a:ext uri="{FF2B5EF4-FFF2-40B4-BE49-F238E27FC236}">
-                <a16:creationId xmlns:a16="http://schemas.microsoft.com/office/drawing/2014/main" id="{35F64075-BCA6-43B0-864D-A4E10D235C8D}"/>
+                <a16:creationId xmlns="" xmlns:a16="http://schemas.microsoft.com/office/drawing/2014/main" id="{35F64075-BCA6-43B0-864D-A4E10D235C8D}"/>
               </a:ext>
             </a:extLst>
           </p:cNvPr>
@@ -3458,7 +3460,7 @@
           <p:cNvPr id="7" name="Rectangle 6">
             <a:extLst>
               <a:ext uri="{FF2B5EF4-FFF2-40B4-BE49-F238E27FC236}">
-                <a16:creationId xmlns:a16="http://schemas.microsoft.com/office/drawing/2014/main" id="{241D8F26-367A-4EE2-BC9B-4A97EE475F57}"/>
+                <a16:creationId xmlns="" xmlns:a16="http://schemas.microsoft.com/office/drawing/2014/main" id="{241D8F26-367A-4EE2-BC9B-4A97EE475F57}"/>
               </a:ext>
             </a:extLst>
           </p:cNvPr>
@@ -3532,7 +3534,7 @@
           <p:cNvPr id="8" name="Rectangle 7">
             <a:extLst>
               <a:ext uri="{FF2B5EF4-FFF2-40B4-BE49-F238E27FC236}">
-                <a16:creationId xmlns:a16="http://schemas.microsoft.com/office/drawing/2014/main" id="{583FBC17-A62F-4E87-B8DE-0F79DF4336A0}"/>
+                <a16:creationId xmlns="" xmlns:a16="http://schemas.microsoft.com/office/drawing/2014/main" id="{583FBC17-A62F-4E87-B8DE-0F79DF4336A0}"/>
               </a:ext>
             </a:extLst>
           </p:cNvPr>
@@ -3592,7 +3594,7 @@
           <p:cNvPr id="19" name="Group 18">
             <a:extLst>
               <a:ext uri="{FF2B5EF4-FFF2-40B4-BE49-F238E27FC236}">
-                <a16:creationId xmlns:a16="http://schemas.microsoft.com/office/drawing/2014/main" id="{C587FE1B-2243-4627-BC52-851BDA62444B}"/>
+                <a16:creationId xmlns="" xmlns:a16="http://schemas.microsoft.com/office/drawing/2014/main" id="{C587FE1B-2243-4627-BC52-851BDA62444B}"/>
               </a:ext>
             </a:extLst>
           </p:cNvPr>
@@ -3612,7 +3614,7 @@
             <p:cNvPr id="20" name="Picture 19">
               <a:extLst>
                 <a:ext uri="{FF2B5EF4-FFF2-40B4-BE49-F238E27FC236}">
-                  <a16:creationId xmlns:a16="http://schemas.microsoft.com/office/drawing/2014/main" id="{0F2E3E05-4A48-4C06-BA49-75E2E366C715}"/>
+                  <a16:creationId xmlns="" xmlns:a16="http://schemas.microsoft.com/office/drawing/2014/main" id="{0F2E3E05-4A48-4C06-BA49-75E2E366C715}"/>
                 </a:ext>
               </a:extLst>
             </p:cNvPr>
@@ -3642,7 +3644,7 @@
             <p:cNvPr id="21" name="Freeform 22">
               <a:extLst>
                 <a:ext uri="{FF2B5EF4-FFF2-40B4-BE49-F238E27FC236}">
-                  <a16:creationId xmlns:a16="http://schemas.microsoft.com/office/drawing/2014/main" id="{8413CF68-A7E3-43A0-B613-5438D5382AB1}"/>
+                  <a16:creationId xmlns="" xmlns:a16="http://schemas.microsoft.com/office/drawing/2014/main" id="{8413CF68-A7E3-43A0-B613-5438D5382AB1}"/>
                 </a:ext>
               </a:extLst>
             </p:cNvPr>
@@ -4054,7 +4056,7 @@
           <p:cNvPr id="22" name="TextBox 21">
             <a:extLst>
               <a:ext uri="{FF2B5EF4-FFF2-40B4-BE49-F238E27FC236}">
-                <a16:creationId xmlns:a16="http://schemas.microsoft.com/office/drawing/2014/main" id="{97653B96-F2E2-406B-A513-F42319FDB50F}"/>
+                <a16:creationId xmlns="" xmlns:a16="http://schemas.microsoft.com/office/drawing/2014/main" id="{97653B96-F2E2-406B-A513-F42319FDB50F}"/>
               </a:ext>
             </a:extLst>
           </p:cNvPr>
@@ -4097,7 +4099,7 @@
           <p:cNvPr id="23" name="Rectangle 22">
             <a:extLst>
               <a:ext uri="{FF2B5EF4-FFF2-40B4-BE49-F238E27FC236}">
-                <a16:creationId xmlns:a16="http://schemas.microsoft.com/office/drawing/2014/main" id="{3F004282-A136-4309-87A9-EA7DAA8C0919}"/>
+                <a16:creationId xmlns="" xmlns:a16="http://schemas.microsoft.com/office/drawing/2014/main" id="{3F004282-A136-4309-87A9-EA7DAA8C0919}"/>
               </a:ext>
             </a:extLst>
           </p:cNvPr>
@@ -4160,7 +4162,7 @@
           <p:cNvPr id="24" name="Rectangle 23">
             <a:extLst>
               <a:ext uri="{FF2B5EF4-FFF2-40B4-BE49-F238E27FC236}">
-                <a16:creationId xmlns:a16="http://schemas.microsoft.com/office/drawing/2014/main" id="{EC299E46-A9B5-4908-8BB9-FA2E5B1E6C0A}"/>
+                <a16:creationId xmlns="" xmlns:a16="http://schemas.microsoft.com/office/drawing/2014/main" id="{EC299E46-A9B5-4908-8BB9-FA2E5B1E6C0A}"/>
               </a:ext>
             </a:extLst>
           </p:cNvPr>
@@ -4330,7 +4332,7 @@
           <p:cNvPr id="33" name="Rectangle 32">
             <a:extLst>
               <a:ext uri="{FF2B5EF4-FFF2-40B4-BE49-F238E27FC236}">
-                <a16:creationId xmlns:a16="http://schemas.microsoft.com/office/drawing/2014/main" id="{E02B0EB1-C543-469A-90DE-9FA0F478E35F}"/>
+                <a16:creationId xmlns="" xmlns:a16="http://schemas.microsoft.com/office/drawing/2014/main" id="{E02B0EB1-C543-469A-90DE-9FA0F478E35F}"/>
               </a:ext>
             </a:extLst>
           </p:cNvPr>
@@ -4452,7 +4454,7 @@
           <p:cNvPr id="37" name="Picture 36">
             <a:extLst>
               <a:ext uri="{FF2B5EF4-FFF2-40B4-BE49-F238E27FC236}">
-                <a16:creationId xmlns:a16="http://schemas.microsoft.com/office/drawing/2014/main" id="{5FFDE39E-FECF-4D38-85AA-5F63230B9154}"/>
+                <a16:creationId xmlns="" xmlns:a16="http://schemas.microsoft.com/office/drawing/2014/main" id="{5FFDE39E-FECF-4D38-85AA-5F63230B9154}"/>
               </a:ext>
             </a:extLst>
           </p:cNvPr>
@@ -4482,7 +4484,7 @@
           <p:cNvPr id="1028" name="Picture 4" descr="James Arthur Gosling – GLOBAL PROGRAMMERS STORIES">
             <a:extLst>
               <a:ext uri="{FF2B5EF4-FFF2-40B4-BE49-F238E27FC236}">
-                <a16:creationId xmlns:a16="http://schemas.microsoft.com/office/drawing/2014/main" id="{F50B2B8C-B1E2-4FFD-AC8D-2BC1CF0FD607}"/>
+                <a16:creationId xmlns="" xmlns:a16="http://schemas.microsoft.com/office/drawing/2014/main" id="{F50B2B8C-B1E2-4FFD-AC8D-2BC1CF0FD607}"/>
               </a:ext>
             </a:extLst>
           </p:cNvPr>
@@ -4529,7 +4531,7 @@
           <p:cNvPr id="50" name="Rectangle 49">
             <a:extLst>
               <a:ext uri="{FF2B5EF4-FFF2-40B4-BE49-F238E27FC236}">
-                <a16:creationId xmlns:a16="http://schemas.microsoft.com/office/drawing/2014/main" id="{907BEB2A-D93E-46CB-95DF-04E16F0D1C0C}"/>
+                <a16:creationId xmlns="" xmlns:a16="http://schemas.microsoft.com/office/drawing/2014/main" id="{907BEB2A-D93E-46CB-95DF-04E16F0D1C0C}"/>
               </a:ext>
             </a:extLst>
           </p:cNvPr>
@@ -4604,7 +4606,7 @@
           <p:cNvPr id="53" name="TextBox 52">
             <a:extLst>
               <a:ext uri="{FF2B5EF4-FFF2-40B4-BE49-F238E27FC236}">
-                <a16:creationId xmlns:a16="http://schemas.microsoft.com/office/drawing/2014/main" id="{97E62140-1BE6-4659-9F83-22F2EE84A187}"/>
+                <a16:creationId xmlns="" xmlns:a16="http://schemas.microsoft.com/office/drawing/2014/main" id="{97E62140-1BE6-4659-9F83-22F2EE84A187}"/>
               </a:ext>
             </a:extLst>
           </p:cNvPr>
@@ -4677,7 +4679,7 @@
           <p:cNvPr id="56" name="Rounded Rectangle 33">
             <a:extLst>
               <a:ext uri="{FF2B5EF4-FFF2-40B4-BE49-F238E27FC236}">
-                <a16:creationId xmlns:a16="http://schemas.microsoft.com/office/drawing/2014/main" id="{7FF497DB-E694-458D-A891-9C1C5B46F501}"/>
+                <a16:creationId xmlns="" xmlns:a16="http://schemas.microsoft.com/office/drawing/2014/main" id="{7FF497DB-E694-458D-A891-9C1C5B46F501}"/>
               </a:ext>
             </a:extLst>
           </p:cNvPr>
@@ -4733,7 +4735,7 @@
           <p:cNvPr id="57" name="Rectangle 56">
             <a:extLst>
               <a:ext uri="{FF2B5EF4-FFF2-40B4-BE49-F238E27FC236}">
-                <a16:creationId xmlns:a16="http://schemas.microsoft.com/office/drawing/2014/main" id="{12FA83B6-2C9A-4C25-AA87-2D96491186D4}"/>
+                <a16:creationId xmlns="" xmlns:a16="http://schemas.microsoft.com/office/drawing/2014/main" id="{12FA83B6-2C9A-4C25-AA87-2D96491186D4}"/>
               </a:ext>
             </a:extLst>
           </p:cNvPr>
@@ -4802,7 +4804,7 @@
           <p:cNvPr id="58" name="Rectangle 57">
             <a:extLst>
               <a:ext uri="{FF2B5EF4-FFF2-40B4-BE49-F238E27FC236}">
-                <a16:creationId xmlns:a16="http://schemas.microsoft.com/office/drawing/2014/main" id="{5E92C9BC-9928-425D-9A7E-945E2516C972}"/>
+                <a16:creationId xmlns="" xmlns:a16="http://schemas.microsoft.com/office/drawing/2014/main" id="{5E92C9BC-9928-425D-9A7E-945E2516C972}"/>
               </a:ext>
             </a:extLst>
           </p:cNvPr>
@@ -4955,6 +4957,13 @@
   <p:clrMapOvr>
     <a:masterClrMapping/>
   </p:clrMapOvr>
+  <p:timing>
+    <p:tnLst>
+      <p:par>
+        <p:cTn id="1" dur="indefinite" restart="never" nodeType="tmRoot"/>
+      </p:par>
+    </p:tnLst>
+  </p:timing>
 </p:sld>
 </file>
 
@@ -4980,7 +4989,7 @@
           <p:cNvPr id="39" name="Rounded Rectangle 32">
             <a:extLst>
               <a:ext uri="{FF2B5EF4-FFF2-40B4-BE49-F238E27FC236}">
-                <a16:creationId xmlns:a16="http://schemas.microsoft.com/office/drawing/2014/main" id="{67494A8B-84F8-4589-A7C2-144157B38080}"/>
+                <a16:creationId xmlns="" xmlns:a16="http://schemas.microsoft.com/office/drawing/2014/main" id="{67494A8B-84F8-4589-A7C2-144157B38080}"/>
               </a:ext>
             </a:extLst>
           </p:cNvPr>
@@ -5038,7 +5047,7 @@
           <p:cNvPr id="40" name="Rectangle 39">
             <a:extLst>
               <a:ext uri="{FF2B5EF4-FFF2-40B4-BE49-F238E27FC236}">
-                <a16:creationId xmlns:a16="http://schemas.microsoft.com/office/drawing/2014/main" id="{DB5E68C8-8222-4645-A671-F970E83B7BA3}"/>
+                <a16:creationId xmlns="" xmlns:a16="http://schemas.microsoft.com/office/drawing/2014/main" id="{DB5E68C8-8222-4645-A671-F970E83B7BA3}"/>
               </a:ext>
             </a:extLst>
           </p:cNvPr>
@@ -5109,7 +5118,7 @@
           <p:cNvPr id="41" name="Rectangle 40">
             <a:extLst>
               <a:ext uri="{FF2B5EF4-FFF2-40B4-BE49-F238E27FC236}">
-                <a16:creationId xmlns:a16="http://schemas.microsoft.com/office/drawing/2014/main" id="{E979B7D3-30A0-41B4-990C-B750D66636E6}"/>
+                <a16:creationId xmlns="" xmlns:a16="http://schemas.microsoft.com/office/drawing/2014/main" id="{E979B7D3-30A0-41B4-990C-B750D66636E6}"/>
               </a:ext>
             </a:extLst>
           </p:cNvPr>
@@ -5158,7 +5167,7 @@
           <p:cNvPr id="35" name="Rounded Rectangle 32">
             <a:extLst>
               <a:ext uri="{FF2B5EF4-FFF2-40B4-BE49-F238E27FC236}">
-                <a16:creationId xmlns:a16="http://schemas.microsoft.com/office/drawing/2014/main" id="{08514579-093A-4E92-B859-ECF253136F29}"/>
+                <a16:creationId xmlns="" xmlns:a16="http://schemas.microsoft.com/office/drawing/2014/main" id="{08514579-093A-4E92-B859-ECF253136F29}"/>
               </a:ext>
             </a:extLst>
           </p:cNvPr>
@@ -5216,7 +5225,7 @@
           <p:cNvPr id="32" name="Rounded Rectangle 32">
             <a:extLst>
               <a:ext uri="{FF2B5EF4-FFF2-40B4-BE49-F238E27FC236}">
-                <a16:creationId xmlns:a16="http://schemas.microsoft.com/office/drawing/2014/main" id="{539D51A3-1763-4478-9BB4-86711F59982A}"/>
+                <a16:creationId xmlns="" xmlns:a16="http://schemas.microsoft.com/office/drawing/2014/main" id="{539D51A3-1763-4478-9BB4-86711F59982A}"/>
               </a:ext>
             </a:extLst>
           </p:cNvPr>
@@ -5274,7 +5283,7 @@
           <p:cNvPr id="8" name="Rectangle 7">
             <a:extLst>
               <a:ext uri="{FF2B5EF4-FFF2-40B4-BE49-F238E27FC236}">
-                <a16:creationId xmlns:a16="http://schemas.microsoft.com/office/drawing/2014/main" id="{583FBC17-A62F-4E87-B8DE-0F79DF4336A0}"/>
+                <a16:creationId xmlns="" xmlns:a16="http://schemas.microsoft.com/office/drawing/2014/main" id="{583FBC17-A62F-4E87-B8DE-0F79DF4336A0}"/>
               </a:ext>
             </a:extLst>
           </p:cNvPr>
@@ -5334,7 +5343,7 @@
           <p:cNvPr id="19" name="Group 18">
             <a:extLst>
               <a:ext uri="{FF2B5EF4-FFF2-40B4-BE49-F238E27FC236}">
-                <a16:creationId xmlns:a16="http://schemas.microsoft.com/office/drawing/2014/main" id="{C587FE1B-2243-4627-BC52-851BDA62444B}"/>
+                <a16:creationId xmlns="" xmlns:a16="http://schemas.microsoft.com/office/drawing/2014/main" id="{C587FE1B-2243-4627-BC52-851BDA62444B}"/>
               </a:ext>
             </a:extLst>
           </p:cNvPr>
@@ -5354,7 +5363,7 @@
             <p:cNvPr id="20" name="Picture 19">
               <a:extLst>
                 <a:ext uri="{FF2B5EF4-FFF2-40B4-BE49-F238E27FC236}">
-                  <a16:creationId xmlns:a16="http://schemas.microsoft.com/office/drawing/2014/main" id="{0F2E3E05-4A48-4C06-BA49-75E2E366C715}"/>
+                  <a16:creationId xmlns="" xmlns:a16="http://schemas.microsoft.com/office/drawing/2014/main" id="{0F2E3E05-4A48-4C06-BA49-75E2E366C715}"/>
                 </a:ext>
               </a:extLst>
             </p:cNvPr>
@@ -5384,7 +5393,7 @@
             <p:cNvPr id="21" name="Freeform 22">
               <a:extLst>
                 <a:ext uri="{FF2B5EF4-FFF2-40B4-BE49-F238E27FC236}">
-                  <a16:creationId xmlns:a16="http://schemas.microsoft.com/office/drawing/2014/main" id="{8413CF68-A7E3-43A0-B613-5438D5382AB1}"/>
+                  <a16:creationId xmlns="" xmlns:a16="http://schemas.microsoft.com/office/drawing/2014/main" id="{8413CF68-A7E3-43A0-B613-5438D5382AB1}"/>
                 </a:ext>
               </a:extLst>
             </p:cNvPr>
@@ -5796,7 +5805,7 @@
           <p:cNvPr id="22" name="TextBox 21">
             <a:extLst>
               <a:ext uri="{FF2B5EF4-FFF2-40B4-BE49-F238E27FC236}">
-                <a16:creationId xmlns:a16="http://schemas.microsoft.com/office/drawing/2014/main" id="{97653B96-F2E2-406B-A513-F42319FDB50F}"/>
+                <a16:creationId xmlns="" xmlns:a16="http://schemas.microsoft.com/office/drawing/2014/main" id="{97653B96-F2E2-406B-A513-F42319FDB50F}"/>
               </a:ext>
             </a:extLst>
           </p:cNvPr>
@@ -5839,7 +5848,7 @@
           <p:cNvPr id="33" name="Rectangle 32">
             <a:extLst>
               <a:ext uri="{FF2B5EF4-FFF2-40B4-BE49-F238E27FC236}">
-                <a16:creationId xmlns:a16="http://schemas.microsoft.com/office/drawing/2014/main" id="{E02B0EB1-C543-469A-90DE-9FA0F478E35F}"/>
+                <a16:creationId xmlns="" xmlns:a16="http://schemas.microsoft.com/office/drawing/2014/main" id="{E02B0EB1-C543-469A-90DE-9FA0F478E35F}"/>
               </a:ext>
             </a:extLst>
           </p:cNvPr>
@@ -5961,7 +5970,7 @@
           <p:cNvPr id="52" name="Picture 51">
             <a:extLst>
               <a:ext uri="{FF2B5EF4-FFF2-40B4-BE49-F238E27FC236}">
-                <a16:creationId xmlns:a16="http://schemas.microsoft.com/office/drawing/2014/main" id="{30CA3164-0494-491E-9850-E95589911E39}"/>
+                <a16:creationId xmlns="" xmlns:a16="http://schemas.microsoft.com/office/drawing/2014/main" id="{30CA3164-0494-491E-9850-E95589911E39}"/>
               </a:ext>
             </a:extLst>
           </p:cNvPr>
@@ -5991,7 +6000,7 @@
           <p:cNvPr id="2" name="Rectangle 1">
             <a:extLst>
               <a:ext uri="{FF2B5EF4-FFF2-40B4-BE49-F238E27FC236}">
-                <a16:creationId xmlns:a16="http://schemas.microsoft.com/office/drawing/2014/main" id="{4CCC6592-C31F-4A5F-B358-A9380D6B238F}"/>
+                <a16:creationId xmlns="" xmlns:a16="http://schemas.microsoft.com/office/drawing/2014/main" id="{4CCC6592-C31F-4A5F-B358-A9380D6B238F}"/>
               </a:ext>
             </a:extLst>
           </p:cNvPr>
@@ -6229,7 +6238,7 @@
           <p:cNvPr id="3" name="Rectangle 2">
             <a:extLst>
               <a:ext uri="{FF2B5EF4-FFF2-40B4-BE49-F238E27FC236}">
-                <a16:creationId xmlns:a16="http://schemas.microsoft.com/office/drawing/2014/main" id="{7D51986C-99A5-4382-B3BC-BFF4C0224D3C}"/>
+                <a16:creationId xmlns="" xmlns:a16="http://schemas.microsoft.com/office/drawing/2014/main" id="{7D51986C-99A5-4382-B3BC-BFF4C0224D3C}"/>
               </a:ext>
             </a:extLst>
           </p:cNvPr>
@@ -6278,7 +6287,7 @@
           <p:cNvPr id="9" name="Arrow: Down 8">
             <a:extLst>
               <a:ext uri="{FF2B5EF4-FFF2-40B4-BE49-F238E27FC236}">
-                <a16:creationId xmlns:a16="http://schemas.microsoft.com/office/drawing/2014/main" id="{2CFFDA68-7A8A-4A46-9B72-C14FA4ED56D8}"/>
+                <a16:creationId xmlns="" xmlns:a16="http://schemas.microsoft.com/office/drawing/2014/main" id="{2CFFDA68-7A8A-4A46-9B72-C14FA4ED56D8}"/>
               </a:ext>
             </a:extLst>
           </p:cNvPr>
@@ -6327,7 +6336,7 @@
           <p:cNvPr id="10" name="Rectangle 9">
             <a:extLst>
               <a:ext uri="{FF2B5EF4-FFF2-40B4-BE49-F238E27FC236}">
-                <a16:creationId xmlns:a16="http://schemas.microsoft.com/office/drawing/2014/main" id="{CACC4F07-BA92-4CB1-B2E0-B2CFFF66C3A1}"/>
+                <a16:creationId xmlns="" xmlns:a16="http://schemas.microsoft.com/office/drawing/2014/main" id="{CACC4F07-BA92-4CB1-B2E0-B2CFFF66C3A1}"/>
               </a:ext>
             </a:extLst>
           </p:cNvPr>
@@ -6386,7 +6395,7 @@
           <p:cNvPr id="28" name="Rectangle 27">
             <a:extLst>
               <a:ext uri="{FF2B5EF4-FFF2-40B4-BE49-F238E27FC236}">
-                <a16:creationId xmlns:a16="http://schemas.microsoft.com/office/drawing/2014/main" id="{965C5BC0-D239-49B2-8BEB-2D7C0E67465C}"/>
+                <a16:creationId xmlns="" xmlns:a16="http://schemas.microsoft.com/office/drawing/2014/main" id="{965C5BC0-D239-49B2-8BEB-2D7C0E67465C}"/>
               </a:ext>
             </a:extLst>
           </p:cNvPr>
@@ -6495,7 +6504,7 @@
           <p:cNvPr id="29" name="Rectangle 28">
             <a:extLst>
               <a:ext uri="{FF2B5EF4-FFF2-40B4-BE49-F238E27FC236}">
-                <a16:creationId xmlns:a16="http://schemas.microsoft.com/office/drawing/2014/main" id="{A7B1BCC4-C91A-49F2-82BB-84FA72878D75}"/>
+                <a16:creationId xmlns="" xmlns:a16="http://schemas.microsoft.com/office/drawing/2014/main" id="{A7B1BCC4-C91A-49F2-82BB-84FA72878D75}"/>
               </a:ext>
             </a:extLst>
           </p:cNvPr>
@@ -6545,7 +6554,7 @@
           <p:cNvPr id="30" name="Arrow: Down 29">
             <a:extLst>
               <a:ext uri="{FF2B5EF4-FFF2-40B4-BE49-F238E27FC236}">
-                <a16:creationId xmlns:a16="http://schemas.microsoft.com/office/drawing/2014/main" id="{3DE79B8C-B6E4-4E70-8CBC-FDA10F5C8F2B}"/>
+                <a16:creationId xmlns="" xmlns:a16="http://schemas.microsoft.com/office/drawing/2014/main" id="{3DE79B8C-B6E4-4E70-8CBC-FDA10F5C8F2B}"/>
               </a:ext>
             </a:extLst>
           </p:cNvPr>
@@ -6594,7 +6603,7 @@
           <p:cNvPr id="31" name="Rectangle 30">
             <a:extLst>
               <a:ext uri="{FF2B5EF4-FFF2-40B4-BE49-F238E27FC236}">
-                <a16:creationId xmlns:a16="http://schemas.microsoft.com/office/drawing/2014/main" id="{754700D2-5E01-4247-9879-97C7590D7579}"/>
+                <a16:creationId xmlns="" xmlns:a16="http://schemas.microsoft.com/office/drawing/2014/main" id="{754700D2-5E01-4247-9879-97C7590D7579}"/>
               </a:ext>
             </a:extLst>
           </p:cNvPr>
@@ -6653,7 +6662,7 @@
           <p:cNvPr id="34" name="Rectangle 33">
             <a:extLst>
               <a:ext uri="{FF2B5EF4-FFF2-40B4-BE49-F238E27FC236}">
-                <a16:creationId xmlns:a16="http://schemas.microsoft.com/office/drawing/2014/main" id="{163910D5-C953-43F3-9F0E-6643B54DECF7}"/>
+                <a16:creationId xmlns="" xmlns:a16="http://schemas.microsoft.com/office/drawing/2014/main" id="{163910D5-C953-43F3-9F0E-6643B54DECF7}"/>
               </a:ext>
             </a:extLst>
           </p:cNvPr>
@@ -6717,7 +6726,7 @@
           <p:cNvPr id="36" name="Rectangle 35">
             <a:extLst>
               <a:ext uri="{FF2B5EF4-FFF2-40B4-BE49-F238E27FC236}">
-                <a16:creationId xmlns:a16="http://schemas.microsoft.com/office/drawing/2014/main" id="{1270B330-D1E4-443A-AF54-D135E85547CC}"/>
+                <a16:creationId xmlns="" xmlns:a16="http://schemas.microsoft.com/office/drawing/2014/main" id="{1270B330-D1E4-443A-AF54-D135E85547CC}"/>
               </a:ext>
             </a:extLst>
           </p:cNvPr>
@@ -6781,7 +6790,7 @@
           <p:cNvPr id="42" name="Rectangle 41">
             <a:extLst>
               <a:ext uri="{FF2B5EF4-FFF2-40B4-BE49-F238E27FC236}">
-                <a16:creationId xmlns:a16="http://schemas.microsoft.com/office/drawing/2014/main" id="{D04DA425-BD96-448A-853F-828C2C82A04B}"/>
+                <a16:creationId xmlns="" xmlns:a16="http://schemas.microsoft.com/office/drawing/2014/main" id="{D04DA425-BD96-448A-853F-828C2C82A04B}"/>
               </a:ext>
             </a:extLst>
           </p:cNvPr>
@@ -6845,7 +6854,7 @@
           <p:cNvPr id="43" name="Rectangle 42">
             <a:extLst>
               <a:ext uri="{FF2B5EF4-FFF2-40B4-BE49-F238E27FC236}">
-                <a16:creationId xmlns:a16="http://schemas.microsoft.com/office/drawing/2014/main" id="{D34E9A21-1A58-46AB-9B04-B395A902D5FE}"/>
+                <a16:creationId xmlns="" xmlns:a16="http://schemas.microsoft.com/office/drawing/2014/main" id="{D34E9A21-1A58-46AB-9B04-B395A902D5FE}"/>
               </a:ext>
             </a:extLst>
           </p:cNvPr>
@@ -6904,7 +6913,7 @@
           <p:cNvPr id="44" name="Rectangle 43">
             <a:extLst>
               <a:ext uri="{FF2B5EF4-FFF2-40B4-BE49-F238E27FC236}">
-                <a16:creationId xmlns:a16="http://schemas.microsoft.com/office/drawing/2014/main" id="{2E06A917-F00D-45FD-BC29-B104B39745B8}"/>
+                <a16:creationId xmlns="" xmlns:a16="http://schemas.microsoft.com/office/drawing/2014/main" id="{2E06A917-F00D-45FD-BC29-B104B39745B8}"/>
               </a:ext>
             </a:extLst>
           </p:cNvPr>
@@ -6958,6 +6967,13 @@
   <p:clrMapOvr>
     <a:masterClrMapping/>
   </p:clrMapOvr>
+  <p:timing>
+    <p:tnLst>
+      <p:par>
+        <p:cTn id="1" dur="indefinite" restart="never" nodeType="tmRoot"/>
+      </p:par>
+    </p:tnLst>
+  </p:timing>
 </p:sld>
 </file>
 
@@ -6983,7 +6999,7 @@
           <p:cNvPr id="8" name="Rectangle 7">
             <a:extLst>
               <a:ext uri="{FF2B5EF4-FFF2-40B4-BE49-F238E27FC236}">
-                <a16:creationId xmlns:a16="http://schemas.microsoft.com/office/drawing/2014/main" id="{583FBC17-A62F-4E87-B8DE-0F79DF4336A0}"/>
+                <a16:creationId xmlns="" xmlns:a16="http://schemas.microsoft.com/office/drawing/2014/main" id="{583FBC17-A62F-4E87-B8DE-0F79DF4336A0}"/>
               </a:ext>
             </a:extLst>
           </p:cNvPr>
@@ -7043,7 +7059,7 @@
           <p:cNvPr id="19" name="Group 18">
             <a:extLst>
               <a:ext uri="{FF2B5EF4-FFF2-40B4-BE49-F238E27FC236}">
-                <a16:creationId xmlns:a16="http://schemas.microsoft.com/office/drawing/2014/main" id="{C587FE1B-2243-4627-BC52-851BDA62444B}"/>
+                <a16:creationId xmlns="" xmlns:a16="http://schemas.microsoft.com/office/drawing/2014/main" id="{C587FE1B-2243-4627-BC52-851BDA62444B}"/>
               </a:ext>
             </a:extLst>
           </p:cNvPr>
@@ -7063,7 +7079,7 @@
             <p:cNvPr id="20" name="Picture 19">
               <a:extLst>
                 <a:ext uri="{FF2B5EF4-FFF2-40B4-BE49-F238E27FC236}">
-                  <a16:creationId xmlns:a16="http://schemas.microsoft.com/office/drawing/2014/main" id="{0F2E3E05-4A48-4C06-BA49-75E2E366C715}"/>
+                  <a16:creationId xmlns="" xmlns:a16="http://schemas.microsoft.com/office/drawing/2014/main" id="{0F2E3E05-4A48-4C06-BA49-75E2E366C715}"/>
                 </a:ext>
               </a:extLst>
             </p:cNvPr>
@@ -7093,7 +7109,7 @@
             <p:cNvPr id="21" name="Freeform 22">
               <a:extLst>
                 <a:ext uri="{FF2B5EF4-FFF2-40B4-BE49-F238E27FC236}">
-                  <a16:creationId xmlns:a16="http://schemas.microsoft.com/office/drawing/2014/main" id="{8413CF68-A7E3-43A0-B613-5438D5382AB1}"/>
+                  <a16:creationId xmlns="" xmlns:a16="http://schemas.microsoft.com/office/drawing/2014/main" id="{8413CF68-A7E3-43A0-B613-5438D5382AB1}"/>
                 </a:ext>
               </a:extLst>
             </p:cNvPr>
@@ -7505,7 +7521,7 @@
           <p:cNvPr id="22" name="TextBox 21">
             <a:extLst>
               <a:ext uri="{FF2B5EF4-FFF2-40B4-BE49-F238E27FC236}">
-                <a16:creationId xmlns:a16="http://schemas.microsoft.com/office/drawing/2014/main" id="{97653B96-F2E2-406B-A513-F42319FDB50F}"/>
+                <a16:creationId xmlns="" xmlns:a16="http://schemas.microsoft.com/office/drawing/2014/main" id="{97653B96-F2E2-406B-A513-F42319FDB50F}"/>
               </a:ext>
             </a:extLst>
           </p:cNvPr>
@@ -7548,7 +7564,7 @@
           <p:cNvPr id="33" name="Rectangle 32">
             <a:extLst>
               <a:ext uri="{FF2B5EF4-FFF2-40B4-BE49-F238E27FC236}">
-                <a16:creationId xmlns:a16="http://schemas.microsoft.com/office/drawing/2014/main" id="{E02B0EB1-C543-469A-90DE-9FA0F478E35F}"/>
+                <a16:creationId xmlns="" xmlns:a16="http://schemas.microsoft.com/office/drawing/2014/main" id="{E02B0EB1-C543-469A-90DE-9FA0F478E35F}"/>
               </a:ext>
             </a:extLst>
           </p:cNvPr>
@@ -7670,7 +7686,7 @@
           <p:cNvPr id="5" name="Picture 4">
             <a:extLst>
               <a:ext uri="{FF2B5EF4-FFF2-40B4-BE49-F238E27FC236}">
-                <a16:creationId xmlns:a16="http://schemas.microsoft.com/office/drawing/2014/main" id="{8ACA1744-6AFE-83EE-AE44-BD8037F7B7AD}"/>
+                <a16:creationId xmlns="" xmlns:a16="http://schemas.microsoft.com/office/drawing/2014/main" id="{8ACA1744-6AFE-83EE-AE44-BD8037F7B7AD}"/>
               </a:ext>
             </a:extLst>
           </p:cNvPr>
@@ -7711,7 +7727,7 @@
           <p:cNvPr id="7" name="Picture 6">
             <a:extLst>
               <a:ext uri="{FF2B5EF4-FFF2-40B4-BE49-F238E27FC236}">
-                <a16:creationId xmlns:a16="http://schemas.microsoft.com/office/drawing/2014/main" id="{F404EAFB-2D66-F44C-CA64-7928759EE0BE}"/>
+                <a16:creationId xmlns="" xmlns:a16="http://schemas.microsoft.com/office/drawing/2014/main" id="{F404EAFB-2D66-F44C-CA64-7928759EE0BE}"/>
               </a:ext>
             </a:extLst>
           </p:cNvPr>
@@ -7752,7 +7768,7 @@
           <p:cNvPr id="15" name="Picture 14">
             <a:extLst>
               <a:ext uri="{FF2B5EF4-FFF2-40B4-BE49-F238E27FC236}">
-                <a16:creationId xmlns:a16="http://schemas.microsoft.com/office/drawing/2014/main" id="{5AC50144-AF05-C85A-104D-1288F48190FC}"/>
+                <a16:creationId xmlns="" xmlns:a16="http://schemas.microsoft.com/office/drawing/2014/main" id="{5AC50144-AF05-C85A-104D-1288F48190FC}"/>
               </a:ext>
             </a:extLst>
           </p:cNvPr>
@@ -7793,6 +7809,1719 @@
   <p:clrMapOvr>
     <a:masterClrMapping/>
   </p:clrMapOvr>
+  <p:timing>
+    <p:tnLst>
+      <p:par>
+        <p:cTn id="1" dur="indefinite" restart="never" nodeType="tmRoot"/>
+      </p:par>
+    </p:tnLst>
+  </p:timing>
+</p:sld>
+</file>
+
+<file path=ppt/slides/slide4.xml><?xml version="1.0" encoding="utf-8"?>
+<p:sld xmlns:a="http://schemas.openxmlformats.org/drawingml/2006/main" xmlns:r="http://schemas.openxmlformats.org/officeDocument/2006/relationships" xmlns:p="http://schemas.openxmlformats.org/presentationml/2006/main">
+  <p:cSld>
+    <p:spTree>
+      <p:nvGrpSpPr>
+        <p:cNvPr id="1" name=""/>
+        <p:cNvGrpSpPr/>
+        <p:nvPr/>
+      </p:nvGrpSpPr>
+      <p:grpSpPr>
+        <a:xfrm>
+          <a:off x="0" y="0"/>
+          <a:ext cx="0" cy="0"/>
+          <a:chOff x="0" y="0"/>
+          <a:chExt cx="0" cy="0"/>
+        </a:xfrm>
+      </p:grpSpPr>
+      <p:sp>
+        <p:nvSpPr>
+          <p:cNvPr id="8" name="Rectangle 7">
+            <a:extLst>
+              <a:ext uri="{FF2B5EF4-FFF2-40B4-BE49-F238E27FC236}">
+                <a16:creationId xmlns="" xmlns:a16="http://schemas.microsoft.com/office/drawing/2014/main" id="{583FBC17-A62F-4E87-B8DE-0F79DF4336A0}"/>
+              </a:ext>
+            </a:extLst>
+          </p:cNvPr>
+          <p:cNvSpPr/>
+          <p:nvPr/>
+        </p:nvSpPr>
+        <p:spPr>
+          <a:xfrm>
+            <a:off x="3824624" y="5691"/>
+            <a:ext cx="8367376" cy="770637"/>
+          </a:xfrm>
+          <a:prstGeom prst="rect">
+            <a:avLst/>
+          </a:prstGeom>
+          <a:solidFill>
+            <a:schemeClr val="bg1">
+              <a:lumMod val="95000"/>
+            </a:schemeClr>
+          </a:solidFill>
+          <a:ln>
+            <a:noFill/>
+          </a:ln>
+        </p:spPr>
+        <p:style>
+          <a:lnRef idx="2">
+            <a:schemeClr val="accent1">
+              <a:shade val="50000"/>
+            </a:schemeClr>
+          </a:lnRef>
+          <a:fillRef idx="1">
+            <a:schemeClr val="accent1"/>
+          </a:fillRef>
+          <a:effectRef idx="0">
+            <a:schemeClr val="accent1"/>
+          </a:effectRef>
+          <a:fontRef idx="minor">
+            <a:schemeClr val="lt1"/>
+          </a:fontRef>
+        </p:style>
+        <p:txBody>
+          <a:bodyPr rtlCol="0" anchor="ctr"/>
+          <a:lstStyle/>
+          <a:p>
+            <a:endParaRPr lang="en-AU" sz="800" dirty="0">
+              <a:solidFill>
+                <a:schemeClr val="bg1">
+                  <a:lumMod val="50000"/>
+                </a:schemeClr>
+              </a:solidFill>
+              <a:latin typeface="Oxygen" panose="02000503000000000000" pitchFamily="2" charset="0"/>
+            </a:endParaRPr>
+          </a:p>
+        </p:txBody>
+      </p:sp>
+      <p:grpSp>
+        <p:nvGrpSpPr>
+          <p:cNvPr id="19" name="Group 18">
+            <a:extLst>
+              <a:ext uri="{FF2B5EF4-FFF2-40B4-BE49-F238E27FC236}">
+                <a16:creationId xmlns="" xmlns:a16="http://schemas.microsoft.com/office/drawing/2014/main" id="{C587FE1B-2243-4627-BC52-851BDA62444B}"/>
+              </a:ext>
+            </a:extLst>
+          </p:cNvPr>
+          <p:cNvGrpSpPr/>
+          <p:nvPr/>
+        </p:nvGrpSpPr>
+        <p:grpSpPr>
+          <a:xfrm>
+            <a:off x="687804" y="156881"/>
+            <a:ext cx="2471777" cy="1145371"/>
+            <a:chOff x="4600575" y="2600315"/>
+            <a:chExt cx="2990850" cy="1385897"/>
+          </a:xfrm>
+        </p:grpSpPr>
+        <p:pic>
+          <p:nvPicPr>
+            <p:cNvPr id="20" name="Picture 19">
+              <a:extLst>
+                <a:ext uri="{FF2B5EF4-FFF2-40B4-BE49-F238E27FC236}">
+                  <a16:creationId xmlns="" xmlns:a16="http://schemas.microsoft.com/office/drawing/2014/main" id="{0F2E3E05-4A48-4C06-BA49-75E2E366C715}"/>
+                </a:ext>
+              </a:extLst>
+            </p:cNvPr>
+            <p:cNvPicPr>
+              <a:picLocks noChangeAspect="1"/>
+            </p:cNvPicPr>
+            <p:nvPr/>
+          </p:nvPicPr>
+          <p:blipFill>
+            <a:blip r:embed="rId2"/>
+            <a:stretch>
+              <a:fillRect/>
+            </a:stretch>
+          </p:blipFill>
+          <p:spPr>
+            <a:xfrm>
+              <a:off x="4600575" y="2871787"/>
+              <a:ext cx="2990850" cy="1114425"/>
+            </a:xfrm>
+            <a:prstGeom prst="rect">
+              <a:avLst/>
+            </a:prstGeom>
+          </p:spPr>
+        </p:pic>
+        <p:sp>
+          <p:nvSpPr>
+            <p:cNvPr id="21" name="Freeform 22">
+              <a:extLst>
+                <a:ext uri="{FF2B5EF4-FFF2-40B4-BE49-F238E27FC236}">
+                  <a16:creationId xmlns="" xmlns:a16="http://schemas.microsoft.com/office/drawing/2014/main" id="{8413CF68-A7E3-43A0-B613-5438D5382AB1}"/>
+                </a:ext>
+              </a:extLst>
+            </p:cNvPr>
+            <p:cNvSpPr/>
+            <p:nvPr/>
+          </p:nvSpPr>
+          <p:spPr>
+            <a:xfrm>
+              <a:off x="4739363" y="2600315"/>
+              <a:ext cx="971569" cy="971569"/>
+            </a:xfrm>
+            <a:custGeom>
+              <a:avLst/>
+              <a:gdLst>
+                <a:gd name="connsiteX0" fmla="*/ 1080000 w 2160000"/>
+                <a:gd name="connsiteY0" fmla="*/ 0 h 2160000"/>
+                <a:gd name="connsiteX1" fmla="*/ 2154424 w 2160000"/>
+                <a:gd name="connsiteY1" fmla="*/ 969576 h 2160000"/>
+                <a:gd name="connsiteX2" fmla="*/ 2157027 w 2160000"/>
+                <a:gd name="connsiteY2" fmla="*/ 1021127 h 2160000"/>
+                <a:gd name="connsiteX3" fmla="*/ 2159999 w 2160000"/>
+                <a:gd name="connsiteY3" fmla="*/ 1021127 h 2160000"/>
+                <a:gd name="connsiteX4" fmla="*/ 2159999 w 2160000"/>
+                <a:gd name="connsiteY4" fmla="*/ 1079980 h 2160000"/>
+                <a:gd name="connsiteX5" fmla="*/ 2160000 w 2160000"/>
+                <a:gd name="connsiteY5" fmla="*/ 1080000 h 2160000"/>
+                <a:gd name="connsiteX6" fmla="*/ 2159999 w 2160000"/>
+                <a:gd name="connsiteY6" fmla="*/ 1080021 h 2160000"/>
+                <a:gd name="connsiteX7" fmla="*/ 2159999 w 2160000"/>
+                <a:gd name="connsiteY7" fmla="*/ 1716639 h 2160000"/>
+                <a:gd name="connsiteX8" fmla="*/ 2157838 w 2160000"/>
+                <a:gd name="connsiteY8" fmla="*/ 1716639 h 2160000"/>
+                <a:gd name="connsiteX9" fmla="*/ 2160000 w 2160000"/>
+                <a:gd name="connsiteY9" fmla="*/ 1738544 h 2160000"/>
+                <a:gd name="connsiteX10" fmla="*/ 1891921 w 2160000"/>
+                <a:gd name="connsiteY10" fmla="*/ 2012333 h 2160000"/>
+                <a:gd name="connsiteX11" fmla="*/ 1623842 w 2160000"/>
+                <a:gd name="connsiteY11" fmla="*/ 1738544 h 2160000"/>
+                <a:gd name="connsiteX12" fmla="*/ 1626005 w 2160000"/>
+                <a:gd name="connsiteY12" fmla="*/ 1716639 h 2160000"/>
+                <a:gd name="connsiteX13" fmla="*/ 1620298 w 2160000"/>
+                <a:gd name="connsiteY13" fmla="*/ 1716639 h 2160000"/>
+                <a:gd name="connsiteX14" fmla="*/ 1620298 w 2160000"/>
+                <a:gd name="connsiteY14" fmla="*/ 1090950 h 2160000"/>
+                <a:gd name="connsiteX15" fmla="*/ 1618898 w 2160000"/>
+                <a:gd name="connsiteY15" fmla="*/ 1090937 h 2160000"/>
+                <a:gd name="connsiteX16" fmla="*/ 1620000 w 2160000"/>
+                <a:gd name="connsiteY16" fmla="*/ 1080000 h 2160000"/>
+                <a:gd name="connsiteX17" fmla="*/ 1080000 w 2160000"/>
+                <a:gd name="connsiteY17" fmla="*/ 540000 h 2160000"/>
+                <a:gd name="connsiteX18" fmla="*/ 540000 w 2160000"/>
+                <a:gd name="connsiteY18" fmla="*/ 1080000 h 2160000"/>
+                <a:gd name="connsiteX19" fmla="*/ 1080000 w 2160000"/>
+                <a:gd name="connsiteY19" fmla="*/ 1620000 h 2160000"/>
+                <a:gd name="connsiteX20" fmla="*/ 1172144 w 2160000"/>
+                <a:gd name="connsiteY20" fmla="*/ 1610711 h 2160000"/>
+                <a:gd name="connsiteX21" fmla="*/ 1192722 w 2160000"/>
+                <a:gd name="connsiteY21" fmla="*/ 1599542 h 2160000"/>
+                <a:gd name="connsiteX22" fmla="*/ 1205334 w 2160000"/>
+                <a:gd name="connsiteY22" fmla="*/ 1595627 h 2160000"/>
+                <a:gd name="connsiteX23" fmla="*/ 1218649 w 2160000"/>
+                <a:gd name="connsiteY23" fmla="*/ 1594482 h 2160000"/>
+                <a:gd name="connsiteX24" fmla="*/ 1273176 w 2160000"/>
+                <a:gd name="connsiteY24" fmla="*/ 1581875 h 2160000"/>
+                <a:gd name="connsiteX25" fmla="*/ 1277433 w 2160000"/>
+                <a:gd name="connsiteY25" fmla="*/ 1580379 h 2160000"/>
+                <a:gd name="connsiteX26" fmla="*/ 1297818 w 2160000"/>
+                <a:gd name="connsiteY26" fmla="*/ 1578324 h 2160000"/>
+                <a:gd name="connsiteX27" fmla="*/ 1567818 w 2160000"/>
+                <a:gd name="connsiteY27" fmla="*/ 1848324 h 2160000"/>
+                <a:gd name="connsiteX28" fmla="*/ 1469563 w 2160000"/>
+                <a:gd name="connsiteY28" fmla="*/ 2056669 h 2160000"/>
+                <a:gd name="connsiteX29" fmla="*/ 1412948 w 2160000"/>
+                <a:gd name="connsiteY29" fmla="*/ 2091019 h 2160000"/>
+                <a:gd name="connsiteX30" fmla="*/ 1398272 w 2160000"/>
+                <a:gd name="connsiteY30" fmla="*/ 2101498 h 2160000"/>
+                <a:gd name="connsiteX31" fmla="*/ 1374464 w 2160000"/>
+                <a:gd name="connsiteY31" fmla="*/ 2110955 h 2160000"/>
+                <a:gd name="connsiteX32" fmla="*/ 1376211 w 2160000"/>
+                <a:gd name="connsiteY32" fmla="*/ 2117860 h 2160000"/>
+                <a:gd name="connsiteX33" fmla="*/ 1321962 w 2160000"/>
+                <a:gd name="connsiteY33" fmla="*/ 2131809 h 2160000"/>
+                <a:gd name="connsiteX34" fmla="*/ 1306247 w 2160000"/>
+                <a:gd name="connsiteY34" fmla="*/ 2138051 h 2160000"/>
+                <a:gd name="connsiteX35" fmla="*/ 1267530 w 2160000"/>
+                <a:gd name="connsiteY35" fmla="*/ 2142656 h 2160000"/>
+                <a:gd name="connsiteX36" fmla="*/ 1190424 w 2160000"/>
+                <a:gd name="connsiteY36" fmla="*/ 2154424 h 2160000"/>
+                <a:gd name="connsiteX37" fmla="*/ 1080000 w 2160000"/>
+                <a:gd name="connsiteY37" fmla="*/ 2160000 h 2160000"/>
+                <a:gd name="connsiteX38" fmla="*/ 0 w 2160000"/>
+                <a:gd name="connsiteY38" fmla="*/ 1080000 h 2160000"/>
+                <a:gd name="connsiteX39" fmla="*/ 1080000 w 2160000"/>
+                <a:gd name="connsiteY39" fmla="*/ 0 h 2160000"/>
+              </a:gdLst>
+              <a:ahLst/>
+              <a:cxnLst>
+                <a:cxn ang="0">
+                  <a:pos x="connsiteX0" y="connsiteY0"/>
+                </a:cxn>
+                <a:cxn ang="0">
+                  <a:pos x="connsiteX1" y="connsiteY1"/>
+                </a:cxn>
+                <a:cxn ang="0">
+                  <a:pos x="connsiteX2" y="connsiteY2"/>
+                </a:cxn>
+                <a:cxn ang="0">
+                  <a:pos x="connsiteX3" y="connsiteY3"/>
+                </a:cxn>
+                <a:cxn ang="0">
+                  <a:pos x="connsiteX4" y="connsiteY4"/>
+                </a:cxn>
+                <a:cxn ang="0">
+                  <a:pos x="connsiteX5" y="connsiteY5"/>
+                </a:cxn>
+                <a:cxn ang="0">
+                  <a:pos x="connsiteX6" y="connsiteY6"/>
+                </a:cxn>
+                <a:cxn ang="0">
+                  <a:pos x="connsiteX7" y="connsiteY7"/>
+                </a:cxn>
+                <a:cxn ang="0">
+                  <a:pos x="connsiteX8" y="connsiteY8"/>
+                </a:cxn>
+                <a:cxn ang="0">
+                  <a:pos x="connsiteX9" y="connsiteY9"/>
+                </a:cxn>
+                <a:cxn ang="0">
+                  <a:pos x="connsiteX10" y="connsiteY10"/>
+                </a:cxn>
+                <a:cxn ang="0">
+                  <a:pos x="connsiteX11" y="connsiteY11"/>
+                </a:cxn>
+                <a:cxn ang="0">
+                  <a:pos x="connsiteX12" y="connsiteY12"/>
+                </a:cxn>
+                <a:cxn ang="0">
+                  <a:pos x="connsiteX13" y="connsiteY13"/>
+                </a:cxn>
+                <a:cxn ang="0">
+                  <a:pos x="connsiteX14" y="connsiteY14"/>
+                </a:cxn>
+                <a:cxn ang="0">
+                  <a:pos x="connsiteX15" y="connsiteY15"/>
+                </a:cxn>
+                <a:cxn ang="0">
+                  <a:pos x="connsiteX16" y="connsiteY16"/>
+                </a:cxn>
+                <a:cxn ang="0">
+                  <a:pos x="connsiteX17" y="connsiteY17"/>
+                </a:cxn>
+                <a:cxn ang="0">
+                  <a:pos x="connsiteX18" y="connsiteY18"/>
+                </a:cxn>
+                <a:cxn ang="0">
+                  <a:pos x="connsiteX19" y="connsiteY19"/>
+                </a:cxn>
+                <a:cxn ang="0">
+                  <a:pos x="connsiteX20" y="connsiteY20"/>
+                </a:cxn>
+                <a:cxn ang="0">
+                  <a:pos x="connsiteX21" y="connsiteY21"/>
+                </a:cxn>
+                <a:cxn ang="0">
+                  <a:pos x="connsiteX22" y="connsiteY22"/>
+                </a:cxn>
+                <a:cxn ang="0">
+                  <a:pos x="connsiteX23" y="connsiteY23"/>
+                </a:cxn>
+                <a:cxn ang="0">
+                  <a:pos x="connsiteX24" y="connsiteY24"/>
+                </a:cxn>
+                <a:cxn ang="0">
+                  <a:pos x="connsiteX25" y="connsiteY25"/>
+                </a:cxn>
+                <a:cxn ang="0">
+                  <a:pos x="connsiteX26" y="connsiteY26"/>
+                </a:cxn>
+                <a:cxn ang="0">
+                  <a:pos x="connsiteX27" y="connsiteY27"/>
+                </a:cxn>
+                <a:cxn ang="0">
+                  <a:pos x="connsiteX28" y="connsiteY28"/>
+                </a:cxn>
+                <a:cxn ang="0">
+                  <a:pos x="connsiteX29" y="connsiteY29"/>
+                </a:cxn>
+                <a:cxn ang="0">
+                  <a:pos x="connsiteX30" y="connsiteY30"/>
+                </a:cxn>
+                <a:cxn ang="0">
+                  <a:pos x="connsiteX31" y="connsiteY31"/>
+                </a:cxn>
+                <a:cxn ang="0">
+                  <a:pos x="connsiteX32" y="connsiteY32"/>
+                </a:cxn>
+                <a:cxn ang="0">
+                  <a:pos x="connsiteX33" y="connsiteY33"/>
+                </a:cxn>
+                <a:cxn ang="0">
+                  <a:pos x="connsiteX34" y="connsiteY34"/>
+                </a:cxn>
+                <a:cxn ang="0">
+                  <a:pos x="connsiteX35" y="connsiteY35"/>
+                </a:cxn>
+                <a:cxn ang="0">
+                  <a:pos x="connsiteX36" y="connsiteY36"/>
+                </a:cxn>
+                <a:cxn ang="0">
+                  <a:pos x="connsiteX37" y="connsiteY37"/>
+                </a:cxn>
+                <a:cxn ang="0">
+                  <a:pos x="connsiteX38" y="connsiteY38"/>
+                </a:cxn>
+                <a:cxn ang="0">
+                  <a:pos x="connsiteX39" y="connsiteY39"/>
+                </a:cxn>
+              </a:cxnLst>
+              <a:rect l="l" t="t" r="r" b="b"/>
+              <a:pathLst>
+                <a:path w="2160000" h="2160000">
+                  <a:moveTo>
+                    <a:pt x="1080000" y="0"/>
+                  </a:moveTo>
+                  <a:cubicBezTo>
+                    <a:pt x="1639189" y="0"/>
+                    <a:pt x="2099117" y="424979"/>
+                    <a:pt x="2154424" y="969576"/>
+                  </a:cubicBezTo>
+                  <a:lnTo>
+                    <a:pt x="2157027" y="1021127"/>
+                  </a:lnTo>
+                  <a:lnTo>
+                    <a:pt x="2159999" y="1021127"/>
+                  </a:lnTo>
+                  <a:lnTo>
+                    <a:pt x="2159999" y="1079980"/>
+                  </a:lnTo>
+                  <a:lnTo>
+                    <a:pt x="2160000" y="1080000"/>
+                  </a:lnTo>
+                  <a:lnTo>
+                    <a:pt x="2159999" y="1080021"/>
+                  </a:lnTo>
+                  <a:lnTo>
+                    <a:pt x="2159999" y="1716639"/>
+                  </a:lnTo>
+                  <a:lnTo>
+                    <a:pt x="2157838" y="1716639"/>
+                  </a:lnTo>
+                  <a:lnTo>
+                    <a:pt x="2160000" y="1738544"/>
+                  </a:lnTo>
+                  <a:cubicBezTo>
+                    <a:pt x="2160000" y="1889753"/>
+                    <a:pt x="2039977" y="2012333"/>
+                    <a:pt x="1891921" y="2012333"/>
+                  </a:cubicBezTo>
+                  <a:cubicBezTo>
+                    <a:pt x="1743865" y="2012333"/>
+                    <a:pt x="1623842" y="1889753"/>
+                    <a:pt x="1623842" y="1738544"/>
+                  </a:cubicBezTo>
+                  <a:lnTo>
+                    <a:pt x="1626005" y="1716639"/>
+                  </a:lnTo>
+                  <a:lnTo>
+                    <a:pt x="1620298" y="1716639"/>
+                  </a:lnTo>
+                  <a:lnTo>
+                    <a:pt x="1620298" y="1090950"/>
+                  </a:lnTo>
+                  <a:lnTo>
+                    <a:pt x="1618898" y="1090937"/>
+                  </a:lnTo>
+                  <a:lnTo>
+                    <a:pt x="1620000" y="1080000"/>
+                  </a:lnTo>
+                  <a:cubicBezTo>
+                    <a:pt x="1620000" y="781766"/>
+                    <a:pt x="1378234" y="540000"/>
+                    <a:pt x="1080000" y="540000"/>
+                  </a:cubicBezTo>
+                  <a:cubicBezTo>
+                    <a:pt x="781766" y="540000"/>
+                    <a:pt x="540000" y="781766"/>
+                    <a:pt x="540000" y="1080000"/>
+                  </a:cubicBezTo>
+                  <a:cubicBezTo>
+                    <a:pt x="540000" y="1378234"/>
+                    <a:pt x="781766" y="1620000"/>
+                    <a:pt x="1080000" y="1620000"/>
+                  </a:cubicBezTo>
+                  <a:lnTo>
+                    <a:pt x="1172144" y="1610711"/>
+                  </a:lnTo>
+                  <a:lnTo>
+                    <a:pt x="1192722" y="1599542"/>
+                  </a:lnTo>
+                  <a:lnTo>
+                    <a:pt x="1205334" y="1595627"/>
+                  </a:lnTo>
+                  <a:lnTo>
+                    <a:pt x="1218649" y="1594482"/>
+                  </a:lnTo>
+                  <a:cubicBezTo>
+                    <a:pt x="1237851" y="1591023"/>
+                    <a:pt x="1256099" y="1586790"/>
+                    <a:pt x="1273176" y="1581875"/>
+                  </a:cubicBezTo>
+                  <a:lnTo>
+                    <a:pt x="1277433" y="1580379"/>
+                  </a:lnTo>
+                  <a:lnTo>
+                    <a:pt x="1297818" y="1578324"/>
+                  </a:lnTo>
+                  <a:cubicBezTo>
+                    <a:pt x="1446935" y="1578324"/>
+                    <a:pt x="1567818" y="1699207"/>
+                    <a:pt x="1567818" y="1848324"/>
+                  </a:cubicBezTo>
+                  <a:cubicBezTo>
+                    <a:pt x="1567818" y="1932202"/>
+                    <a:pt x="1529570" y="2007147"/>
+                    <a:pt x="1469563" y="2056669"/>
+                  </a:cubicBezTo>
+                  <a:lnTo>
+                    <a:pt x="1412948" y="2091019"/>
+                  </a:lnTo>
+                  <a:lnTo>
+                    <a:pt x="1398272" y="2101498"/>
+                  </a:lnTo>
+                  <a:lnTo>
+                    <a:pt x="1374464" y="2110955"/>
+                  </a:lnTo>
+                  <a:lnTo>
+                    <a:pt x="1376211" y="2117860"/>
+                  </a:lnTo>
+                  <a:lnTo>
+                    <a:pt x="1321962" y="2131809"/>
+                  </a:lnTo>
+                  <a:lnTo>
+                    <a:pt x="1306247" y="2138051"/>
+                  </a:lnTo>
+                  <a:lnTo>
+                    <a:pt x="1267530" y="2142656"/>
+                  </a:lnTo>
+                  <a:lnTo>
+                    <a:pt x="1190424" y="2154424"/>
+                  </a:lnTo>
+                  <a:cubicBezTo>
+                    <a:pt x="1154118" y="2158111"/>
+                    <a:pt x="1117280" y="2160000"/>
+                    <a:pt x="1080000" y="2160000"/>
+                  </a:cubicBezTo>
+                  <a:cubicBezTo>
+                    <a:pt x="483532" y="2160000"/>
+                    <a:pt x="0" y="1676468"/>
+                    <a:pt x="0" y="1080000"/>
+                  </a:cubicBezTo>
+                  <a:cubicBezTo>
+                    <a:pt x="0" y="483532"/>
+                    <a:pt x="483532" y="0"/>
+                    <a:pt x="1080000" y="0"/>
+                  </a:cubicBezTo>
+                  <a:close/>
+                </a:path>
+              </a:pathLst>
+            </a:custGeom>
+            <a:solidFill>
+              <a:srgbClr val="FF8C52"/>
+            </a:solidFill>
+            <a:ln>
+              <a:solidFill>
+                <a:srgbClr val="FF8C52"/>
+              </a:solidFill>
+            </a:ln>
+          </p:spPr>
+          <p:style>
+            <a:lnRef idx="2">
+              <a:schemeClr val="accent1">
+                <a:shade val="50000"/>
+              </a:schemeClr>
+            </a:lnRef>
+            <a:fillRef idx="1">
+              <a:schemeClr val="accent1"/>
+            </a:fillRef>
+            <a:effectRef idx="0">
+              <a:schemeClr val="accent1"/>
+            </a:effectRef>
+            <a:fontRef idx="minor">
+              <a:schemeClr val="lt1"/>
+            </a:fontRef>
+          </p:style>
+          <p:txBody>
+            <a:bodyPr rtlCol="0" anchor="ctr"/>
+            <a:lstStyle/>
+            <a:p>
+              <a:pPr algn="ctr"/>
+              <a:endParaRPr lang="en-AU" dirty="0">
+                <a:latin typeface="Oxygen" panose="02000503000000000000" pitchFamily="2" charset="0"/>
+              </a:endParaRPr>
+            </a:p>
+          </p:txBody>
+        </p:sp>
+      </p:grpSp>
+      <p:sp>
+        <p:nvSpPr>
+          <p:cNvPr id="22" name="TextBox 21">
+            <a:extLst>
+              <a:ext uri="{FF2B5EF4-FFF2-40B4-BE49-F238E27FC236}">
+                <a16:creationId xmlns="" xmlns:a16="http://schemas.microsoft.com/office/drawing/2014/main" id="{97653B96-F2E2-406B-A513-F42319FDB50F}"/>
+              </a:ext>
+            </a:extLst>
+          </p:cNvPr>
+          <p:cNvSpPr txBox="1"/>
+          <p:nvPr/>
+        </p:nvSpPr>
+        <p:spPr>
+          <a:xfrm>
+            <a:off x="4698840" y="156881"/>
+            <a:ext cx="4411785" cy="369332"/>
+          </a:xfrm>
+          <a:prstGeom prst="rect">
+            <a:avLst/>
+          </a:prstGeom>
+          <a:noFill/>
+        </p:spPr>
+        <p:txBody>
+          <a:bodyPr wrap="none" rtlCol="0">
+            <a:spAutoFit/>
+          </a:bodyPr>
+          <a:lstStyle/>
+          <a:p>
+            <a:r>
+              <a:rPr lang="en-AU" b="1" dirty="0" smtClean="0">
+                <a:solidFill>
+                  <a:schemeClr val="bg2">
+                    <a:lumMod val="75000"/>
+                  </a:schemeClr>
+                </a:solidFill>
+                <a:latin typeface="Oxygen" panose="02000503000000000000" pitchFamily="2" charset="0"/>
+                <a:cs typeface="Arial" panose="020B0604020202020204" pitchFamily="34" charset="0"/>
+              </a:rPr>
+              <a:t>Control Flow Statements and Methods</a:t>
+            </a:r>
+            <a:endParaRPr lang="en-AU" b="1" dirty="0">
+              <a:solidFill>
+                <a:schemeClr val="bg2">
+                  <a:lumMod val="75000"/>
+                </a:schemeClr>
+              </a:solidFill>
+              <a:latin typeface="Oxygen" panose="02000503000000000000" pitchFamily="2" charset="0"/>
+              <a:cs typeface="Arial" panose="020B0604020202020204" pitchFamily="34" charset="0"/>
+            </a:endParaRPr>
+          </a:p>
+        </p:txBody>
+      </p:sp>
+      <p:sp>
+        <p:nvSpPr>
+          <p:cNvPr id="33" name="Rectangle 32">
+            <a:extLst>
+              <a:ext uri="{FF2B5EF4-FFF2-40B4-BE49-F238E27FC236}">
+                <a16:creationId xmlns="" xmlns:a16="http://schemas.microsoft.com/office/drawing/2014/main" id="{E02B0EB1-C543-469A-90DE-9FA0F478E35F}"/>
+              </a:ext>
+            </a:extLst>
+          </p:cNvPr>
+          <p:cNvSpPr/>
+          <p:nvPr/>
+        </p:nvSpPr>
+        <p:spPr>
+          <a:xfrm>
+            <a:off x="0" y="6543676"/>
+            <a:ext cx="12192000" cy="314325"/>
+          </a:xfrm>
+          <a:prstGeom prst="rect">
+            <a:avLst/>
+          </a:prstGeom>
+          <a:solidFill>
+            <a:schemeClr val="bg1">
+              <a:lumMod val="95000"/>
+            </a:schemeClr>
+          </a:solidFill>
+          <a:ln>
+            <a:noFill/>
+          </a:ln>
+        </p:spPr>
+        <p:style>
+          <a:lnRef idx="2">
+            <a:schemeClr val="accent1">
+              <a:shade val="50000"/>
+            </a:schemeClr>
+          </a:lnRef>
+          <a:fillRef idx="1">
+            <a:schemeClr val="accent1"/>
+          </a:fillRef>
+          <a:effectRef idx="0">
+            <a:schemeClr val="accent1"/>
+          </a:effectRef>
+          <a:fontRef idx="minor">
+            <a:schemeClr val="lt1"/>
+          </a:fontRef>
+        </p:style>
+        <p:txBody>
+          <a:bodyPr rtlCol="0" anchor="ctr"/>
+          <a:lstStyle/>
+          <a:p>
+            <a:r>
+              <a:rPr lang="en-US" sz="800" dirty="0">
+                <a:solidFill>
+                  <a:schemeClr val="bg1">
+                    <a:lumMod val="50000"/>
+                  </a:schemeClr>
+                </a:solidFill>
+                <a:latin typeface="Oxygen" panose="02000503000000000000" pitchFamily="2" charset="0"/>
+              </a:rPr>
+              <a:t>                                                                                                                            </a:t>
+            </a:r>
+            <a:r>
+              <a:rPr lang="en-US" sz="800" b="1" dirty="0">
+                <a:solidFill>
+                  <a:schemeClr val="bg1">
+                    <a:lumMod val="50000"/>
+                  </a:schemeClr>
+                </a:solidFill>
+                <a:latin typeface="Oxygen" panose="02000503000000000000" pitchFamily="2" charset="0"/>
+              </a:rPr>
+              <a:t> </a:t>
+            </a:r>
+            <a:r>
+              <a:rPr lang="en-US" sz="800" b="1" dirty="0">
+                <a:solidFill>
+                  <a:srgbClr val="FF8C52"/>
+                </a:solidFill>
+                <a:latin typeface="Oxygen" panose="02000503000000000000" pitchFamily="2" charset="0"/>
+              </a:rPr>
+              <a:t>CONCEPTION      &gt;&gt;      PRACTICE        &gt;&gt;        CONFIDENCE      &gt;&gt;       HIGHEST GRADES</a:t>
+            </a:r>
+            <a:r>
+              <a:rPr lang="en-US" sz="800" dirty="0">
+                <a:solidFill>
+                  <a:srgbClr val="FF8C52"/>
+                </a:solidFill>
+                <a:latin typeface="Oxygen" panose="02000503000000000000" pitchFamily="2" charset="0"/>
+              </a:rPr>
+              <a:t>                                                                             </a:t>
+            </a:r>
+            <a:r>
+              <a:rPr lang="en-US" sz="700" dirty="0">
+                <a:solidFill>
+                  <a:schemeClr val="bg1">
+                    <a:lumMod val="50000"/>
+                  </a:schemeClr>
+                </a:solidFill>
+                <a:latin typeface="Oxygen" panose="02000503000000000000" pitchFamily="2" charset="0"/>
+              </a:rPr>
+              <a:t>© </a:t>
+            </a:r>
+            <a:r>
+              <a:rPr lang="pt-BR" sz="700" dirty="0">
+                <a:solidFill>
+                  <a:schemeClr val="bg1">
+                    <a:lumMod val="50000"/>
+                  </a:schemeClr>
+                </a:solidFill>
+                <a:latin typeface="Oxygen" panose="02000503000000000000" pitchFamily="2" charset="0"/>
+              </a:rPr>
+              <a:t>PROTECTED ANODIAM 2023     ||     PRIVATE &amp; CONFIDENTIAL</a:t>
+            </a:r>
+            <a:endParaRPr lang="en-AU" sz="700" dirty="0">
+              <a:solidFill>
+                <a:schemeClr val="bg1">
+                  <a:lumMod val="50000"/>
+                </a:schemeClr>
+              </a:solidFill>
+              <a:latin typeface="Oxygen" panose="02000503000000000000" pitchFamily="2" charset="0"/>
+            </a:endParaRPr>
+          </a:p>
+        </p:txBody>
+      </p:sp>
+      <p:pic>
+        <p:nvPicPr>
+          <p:cNvPr id="3" name="Picture 2"/>
+          <p:cNvPicPr>
+            <a:picLocks noChangeAspect="1"/>
+          </p:cNvPicPr>
+          <p:nvPr/>
+        </p:nvPicPr>
+        <p:blipFill>
+          <a:blip r:embed="rId3">
+            <a:extLst>
+              <a:ext uri="{28A0092B-C50C-407E-A947-70E740481C1C}">
+                <a14:useLocalDpi xmlns:a14="http://schemas.microsoft.com/office/drawing/2010/main" val="0"/>
+              </a:ext>
+            </a:extLst>
+          </a:blip>
+          <a:stretch>
+            <a:fillRect/>
+          </a:stretch>
+        </p:blipFill>
+        <p:spPr>
+          <a:xfrm>
+            <a:off x="802505" y="1302253"/>
+            <a:ext cx="5546780" cy="4312936"/>
+          </a:xfrm>
+          <a:prstGeom prst="rect">
+            <a:avLst/>
+          </a:prstGeom>
+        </p:spPr>
+      </p:pic>
+      <p:pic>
+        <p:nvPicPr>
+          <p:cNvPr id="4" name="Picture 3"/>
+          <p:cNvPicPr>
+            <a:picLocks noChangeAspect="1"/>
+          </p:cNvPicPr>
+          <p:nvPr/>
+        </p:nvPicPr>
+        <p:blipFill>
+          <a:blip r:embed="rId4">
+            <a:extLst>
+              <a:ext uri="{28A0092B-C50C-407E-A947-70E740481C1C}">
+                <a14:useLocalDpi xmlns:a14="http://schemas.microsoft.com/office/drawing/2010/main" val="0"/>
+              </a:ext>
+            </a:extLst>
+          </a:blip>
+          <a:stretch>
+            <a:fillRect/>
+          </a:stretch>
+        </p:blipFill>
+        <p:spPr>
+          <a:xfrm>
+            <a:off x="6463986" y="959832"/>
+            <a:ext cx="5337477" cy="2860668"/>
+          </a:xfrm>
+          <a:prstGeom prst="rect">
+            <a:avLst/>
+          </a:prstGeom>
+        </p:spPr>
+      </p:pic>
+      <p:pic>
+        <p:nvPicPr>
+          <p:cNvPr id="5" name="Picture 4"/>
+          <p:cNvPicPr>
+            <a:picLocks noChangeAspect="1"/>
+          </p:cNvPicPr>
+          <p:nvPr/>
+        </p:nvPicPr>
+        <p:blipFill>
+          <a:blip r:embed="rId5">
+            <a:extLst>
+              <a:ext uri="{28A0092B-C50C-407E-A947-70E740481C1C}">
+                <a14:useLocalDpi xmlns:a14="http://schemas.microsoft.com/office/drawing/2010/main" val="0"/>
+              </a:ext>
+            </a:extLst>
+          </a:blip>
+          <a:stretch>
+            <a:fillRect/>
+          </a:stretch>
+        </p:blipFill>
+        <p:spPr>
+          <a:xfrm>
+            <a:off x="7336860" y="4208002"/>
+            <a:ext cx="3362325" cy="1809750"/>
+          </a:xfrm>
+          <a:prstGeom prst="rect">
+            <a:avLst/>
+          </a:prstGeom>
+        </p:spPr>
+      </p:pic>
+    </p:spTree>
+    <p:extLst>
+      <p:ext uri="{BB962C8B-B14F-4D97-AF65-F5344CB8AC3E}">
+        <p14:creationId xmlns:p14="http://schemas.microsoft.com/office/powerpoint/2010/main" val="4220448626"/>
+      </p:ext>
+    </p:extLst>
+  </p:cSld>
+  <p:clrMapOvr>
+    <a:masterClrMapping/>
+  </p:clrMapOvr>
+  <p:timing>
+    <p:tnLst>
+      <p:par>
+        <p:cTn id="1" dur="indefinite" restart="never" nodeType="tmRoot"/>
+      </p:par>
+    </p:tnLst>
+  </p:timing>
+</p:sld>
+</file>
+
+<file path=ppt/slides/slide5.xml><?xml version="1.0" encoding="utf-8"?>
+<p:sld xmlns:a="http://schemas.openxmlformats.org/drawingml/2006/main" xmlns:r="http://schemas.openxmlformats.org/officeDocument/2006/relationships" xmlns:p="http://schemas.openxmlformats.org/presentationml/2006/main">
+  <p:cSld>
+    <p:spTree>
+      <p:nvGrpSpPr>
+        <p:cNvPr id="1" name=""/>
+        <p:cNvGrpSpPr/>
+        <p:nvPr/>
+      </p:nvGrpSpPr>
+      <p:grpSpPr>
+        <a:xfrm>
+          <a:off x="0" y="0"/>
+          <a:ext cx="0" cy="0"/>
+          <a:chOff x="0" y="0"/>
+          <a:chExt cx="0" cy="0"/>
+        </a:xfrm>
+      </p:grpSpPr>
+      <p:sp>
+        <p:nvSpPr>
+          <p:cNvPr id="8" name="Rectangle 7">
+            <a:extLst>
+              <a:ext uri="{FF2B5EF4-FFF2-40B4-BE49-F238E27FC236}">
+                <a16:creationId xmlns="" xmlns:a16="http://schemas.microsoft.com/office/drawing/2014/main" id="{583FBC17-A62F-4E87-B8DE-0F79DF4336A0}"/>
+              </a:ext>
+            </a:extLst>
+          </p:cNvPr>
+          <p:cNvSpPr/>
+          <p:nvPr/>
+        </p:nvSpPr>
+        <p:spPr>
+          <a:xfrm>
+            <a:off x="3824624" y="5691"/>
+            <a:ext cx="8367376" cy="770637"/>
+          </a:xfrm>
+          <a:prstGeom prst="rect">
+            <a:avLst/>
+          </a:prstGeom>
+          <a:solidFill>
+            <a:schemeClr val="bg1">
+              <a:lumMod val="95000"/>
+            </a:schemeClr>
+          </a:solidFill>
+          <a:ln>
+            <a:noFill/>
+          </a:ln>
+        </p:spPr>
+        <p:style>
+          <a:lnRef idx="2">
+            <a:schemeClr val="accent1">
+              <a:shade val="50000"/>
+            </a:schemeClr>
+          </a:lnRef>
+          <a:fillRef idx="1">
+            <a:schemeClr val="accent1"/>
+          </a:fillRef>
+          <a:effectRef idx="0">
+            <a:schemeClr val="accent1"/>
+          </a:effectRef>
+          <a:fontRef idx="minor">
+            <a:schemeClr val="lt1"/>
+          </a:fontRef>
+        </p:style>
+        <p:txBody>
+          <a:bodyPr rtlCol="0" anchor="ctr"/>
+          <a:lstStyle/>
+          <a:p>
+            <a:endParaRPr lang="en-AU" sz="800" dirty="0">
+              <a:solidFill>
+                <a:schemeClr val="bg1">
+                  <a:lumMod val="50000"/>
+                </a:schemeClr>
+              </a:solidFill>
+              <a:latin typeface="Oxygen" panose="02000503000000000000" pitchFamily="2" charset="0"/>
+            </a:endParaRPr>
+          </a:p>
+        </p:txBody>
+      </p:sp>
+      <p:grpSp>
+        <p:nvGrpSpPr>
+          <p:cNvPr id="19" name="Group 18">
+            <a:extLst>
+              <a:ext uri="{FF2B5EF4-FFF2-40B4-BE49-F238E27FC236}">
+                <a16:creationId xmlns="" xmlns:a16="http://schemas.microsoft.com/office/drawing/2014/main" id="{C587FE1B-2243-4627-BC52-851BDA62444B}"/>
+              </a:ext>
+            </a:extLst>
+          </p:cNvPr>
+          <p:cNvGrpSpPr/>
+          <p:nvPr/>
+        </p:nvGrpSpPr>
+        <p:grpSpPr>
+          <a:xfrm>
+            <a:off x="687804" y="156881"/>
+            <a:ext cx="2471777" cy="1145371"/>
+            <a:chOff x="4600575" y="2600315"/>
+            <a:chExt cx="2990850" cy="1385897"/>
+          </a:xfrm>
+        </p:grpSpPr>
+        <p:pic>
+          <p:nvPicPr>
+            <p:cNvPr id="20" name="Picture 19">
+              <a:extLst>
+                <a:ext uri="{FF2B5EF4-FFF2-40B4-BE49-F238E27FC236}">
+                  <a16:creationId xmlns="" xmlns:a16="http://schemas.microsoft.com/office/drawing/2014/main" id="{0F2E3E05-4A48-4C06-BA49-75E2E366C715}"/>
+                </a:ext>
+              </a:extLst>
+            </p:cNvPr>
+            <p:cNvPicPr>
+              <a:picLocks noChangeAspect="1"/>
+            </p:cNvPicPr>
+            <p:nvPr/>
+          </p:nvPicPr>
+          <p:blipFill>
+            <a:blip r:embed="rId2"/>
+            <a:stretch>
+              <a:fillRect/>
+            </a:stretch>
+          </p:blipFill>
+          <p:spPr>
+            <a:xfrm>
+              <a:off x="4600575" y="2871787"/>
+              <a:ext cx="2990850" cy="1114425"/>
+            </a:xfrm>
+            <a:prstGeom prst="rect">
+              <a:avLst/>
+            </a:prstGeom>
+          </p:spPr>
+        </p:pic>
+        <p:sp>
+          <p:nvSpPr>
+            <p:cNvPr id="21" name="Freeform 22">
+              <a:extLst>
+                <a:ext uri="{FF2B5EF4-FFF2-40B4-BE49-F238E27FC236}">
+                  <a16:creationId xmlns="" xmlns:a16="http://schemas.microsoft.com/office/drawing/2014/main" id="{8413CF68-A7E3-43A0-B613-5438D5382AB1}"/>
+                </a:ext>
+              </a:extLst>
+            </p:cNvPr>
+            <p:cNvSpPr/>
+            <p:nvPr/>
+          </p:nvSpPr>
+          <p:spPr>
+            <a:xfrm>
+              <a:off x="4739363" y="2600315"/>
+              <a:ext cx="971569" cy="971569"/>
+            </a:xfrm>
+            <a:custGeom>
+              <a:avLst/>
+              <a:gdLst>
+                <a:gd name="connsiteX0" fmla="*/ 1080000 w 2160000"/>
+                <a:gd name="connsiteY0" fmla="*/ 0 h 2160000"/>
+                <a:gd name="connsiteX1" fmla="*/ 2154424 w 2160000"/>
+                <a:gd name="connsiteY1" fmla="*/ 969576 h 2160000"/>
+                <a:gd name="connsiteX2" fmla="*/ 2157027 w 2160000"/>
+                <a:gd name="connsiteY2" fmla="*/ 1021127 h 2160000"/>
+                <a:gd name="connsiteX3" fmla="*/ 2159999 w 2160000"/>
+                <a:gd name="connsiteY3" fmla="*/ 1021127 h 2160000"/>
+                <a:gd name="connsiteX4" fmla="*/ 2159999 w 2160000"/>
+                <a:gd name="connsiteY4" fmla="*/ 1079980 h 2160000"/>
+                <a:gd name="connsiteX5" fmla="*/ 2160000 w 2160000"/>
+                <a:gd name="connsiteY5" fmla="*/ 1080000 h 2160000"/>
+                <a:gd name="connsiteX6" fmla="*/ 2159999 w 2160000"/>
+                <a:gd name="connsiteY6" fmla="*/ 1080021 h 2160000"/>
+                <a:gd name="connsiteX7" fmla="*/ 2159999 w 2160000"/>
+                <a:gd name="connsiteY7" fmla="*/ 1716639 h 2160000"/>
+                <a:gd name="connsiteX8" fmla="*/ 2157838 w 2160000"/>
+                <a:gd name="connsiteY8" fmla="*/ 1716639 h 2160000"/>
+                <a:gd name="connsiteX9" fmla="*/ 2160000 w 2160000"/>
+                <a:gd name="connsiteY9" fmla="*/ 1738544 h 2160000"/>
+                <a:gd name="connsiteX10" fmla="*/ 1891921 w 2160000"/>
+                <a:gd name="connsiteY10" fmla="*/ 2012333 h 2160000"/>
+                <a:gd name="connsiteX11" fmla="*/ 1623842 w 2160000"/>
+                <a:gd name="connsiteY11" fmla="*/ 1738544 h 2160000"/>
+                <a:gd name="connsiteX12" fmla="*/ 1626005 w 2160000"/>
+                <a:gd name="connsiteY12" fmla="*/ 1716639 h 2160000"/>
+                <a:gd name="connsiteX13" fmla="*/ 1620298 w 2160000"/>
+                <a:gd name="connsiteY13" fmla="*/ 1716639 h 2160000"/>
+                <a:gd name="connsiteX14" fmla="*/ 1620298 w 2160000"/>
+                <a:gd name="connsiteY14" fmla="*/ 1090950 h 2160000"/>
+                <a:gd name="connsiteX15" fmla="*/ 1618898 w 2160000"/>
+                <a:gd name="connsiteY15" fmla="*/ 1090937 h 2160000"/>
+                <a:gd name="connsiteX16" fmla="*/ 1620000 w 2160000"/>
+                <a:gd name="connsiteY16" fmla="*/ 1080000 h 2160000"/>
+                <a:gd name="connsiteX17" fmla="*/ 1080000 w 2160000"/>
+                <a:gd name="connsiteY17" fmla="*/ 540000 h 2160000"/>
+                <a:gd name="connsiteX18" fmla="*/ 540000 w 2160000"/>
+                <a:gd name="connsiteY18" fmla="*/ 1080000 h 2160000"/>
+                <a:gd name="connsiteX19" fmla="*/ 1080000 w 2160000"/>
+                <a:gd name="connsiteY19" fmla="*/ 1620000 h 2160000"/>
+                <a:gd name="connsiteX20" fmla="*/ 1172144 w 2160000"/>
+                <a:gd name="connsiteY20" fmla="*/ 1610711 h 2160000"/>
+                <a:gd name="connsiteX21" fmla="*/ 1192722 w 2160000"/>
+                <a:gd name="connsiteY21" fmla="*/ 1599542 h 2160000"/>
+                <a:gd name="connsiteX22" fmla="*/ 1205334 w 2160000"/>
+                <a:gd name="connsiteY22" fmla="*/ 1595627 h 2160000"/>
+                <a:gd name="connsiteX23" fmla="*/ 1218649 w 2160000"/>
+                <a:gd name="connsiteY23" fmla="*/ 1594482 h 2160000"/>
+                <a:gd name="connsiteX24" fmla="*/ 1273176 w 2160000"/>
+                <a:gd name="connsiteY24" fmla="*/ 1581875 h 2160000"/>
+                <a:gd name="connsiteX25" fmla="*/ 1277433 w 2160000"/>
+                <a:gd name="connsiteY25" fmla="*/ 1580379 h 2160000"/>
+                <a:gd name="connsiteX26" fmla="*/ 1297818 w 2160000"/>
+                <a:gd name="connsiteY26" fmla="*/ 1578324 h 2160000"/>
+                <a:gd name="connsiteX27" fmla="*/ 1567818 w 2160000"/>
+                <a:gd name="connsiteY27" fmla="*/ 1848324 h 2160000"/>
+                <a:gd name="connsiteX28" fmla="*/ 1469563 w 2160000"/>
+                <a:gd name="connsiteY28" fmla="*/ 2056669 h 2160000"/>
+                <a:gd name="connsiteX29" fmla="*/ 1412948 w 2160000"/>
+                <a:gd name="connsiteY29" fmla="*/ 2091019 h 2160000"/>
+                <a:gd name="connsiteX30" fmla="*/ 1398272 w 2160000"/>
+                <a:gd name="connsiteY30" fmla="*/ 2101498 h 2160000"/>
+                <a:gd name="connsiteX31" fmla="*/ 1374464 w 2160000"/>
+                <a:gd name="connsiteY31" fmla="*/ 2110955 h 2160000"/>
+                <a:gd name="connsiteX32" fmla="*/ 1376211 w 2160000"/>
+                <a:gd name="connsiteY32" fmla="*/ 2117860 h 2160000"/>
+                <a:gd name="connsiteX33" fmla="*/ 1321962 w 2160000"/>
+                <a:gd name="connsiteY33" fmla="*/ 2131809 h 2160000"/>
+                <a:gd name="connsiteX34" fmla="*/ 1306247 w 2160000"/>
+                <a:gd name="connsiteY34" fmla="*/ 2138051 h 2160000"/>
+                <a:gd name="connsiteX35" fmla="*/ 1267530 w 2160000"/>
+                <a:gd name="connsiteY35" fmla="*/ 2142656 h 2160000"/>
+                <a:gd name="connsiteX36" fmla="*/ 1190424 w 2160000"/>
+                <a:gd name="connsiteY36" fmla="*/ 2154424 h 2160000"/>
+                <a:gd name="connsiteX37" fmla="*/ 1080000 w 2160000"/>
+                <a:gd name="connsiteY37" fmla="*/ 2160000 h 2160000"/>
+                <a:gd name="connsiteX38" fmla="*/ 0 w 2160000"/>
+                <a:gd name="connsiteY38" fmla="*/ 1080000 h 2160000"/>
+                <a:gd name="connsiteX39" fmla="*/ 1080000 w 2160000"/>
+                <a:gd name="connsiteY39" fmla="*/ 0 h 2160000"/>
+              </a:gdLst>
+              <a:ahLst/>
+              <a:cxnLst>
+                <a:cxn ang="0">
+                  <a:pos x="connsiteX0" y="connsiteY0"/>
+                </a:cxn>
+                <a:cxn ang="0">
+                  <a:pos x="connsiteX1" y="connsiteY1"/>
+                </a:cxn>
+                <a:cxn ang="0">
+                  <a:pos x="connsiteX2" y="connsiteY2"/>
+                </a:cxn>
+                <a:cxn ang="0">
+                  <a:pos x="connsiteX3" y="connsiteY3"/>
+                </a:cxn>
+                <a:cxn ang="0">
+                  <a:pos x="connsiteX4" y="connsiteY4"/>
+                </a:cxn>
+                <a:cxn ang="0">
+                  <a:pos x="connsiteX5" y="connsiteY5"/>
+                </a:cxn>
+                <a:cxn ang="0">
+                  <a:pos x="connsiteX6" y="connsiteY6"/>
+                </a:cxn>
+                <a:cxn ang="0">
+                  <a:pos x="connsiteX7" y="connsiteY7"/>
+                </a:cxn>
+                <a:cxn ang="0">
+                  <a:pos x="connsiteX8" y="connsiteY8"/>
+                </a:cxn>
+                <a:cxn ang="0">
+                  <a:pos x="connsiteX9" y="connsiteY9"/>
+                </a:cxn>
+                <a:cxn ang="0">
+                  <a:pos x="connsiteX10" y="connsiteY10"/>
+                </a:cxn>
+                <a:cxn ang="0">
+                  <a:pos x="connsiteX11" y="connsiteY11"/>
+                </a:cxn>
+                <a:cxn ang="0">
+                  <a:pos x="connsiteX12" y="connsiteY12"/>
+                </a:cxn>
+                <a:cxn ang="0">
+                  <a:pos x="connsiteX13" y="connsiteY13"/>
+                </a:cxn>
+                <a:cxn ang="0">
+                  <a:pos x="connsiteX14" y="connsiteY14"/>
+                </a:cxn>
+                <a:cxn ang="0">
+                  <a:pos x="connsiteX15" y="connsiteY15"/>
+                </a:cxn>
+                <a:cxn ang="0">
+                  <a:pos x="connsiteX16" y="connsiteY16"/>
+                </a:cxn>
+                <a:cxn ang="0">
+                  <a:pos x="connsiteX17" y="connsiteY17"/>
+                </a:cxn>
+                <a:cxn ang="0">
+                  <a:pos x="connsiteX18" y="connsiteY18"/>
+                </a:cxn>
+                <a:cxn ang="0">
+                  <a:pos x="connsiteX19" y="connsiteY19"/>
+                </a:cxn>
+                <a:cxn ang="0">
+                  <a:pos x="connsiteX20" y="connsiteY20"/>
+                </a:cxn>
+                <a:cxn ang="0">
+                  <a:pos x="connsiteX21" y="connsiteY21"/>
+                </a:cxn>
+                <a:cxn ang="0">
+                  <a:pos x="connsiteX22" y="connsiteY22"/>
+                </a:cxn>
+                <a:cxn ang="0">
+                  <a:pos x="connsiteX23" y="connsiteY23"/>
+                </a:cxn>
+                <a:cxn ang="0">
+                  <a:pos x="connsiteX24" y="connsiteY24"/>
+                </a:cxn>
+                <a:cxn ang="0">
+                  <a:pos x="connsiteX25" y="connsiteY25"/>
+                </a:cxn>
+                <a:cxn ang="0">
+                  <a:pos x="connsiteX26" y="connsiteY26"/>
+                </a:cxn>
+                <a:cxn ang="0">
+                  <a:pos x="connsiteX27" y="connsiteY27"/>
+                </a:cxn>
+                <a:cxn ang="0">
+                  <a:pos x="connsiteX28" y="connsiteY28"/>
+                </a:cxn>
+                <a:cxn ang="0">
+                  <a:pos x="connsiteX29" y="connsiteY29"/>
+                </a:cxn>
+                <a:cxn ang="0">
+                  <a:pos x="connsiteX30" y="connsiteY30"/>
+                </a:cxn>
+                <a:cxn ang="0">
+                  <a:pos x="connsiteX31" y="connsiteY31"/>
+                </a:cxn>
+                <a:cxn ang="0">
+                  <a:pos x="connsiteX32" y="connsiteY32"/>
+                </a:cxn>
+                <a:cxn ang="0">
+                  <a:pos x="connsiteX33" y="connsiteY33"/>
+                </a:cxn>
+                <a:cxn ang="0">
+                  <a:pos x="connsiteX34" y="connsiteY34"/>
+                </a:cxn>
+                <a:cxn ang="0">
+                  <a:pos x="connsiteX35" y="connsiteY35"/>
+                </a:cxn>
+                <a:cxn ang="0">
+                  <a:pos x="connsiteX36" y="connsiteY36"/>
+                </a:cxn>
+                <a:cxn ang="0">
+                  <a:pos x="connsiteX37" y="connsiteY37"/>
+                </a:cxn>
+                <a:cxn ang="0">
+                  <a:pos x="connsiteX38" y="connsiteY38"/>
+                </a:cxn>
+                <a:cxn ang="0">
+                  <a:pos x="connsiteX39" y="connsiteY39"/>
+                </a:cxn>
+              </a:cxnLst>
+              <a:rect l="l" t="t" r="r" b="b"/>
+              <a:pathLst>
+                <a:path w="2160000" h="2160000">
+                  <a:moveTo>
+                    <a:pt x="1080000" y="0"/>
+                  </a:moveTo>
+                  <a:cubicBezTo>
+                    <a:pt x="1639189" y="0"/>
+                    <a:pt x="2099117" y="424979"/>
+                    <a:pt x="2154424" y="969576"/>
+                  </a:cubicBezTo>
+                  <a:lnTo>
+                    <a:pt x="2157027" y="1021127"/>
+                  </a:lnTo>
+                  <a:lnTo>
+                    <a:pt x="2159999" y="1021127"/>
+                  </a:lnTo>
+                  <a:lnTo>
+                    <a:pt x="2159999" y="1079980"/>
+                  </a:lnTo>
+                  <a:lnTo>
+                    <a:pt x="2160000" y="1080000"/>
+                  </a:lnTo>
+                  <a:lnTo>
+                    <a:pt x="2159999" y="1080021"/>
+                  </a:lnTo>
+                  <a:lnTo>
+                    <a:pt x="2159999" y="1716639"/>
+                  </a:lnTo>
+                  <a:lnTo>
+                    <a:pt x="2157838" y="1716639"/>
+                  </a:lnTo>
+                  <a:lnTo>
+                    <a:pt x="2160000" y="1738544"/>
+                  </a:lnTo>
+                  <a:cubicBezTo>
+                    <a:pt x="2160000" y="1889753"/>
+                    <a:pt x="2039977" y="2012333"/>
+                    <a:pt x="1891921" y="2012333"/>
+                  </a:cubicBezTo>
+                  <a:cubicBezTo>
+                    <a:pt x="1743865" y="2012333"/>
+                    <a:pt x="1623842" y="1889753"/>
+                    <a:pt x="1623842" y="1738544"/>
+                  </a:cubicBezTo>
+                  <a:lnTo>
+                    <a:pt x="1626005" y="1716639"/>
+                  </a:lnTo>
+                  <a:lnTo>
+                    <a:pt x="1620298" y="1716639"/>
+                  </a:lnTo>
+                  <a:lnTo>
+                    <a:pt x="1620298" y="1090950"/>
+                  </a:lnTo>
+                  <a:lnTo>
+                    <a:pt x="1618898" y="1090937"/>
+                  </a:lnTo>
+                  <a:lnTo>
+                    <a:pt x="1620000" y="1080000"/>
+                  </a:lnTo>
+                  <a:cubicBezTo>
+                    <a:pt x="1620000" y="781766"/>
+                    <a:pt x="1378234" y="540000"/>
+                    <a:pt x="1080000" y="540000"/>
+                  </a:cubicBezTo>
+                  <a:cubicBezTo>
+                    <a:pt x="781766" y="540000"/>
+                    <a:pt x="540000" y="781766"/>
+                    <a:pt x="540000" y="1080000"/>
+                  </a:cubicBezTo>
+                  <a:cubicBezTo>
+                    <a:pt x="540000" y="1378234"/>
+                    <a:pt x="781766" y="1620000"/>
+                    <a:pt x="1080000" y="1620000"/>
+                  </a:cubicBezTo>
+                  <a:lnTo>
+                    <a:pt x="1172144" y="1610711"/>
+                  </a:lnTo>
+                  <a:lnTo>
+                    <a:pt x="1192722" y="1599542"/>
+                  </a:lnTo>
+                  <a:lnTo>
+                    <a:pt x="1205334" y="1595627"/>
+                  </a:lnTo>
+                  <a:lnTo>
+                    <a:pt x="1218649" y="1594482"/>
+                  </a:lnTo>
+                  <a:cubicBezTo>
+                    <a:pt x="1237851" y="1591023"/>
+                    <a:pt x="1256099" y="1586790"/>
+                    <a:pt x="1273176" y="1581875"/>
+                  </a:cubicBezTo>
+                  <a:lnTo>
+                    <a:pt x="1277433" y="1580379"/>
+                  </a:lnTo>
+                  <a:lnTo>
+                    <a:pt x="1297818" y="1578324"/>
+                  </a:lnTo>
+                  <a:cubicBezTo>
+                    <a:pt x="1446935" y="1578324"/>
+                    <a:pt x="1567818" y="1699207"/>
+                    <a:pt x="1567818" y="1848324"/>
+                  </a:cubicBezTo>
+                  <a:cubicBezTo>
+                    <a:pt x="1567818" y="1932202"/>
+                    <a:pt x="1529570" y="2007147"/>
+                    <a:pt x="1469563" y="2056669"/>
+                  </a:cubicBezTo>
+                  <a:lnTo>
+                    <a:pt x="1412948" y="2091019"/>
+                  </a:lnTo>
+                  <a:lnTo>
+                    <a:pt x="1398272" y="2101498"/>
+                  </a:lnTo>
+                  <a:lnTo>
+                    <a:pt x="1374464" y="2110955"/>
+                  </a:lnTo>
+                  <a:lnTo>
+                    <a:pt x="1376211" y="2117860"/>
+                  </a:lnTo>
+                  <a:lnTo>
+                    <a:pt x="1321962" y="2131809"/>
+                  </a:lnTo>
+                  <a:lnTo>
+                    <a:pt x="1306247" y="2138051"/>
+                  </a:lnTo>
+                  <a:lnTo>
+                    <a:pt x="1267530" y="2142656"/>
+                  </a:lnTo>
+                  <a:lnTo>
+                    <a:pt x="1190424" y="2154424"/>
+                  </a:lnTo>
+                  <a:cubicBezTo>
+                    <a:pt x="1154118" y="2158111"/>
+                    <a:pt x="1117280" y="2160000"/>
+                    <a:pt x="1080000" y="2160000"/>
+                  </a:cubicBezTo>
+                  <a:cubicBezTo>
+                    <a:pt x="483532" y="2160000"/>
+                    <a:pt x="0" y="1676468"/>
+                    <a:pt x="0" y="1080000"/>
+                  </a:cubicBezTo>
+                  <a:cubicBezTo>
+                    <a:pt x="0" y="483532"/>
+                    <a:pt x="483532" y="0"/>
+                    <a:pt x="1080000" y="0"/>
+                  </a:cubicBezTo>
+                  <a:close/>
+                </a:path>
+              </a:pathLst>
+            </a:custGeom>
+            <a:solidFill>
+              <a:srgbClr val="FF8C52"/>
+            </a:solidFill>
+            <a:ln>
+              <a:solidFill>
+                <a:srgbClr val="FF8C52"/>
+              </a:solidFill>
+            </a:ln>
+          </p:spPr>
+          <p:style>
+            <a:lnRef idx="2">
+              <a:schemeClr val="accent1">
+                <a:shade val="50000"/>
+              </a:schemeClr>
+            </a:lnRef>
+            <a:fillRef idx="1">
+              <a:schemeClr val="accent1"/>
+            </a:fillRef>
+            <a:effectRef idx="0">
+              <a:schemeClr val="accent1"/>
+            </a:effectRef>
+            <a:fontRef idx="minor">
+              <a:schemeClr val="lt1"/>
+            </a:fontRef>
+          </p:style>
+          <p:txBody>
+            <a:bodyPr rtlCol="0" anchor="ctr"/>
+            <a:lstStyle/>
+            <a:p>
+              <a:pPr algn="ctr"/>
+              <a:endParaRPr lang="en-AU" dirty="0">
+                <a:latin typeface="Oxygen" panose="02000503000000000000" pitchFamily="2" charset="0"/>
+              </a:endParaRPr>
+            </a:p>
+          </p:txBody>
+        </p:sp>
+      </p:grpSp>
+      <p:sp>
+        <p:nvSpPr>
+          <p:cNvPr id="22" name="TextBox 21">
+            <a:extLst>
+              <a:ext uri="{FF2B5EF4-FFF2-40B4-BE49-F238E27FC236}">
+                <a16:creationId xmlns="" xmlns:a16="http://schemas.microsoft.com/office/drawing/2014/main" id="{97653B96-F2E2-406B-A513-F42319FDB50F}"/>
+              </a:ext>
+            </a:extLst>
+          </p:cNvPr>
+          <p:cNvSpPr txBox="1"/>
+          <p:nvPr/>
+        </p:nvSpPr>
+        <p:spPr>
+          <a:xfrm>
+            <a:off x="7493555" y="156881"/>
+            <a:ext cx="825867" cy="369332"/>
+          </a:xfrm>
+          <a:prstGeom prst="rect">
+            <a:avLst/>
+          </a:prstGeom>
+          <a:noFill/>
+        </p:spPr>
+        <p:txBody>
+          <a:bodyPr wrap="none" rtlCol="0">
+            <a:spAutoFit/>
+          </a:bodyPr>
+          <a:lstStyle/>
+          <a:p>
+            <a:r>
+              <a:rPr lang="en-AU" b="1" dirty="0" smtClean="0">
+                <a:solidFill>
+                  <a:schemeClr val="bg2">
+                    <a:lumMod val="75000"/>
+                  </a:schemeClr>
+                </a:solidFill>
+                <a:latin typeface="Oxygen" panose="02000503000000000000" pitchFamily="2" charset="0"/>
+                <a:cs typeface="Arial" panose="020B0604020202020204" pitchFamily="34" charset="0"/>
+              </a:rPr>
+              <a:t>OOPS</a:t>
+            </a:r>
+            <a:endParaRPr lang="en-AU" b="1" dirty="0">
+              <a:solidFill>
+                <a:schemeClr val="bg2">
+                  <a:lumMod val="75000"/>
+                </a:schemeClr>
+              </a:solidFill>
+              <a:latin typeface="Oxygen" panose="02000503000000000000" pitchFamily="2" charset="0"/>
+              <a:cs typeface="Arial" panose="020B0604020202020204" pitchFamily="34" charset="0"/>
+            </a:endParaRPr>
+          </a:p>
+        </p:txBody>
+      </p:sp>
+      <p:sp>
+        <p:nvSpPr>
+          <p:cNvPr id="33" name="Rectangle 32">
+            <a:extLst>
+              <a:ext uri="{FF2B5EF4-FFF2-40B4-BE49-F238E27FC236}">
+                <a16:creationId xmlns="" xmlns:a16="http://schemas.microsoft.com/office/drawing/2014/main" id="{E02B0EB1-C543-469A-90DE-9FA0F478E35F}"/>
+              </a:ext>
+            </a:extLst>
+          </p:cNvPr>
+          <p:cNvSpPr/>
+          <p:nvPr/>
+        </p:nvSpPr>
+        <p:spPr>
+          <a:xfrm>
+            <a:off x="0" y="6543676"/>
+            <a:ext cx="12192000" cy="314325"/>
+          </a:xfrm>
+          <a:prstGeom prst="rect">
+            <a:avLst/>
+          </a:prstGeom>
+          <a:solidFill>
+            <a:schemeClr val="bg1">
+              <a:lumMod val="95000"/>
+            </a:schemeClr>
+          </a:solidFill>
+          <a:ln>
+            <a:noFill/>
+          </a:ln>
+        </p:spPr>
+        <p:style>
+          <a:lnRef idx="2">
+            <a:schemeClr val="accent1">
+              <a:shade val="50000"/>
+            </a:schemeClr>
+          </a:lnRef>
+          <a:fillRef idx="1">
+            <a:schemeClr val="accent1"/>
+          </a:fillRef>
+          <a:effectRef idx="0">
+            <a:schemeClr val="accent1"/>
+          </a:effectRef>
+          <a:fontRef idx="minor">
+            <a:schemeClr val="lt1"/>
+          </a:fontRef>
+        </p:style>
+        <p:txBody>
+          <a:bodyPr rtlCol="0" anchor="ctr"/>
+          <a:lstStyle/>
+          <a:p>
+            <a:r>
+              <a:rPr lang="en-US" sz="800" dirty="0">
+                <a:solidFill>
+                  <a:schemeClr val="bg1">
+                    <a:lumMod val="50000"/>
+                  </a:schemeClr>
+                </a:solidFill>
+                <a:latin typeface="Oxygen" panose="02000503000000000000" pitchFamily="2" charset="0"/>
+              </a:rPr>
+              <a:t>                                                                                                                            </a:t>
+            </a:r>
+            <a:r>
+              <a:rPr lang="en-US" sz="800" b="1" dirty="0">
+                <a:solidFill>
+                  <a:schemeClr val="bg1">
+                    <a:lumMod val="50000"/>
+                  </a:schemeClr>
+                </a:solidFill>
+                <a:latin typeface="Oxygen" panose="02000503000000000000" pitchFamily="2" charset="0"/>
+              </a:rPr>
+              <a:t> </a:t>
+            </a:r>
+            <a:r>
+              <a:rPr lang="en-US" sz="800" b="1" dirty="0">
+                <a:solidFill>
+                  <a:srgbClr val="FF8C52"/>
+                </a:solidFill>
+                <a:latin typeface="Oxygen" panose="02000503000000000000" pitchFamily="2" charset="0"/>
+              </a:rPr>
+              <a:t>CONCEPTION      &gt;&gt;      PRACTICE        &gt;&gt;        CONFIDENCE      &gt;&gt;       HIGHEST GRADES</a:t>
+            </a:r>
+            <a:r>
+              <a:rPr lang="en-US" sz="800" dirty="0">
+                <a:solidFill>
+                  <a:srgbClr val="FF8C52"/>
+                </a:solidFill>
+                <a:latin typeface="Oxygen" panose="02000503000000000000" pitchFamily="2" charset="0"/>
+              </a:rPr>
+              <a:t>                                                                             </a:t>
+            </a:r>
+            <a:r>
+              <a:rPr lang="en-US" sz="700" dirty="0">
+                <a:solidFill>
+                  <a:schemeClr val="bg1">
+                    <a:lumMod val="50000"/>
+                  </a:schemeClr>
+                </a:solidFill>
+                <a:latin typeface="Oxygen" panose="02000503000000000000" pitchFamily="2" charset="0"/>
+              </a:rPr>
+              <a:t>© </a:t>
+            </a:r>
+            <a:r>
+              <a:rPr lang="pt-BR" sz="700" dirty="0">
+                <a:solidFill>
+                  <a:schemeClr val="bg1">
+                    <a:lumMod val="50000"/>
+                  </a:schemeClr>
+                </a:solidFill>
+                <a:latin typeface="Oxygen" panose="02000503000000000000" pitchFamily="2" charset="0"/>
+              </a:rPr>
+              <a:t>PROTECTED ANODIAM 2023     ||     PRIVATE &amp; CONFIDENTIAL</a:t>
+            </a:r>
+            <a:endParaRPr lang="en-AU" sz="700" dirty="0">
+              <a:solidFill>
+                <a:schemeClr val="bg1">
+                  <a:lumMod val="50000"/>
+                </a:schemeClr>
+              </a:solidFill>
+              <a:latin typeface="Oxygen" panose="02000503000000000000" pitchFamily="2" charset="0"/>
+            </a:endParaRPr>
+          </a:p>
+        </p:txBody>
+      </p:sp>
+      <p:pic>
+        <p:nvPicPr>
+          <p:cNvPr id="2" name="Picture 1"/>
+          <p:cNvPicPr>
+            <a:picLocks noChangeAspect="1"/>
+          </p:cNvPicPr>
+          <p:nvPr/>
+        </p:nvPicPr>
+        <p:blipFill>
+          <a:blip r:embed="rId3" cstate="print">
+            <a:extLst>
+              <a:ext uri="{28A0092B-C50C-407E-A947-70E740481C1C}">
+                <a14:useLocalDpi xmlns:a14="http://schemas.microsoft.com/office/drawing/2010/main" val="0"/>
+              </a:ext>
+            </a:extLst>
+          </a:blip>
+          <a:stretch>
+            <a:fillRect/>
+          </a:stretch>
+        </p:blipFill>
+        <p:spPr>
+          <a:xfrm>
+            <a:off x="4892764" y="898166"/>
+            <a:ext cx="2985931" cy="2985931"/>
+          </a:xfrm>
+          <a:prstGeom prst="rect">
+            <a:avLst/>
+          </a:prstGeom>
+        </p:spPr>
+      </p:pic>
+      <p:pic>
+        <p:nvPicPr>
+          <p:cNvPr id="6" name="Picture 5"/>
+          <p:cNvPicPr>
+            <a:picLocks noChangeAspect="1"/>
+          </p:cNvPicPr>
+          <p:nvPr/>
+        </p:nvPicPr>
+        <p:blipFill>
+          <a:blip r:embed="rId4">
+            <a:extLst>
+              <a:ext uri="{28A0092B-C50C-407E-A947-70E740481C1C}">
+                <a14:useLocalDpi xmlns:a14="http://schemas.microsoft.com/office/drawing/2010/main" val="0"/>
+              </a:ext>
+            </a:extLst>
+          </a:blip>
+          <a:stretch>
+            <a:fillRect/>
+          </a:stretch>
+        </p:blipFill>
+        <p:spPr>
+          <a:xfrm>
+            <a:off x="687805" y="1469575"/>
+            <a:ext cx="4090258" cy="2604887"/>
+          </a:xfrm>
+          <a:prstGeom prst="rect">
+            <a:avLst/>
+          </a:prstGeom>
+        </p:spPr>
+      </p:pic>
+      <p:pic>
+        <p:nvPicPr>
+          <p:cNvPr id="7" name="Picture 6"/>
+          <p:cNvPicPr>
+            <a:picLocks noChangeAspect="1"/>
+          </p:cNvPicPr>
+          <p:nvPr/>
+        </p:nvPicPr>
+        <p:blipFill>
+          <a:blip r:embed="rId5">
+            <a:extLst>
+              <a:ext uri="{28A0092B-C50C-407E-A947-70E740481C1C}">
+                <a14:useLocalDpi xmlns:a14="http://schemas.microsoft.com/office/drawing/2010/main" val="0"/>
+              </a:ext>
+            </a:extLst>
+          </a:blip>
+          <a:stretch>
+            <a:fillRect/>
+          </a:stretch>
+        </p:blipFill>
+        <p:spPr>
+          <a:xfrm>
+            <a:off x="745155" y="3771466"/>
+            <a:ext cx="3975558" cy="2650372"/>
+          </a:xfrm>
+          <a:prstGeom prst="rect">
+            <a:avLst/>
+          </a:prstGeom>
+        </p:spPr>
+      </p:pic>
+      <p:pic>
+        <p:nvPicPr>
+          <p:cNvPr id="10" name="Picture 9"/>
+          <p:cNvPicPr>
+            <a:picLocks noChangeAspect="1"/>
+          </p:cNvPicPr>
+          <p:nvPr/>
+        </p:nvPicPr>
+        <p:blipFill>
+          <a:blip r:embed="rId6">
+            <a:extLst>
+              <a:ext uri="{28A0092B-C50C-407E-A947-70E740481C1C}">
+                <a14:useLocalDpi xmlns:a14="http://schemas.microsoft.com/office/drawing/2010/main" val="0"/>
+              </a:ext>
+            </a:extLst>
+          </a:blip>
+          <a:stretch>
+            <a:fillRect/>
+          </a:stretch>
+        </p:blipFill>
+        <p:spPr>
+          <a:xfrm>
+            <a:off x="6601361" y="3771466"/>
+            <a:ext cx="5590639" cy="2381250"/>
+          </a:xfrm>
+          <a:prstGeom prst="rect">
+            <a:avLst/>
+          </a:prstGeom>
+        </p:spPr>
+      </p:pic>
+      <p:pic>
+        <p:nvPicPr>
+          <p:cNvPr id="11" name="Picture 10"/>
+          <p:cNvPicPr>
+            <a:picLocks noChangeAspect="1"/>
+          </p:cNvPicPr>
+          <p:nvPr/>
+        </p:nvPicPr>
+        <p:blipFill>
+          <a:blip r:embed="rId7">
+            <a:extLst>
+              <a:ext uri="{28A0092B-C50C-407E-A947-70E740481C1C}">
+                <a14:useLocalDpi xmlns:a14="http://schemas.microsoft.com/office/drawing/2010/main" val="0"/>
+              </a:ext>
+            </a:extLst>
+          </a:blip>
+          <a:stretch>
+            <a:fillRect/>
+          </a:stretch>
+        </p:blipFill>
+        <p:spPr>
+          <a:xfrm>
+            <a:off x="7986793" y="1146477"/>
+            <a:ext cx="3565556" cy="1857299"/>
+          </a:xfrm>
+          <a:prstGeom prst="rect">
+            <a:avLst/>
+          </a:prstGeom>
+        </p:spPr>
+      </p:pic>
+    </p:spTree>
+    <p:extLst>
+      <p:ext uri="{BB962C8B-B14F-4D97-AF65-F5344CB8AC3E}">
+        <p14:creationId xmlns:p14="http://schemas.microsoft.com/office/powerpoint/2010/main" val="264393542"/>
+      </p:ext>
+    </p:extLst>
+  </p:cSld>
+  <p:clrMapOvr>
+    <a:masterClrMapping/>
+  </p:clrMapOvr>
+  <p:timing>
+    <p:tnLst>
+      <p:par>
+        <p:cTn id="1" dur="indefinite" restart="never" nodeType="tmRoot"/>
+      </p:par>
+    </p:tnLst>
+  </p:timing>
 </p:sld>
 </file>
 

</xml_diff>

<commit_message>
Java Document updated by Shuvayan on 7th August 2023
Java Document updated by Shuvayan on 7th August 2023
</commit_message>
<xml_diff>
--- a/Offline/BusinessManagement/Teach_Tech@anodiam/IT/CourseMaterials/Java/001JavaIntroduction.pptx
+++ b/Offline/BusinessManagement/Teach_Tech@anodiam/IT/CourseMaterials/Java/001JavaIntroduction.pptx
@@ -13,6 +13,7 @@
     <p:sldId id="260" r:id="rId7"/>
     <p:sldId id="262" r:id="rId8"/>
     <p:sldId id="263" r:id="rId9"/>
+    <p:sldId id="264" r:id="rId10"/>
   </p:sldIdLst>
   <p:sldSz cx="12192000" cy="6858000"/>
   <p:notesSz cx="6858000" cy="9144000"/>
@@ -113,7 +114,7 @@
   </p:defaultTextStyle>
   <p:extLst>
     <p:ext uri="{EFAFB233-063F-42B5-8137-9DF3F51BA10A}">
-      <p15:sldGuideLst xmlns:p15="http://schemas.microsoft.com/office/powerpoint/2012/main"/>
+      <p15:sldGuideLst xmlns="" xmlns:p15="http://schemas.microsoft.com/office/powerpoint/2012/main"/>
     </p:ext>
   </p:extLst>
 </p:presentation>
@@ -268,7 +269,8 @@
           <a:p>
             <a:fld id="{C169E291-5783-4E82-882C-941255731AFB}" type="datetimeFigureOut">
               <a:rPr lang="en-AU" smtClean="0"/>
-              <a:t>28/07/2023</a:t>
+              <a:pPr/>
+              <a:t>7/08/2023</a:t>
             </a:fld>
             <a:endParaRPr lang="en-AU"/>
           </a:p>
@@ -322,6 +324,7 @@
           <a:p>
             <a:fld id="{93BE8613-482D-469F-8E0F-EB728C16900D}" type="slidenum">
               <a:rPr lang="en-AU" smtClean="0"/>
+              <a:pPr/>
               <a:t>‹#›</a:t>
             </a:fld>
             <a:endParaRPr lang="en-AU"/>
@@ -331,7 +334,7 @@
     </p:spTree>
     <p:extLst>
       <p:ext uri="{BB962C8B-B14F-4D97-AF65-F5344CB8AC3E}">
-        <p14:creationId xmlns:p14="http://schemas.microsoft.com/office/powerpoint/2010/main" val="2285361641"/>
+        <p14:creationId xmlns="" xmlns:p14="http://schemas.microsoft.com/office/powerpoint/2010/main" val="2285361641"/>
       </p:ext>
     </p:extLst>
   </p:cSld>
@@ -468,7 +471,8 @@
           <a:p>
             <a:fld id="{C169E291-5783-4E82-882C-941255731AFB}" type="datetimeFigureOut">
               <a:rPr lang="en-AU" smtClean="0"/>
-              <a:t>28/07/2023</a:t>
+              <a:pPr/>
+              <a:t>7/08/2023</a:t>
             </a:fld>
             <a:endParaRPr lang="en-AU"/>
           </a:p>
@@ -522,6 +526,7 @@
           <a:p>
             <a:fld id="{93BE8613-482D-469F-8E0F-EB728C16900D}" type="slidenum">
               <a:rPr lang="en-AU" smtClean="0"/>
+              <a:pPr/>
               <a:t>‹#›</a:t>
             </a:fld>
             <a:endParaRPr lang="en-AU"/>
@@ -531,7 +536,7 @@
     </p:spTree>
     <p:extLst>
       <p:ext uri="{BB962C8B-B14F-4D97-AF65-F5344CB8AC3E}">
-        <p14:creationId xmlns:p14="http://schemas.microsoft.com/office/powerpoint/2010/main" val="3187710331"/>
+        <p14:creationId xmlns="" xmlns:p14="http://schemas.microsoft.com/office/powerpoint/2010/main" val="3187710331"/>
       </p:ext>
     </p:extLst>
   </p:cSld>
@@ -678,7 +683,8 @@
           <a:p>
             <a:fld id="{C169E291-5783-4E82-882C-941255731AFB}" type="datetimeFigureOut">
               <a:rPr lang="en-AU" smtClean="0"/>
-              <a:t>28/07/2023</a:t>
+              <a:pPr/>
+              <a:t>7/08/2023</a:t>
             </a:fld>
             <a:endParaRPr lang="en-AU"/>
           </a:p>
@@ -732,6 +738,7 @@
           <a:p>
             <a:fld id="{93BE8613-482D-469F-8E0F-EB728C16900D}" type="slidenum">
               <a:rPr lang="en-AU" smtClean="0"/>
+              <a:pPr/>
               <a:t>‹#›</a:t>
             </a:fld>
             <a:endParaRPr lang="en-AU"/>
@@ -741,7 +748,7 @@
     </p:spTree>
     <p:extLst>
       <p:ext uri="{BB962C8B-B14F-4D97-AF65-F5344CB8AC3E}">
-        <p14:creationId xmlns:p14="http://schemas.microsoft.com/office/powerpoint/2010/main" val="792568276"/>
+        <p14:creationId xmlns="" xmlns:p14="http://schemas.microsoft.com/office/powerpoint/2010/main" val="792568276"/>
       </p:ext>
     </p:extLst>
   </p:cSld>
@@ -878,7 +885,8 @@
           <a:p>
             <a:fld id="{C169E291-5783-4E82-882C-941255731AFB}" type="datetimeFigureOut">
               <a:rPr lang="en-AU" smtClean="0"/>
-              <a:t>28/07/2023</a:t>
+              <a:pPr/>
+              <a:t>7/08/2023</a:t>
             </a:fld>
             <a:endParaRPr lang="en-AU"/>
           </a:p>
@@ -932,6 +940,7 @@
           <a:p>
             <a:fld id="{93BE8613-482D-469F-8E0F-EB728C16900D}" type="slidenum">
               <a:rPr lang="en-AU" smtClean="0"/>
+              <a:pPr/>
               <a:t>‹#›</a:t>
             </a:fld>
             <a:endParaRPr lang="en-AU"/>
@@ -941,7 +950,7 @@
     </p:spTree>
     <p:extLst>
       <p:ext uri="{BB962C8B-B14F-4D97-AF65-F5344CB8AC3E}">
-        <p14:creationId xmlns:p14="http://schemas.microsoft.com/office/powerpoint/2010/main" val="3260875873"/>
+        <p14:creationId xmlns="" xmlns:p14="http://schemas.microsoft.com/office/powerpoint/2010/main" val="3260875873"/>
       </p:ext>
     </p:extLst>
   </p:cSld>
@@ -1154,7 +1163,8 @@
           <a:p>
             <a:fld id="{C169E291-5783-4E82-882C-941255731AFB}" type="datetimeFigureOut">
               <a:rPr lang="en-AU" smtClean="0"/>
-              <a:t>28/07/2023</a:t>
+              <a:pPr/>
+              <a:t>7/08/2023</a:t>
             </a:fld>
             <a:endParaRPr lang="en-AU"/>
           </a:p>
@@ -1208,6 +1218,7 @@
           <a:p>
             <a:fld id="{93BE8613-482D-469F-8E0F-EB728C16900D}" type="slidenum">
               <a:rPr lang="en-AU" smtClean="0"/>
+              <a:pPr/>
               <a:t>‹#›</a:t>
             </a:fld>
             <a:endParaRPr lang="en-AU"/>
@@ -1217,7 +1228,7 @@
     </p:spTree>
     <p:extLst>
       <p:ext uri="{BB962C8B-B14F-4D97-AF65-F5344CB8AC3E}">
-        <p14:creationId xmlns:p14="http://schemas.microsoft.com/office/powerpoint/2010/main" val="22461118"/>
+        <p14:creationId xmlns="" xmlns:p14="http://schemas.microsoft.com/office/powerpoint/2010/main" val="22461118"/>
       </p:ext>
     </p:extLst>
   </p:cSld>
@@ -1422,7 +1433,8 @@
           <a:p>
             <a:fld id="{C169E291-5783-4E82-882C-941255731AFB}" type="datetimeFigureOut">
               <a:rPr lang="en-AU" smtClean="0"/>
-              <a:t>28/07/2023</a:t>
+              <a:pPr/>
+              <a:t>7/08/2023</a:t>
             </a:fld>
             <a:endParaRPr lang="en-AU"/>
           </a:p>
@@ -1476,6 +1488,7 @@
           <a:p>
             <a:fld id="{93BE8613-482D-469F-8E0F-EB728C16900D}" type="slidenum">
               <a:rPr lang="en-AU" smtClean="0"/>
+              <a:pPr/>
               <a:t>‹#›</a:t>
             </a:fld>
             <a:endParaRPr lang="en-AU"/>
@@ -1485,7 +1498,7 @@
     </p:spTree>
     <p:extLst>
       <p:ext uri="{BB962C8B-B14F-4D97-AF65-F5344CB8AC3E}">
-        <p14:creationId xmlns:p14="http://schemas.microsoft.com/office/powerpoint/2010/main" val="1920397826"/>
+        <p14:creationId xmlns="" xmlns:p14="http://schemas.microsoft.com/office/powerpoint/2010/main" val="1920397826"/>
       </p:ext>
     </p:extLst>
   </p:cSld>
@@ -1837,7 +1850,8 @@
           <a:p>
             <a:fld id="{C169E291-5783-4E82-882C-941255731AFB}" type="datetimeFigureOut">
               <a:rPr lang="en-AU" smtClean="0"/>
-              <a:t>28/07/2023</a:t>
+              <a:pPr/>
+              <a:t>7/08/2023</a:t>
             </a:fld>
             <a:endParaRPr lang="en-AU"/>
           </a:p>
@@ -1891,6 +1905,7 @@
           <a:p>
             <a:fld id="{93BE8613-482D-469F-8E0F-EB728C16900D}" type="slidenum">
               <a:rPr lang="en-AU" smtClean="0"/>
+              <a:pPr/>
               <a:t>‹#›</a:t>
             </a:fld>
             <a:endParaRPr lang="en-AU"/>
@@ -1900,7 +1915,7 @@
     </p:spTree>
     <p:extLst>
       <p:ext uri="{BB962C8B-B14F-4D97-AF65-F5344CB8AC3E}">
-        <p14:creationId xmlns:p14="http://schemas.microsoft.com/office/powerpoint/2010/main" val="3252663943"/>
+        <p14:creationId xmlns="" xmlns:p14="http://schemas.microsoft.com/office/powerpoint/2010/main" val="3252663943"/>
       </p:ext>
     </p:extLst>
   </p:cSld>
@@ -1979,7 +1994,8 @@
           <a:p>
             <a:fld id="{C169E291-5783-4E82-882C-941255731AFB}" type="datetimeFigureOut">
               <a:rPr lang="en-AU" smtClean="0"/>
-              <a:t>28/07/2023</a:t>
+              <a:pPr/>
+              <a:t>7/08/2023</a:t>
             </a:fld>
             <a:endParaRPr lang="en-AU"/>
           </a:p>
@@ -2033,6 +2049,7 @@
           <a:p>
             <a:fld id="{93BE8613-482D-469F-8E0F-EB728C16900D}" type="slidenum">
               <a:rPr lang="en-AU" smtClean="0"/>
+              <a:pPr/>
               <a:t>‹#›</a:t>
             </a:fld>
             <a:endParaRPr lang="en-AU"/>
@@ -2042,7 +2059,7 @@
     </p:spTree>
     <p:extLst>
       <p:ext uri="{BB962C8B-B14F-4D97-AF65-F5344CB8AC3E}">
-        <p14:creationId xmlns:p14="http://schemas.microsoft.com/office/powerpoint/2010/main" val="1084231312"/>
+        <p14:creationId xmlns="" xmlns:p14="http://schemas.microsoft.com/office/powerpoint/2010/main" val="1084231312"/>
       </p:ext>
     </p:extLst>
   </p:cSld>
@@ -2092,7 +2109,8 @@
           <a:p>
             <a:fld id="{C169E291-5783-4E82-882C-941255731AFB}" type="datetimeFigureOut">
               <a:rPr lang="en-AU" smtClean="0"/>
-              <a:t>28/07/2023</a:t>
+              <a:pPr/>
+              <a:t>7/08/2023</a:t>
             </a:fld>
             <a:endParaRPr lang="en-AU"/>
           </a:p>
@@ -2146,6 +2164,7 @@
           <a:p>
             <a:fld id="{93BE8613-482D-469F-8E0F-EB728C16900D}" type="slidenum">
               <a:rPr lang="en-AU" smtClean="0"/>
+              <a:pPr/>
               <a:t>‹#›</a:t>
             </a:fld>
             <a:endParaRPr lang="en-AU"/>
@@ -2155,7 +2174,7 @@
     </p:spTree>
     <p:extLst>
       <p:ext uri="{BB962C8B-B14F-4D97-AF65-F5344CB8AC3E}">
-        <p14:creationId xmlns:p14="http://schemas.microsoft.com/office/powerpoint/2010/main" val="229256039"/>
+        <p14:creationId xmlns="" xmlns:p14="http://schemas.microsoft.com/office/powerpoint/2010/main" val="229256039"/>
       </p:ext>
     </p:extLst>
   </p:cSld>
@@ -2405,7 +2424,8 @@
           <a:p>
             <a:fld id="{C169E291-5783-4E82-882C-941255731AFB}" type="datetimeFigureOut">
               <a:rPr lang="en-AU" smtClean="0"/>
-              <a:t>28/07/2023</a:t>
+              <a:pPr/>
+              <a:t>7/08/2023</a:t>
             </a:fld>
             <a:endParaRPr lang="en-AU"/>
           </a:p>
@@ -2459,6 +2479,7 @@
           <a:p>
             <a:fld id="{93BE8613-482D-469F-8E0F-EB728C16900D}" type="slidenum">
               <a:rPr lang="en-AU" smtClean="0"/>
+              <a:pPr/>
               <a:t>‹#›</a:t>
             </a:fld>
             <a:endParaRPr lang="en-AU"/>
@@ -2468,7 +2489,7 @@
     </p:spTree>
     <p:extLst>
       <p:ext uri="{BB962C8B-B14F-4D97-AF65-F5344CB8AC3E}">
-        <p14:creationId xmlns:p14="http://schemas.microsoft.com/office/powerpoint/2010/main" val="662781301"/>
+        <p14:creationId xmlns="" xmlns:p14="http://schemas.microsoft.com/office/powerpoint/2010/main" val="662781301"/>
       </p:ext>
     </p:extLst>
   </p:cSld>
@@ -2694,7 +2715,8 @@
           <a:p>
             <a:fld id="{C169E291-5783-4E82-882C-941255731AFB}" type="datetimeFigureOut">
               <a:rPr lang="en-AU" smtClean="0"/>
-              <a:t>28/07/2023</a:t>
+              <a:pPr/>
+              <a:t>7/08/2023</a:t>
             </a:fld>
             <a:endParaRPr lang="en-AU"/>
           </a:p>
@@ -2748,6 +2770,7 @@
           <a:p>
             <a:fld id="{93BE8613-482D-469F-8E0F-EB728C16900D}" type="slidenum">
               <a:rPr lang="en-AU" smtClean="0"/>
+              <a:pPr/>
               <a:t>‹#›</a:t>
             </a:fld>
             <a:endParaRPr lang="en-AU"/>
@@ -2757,7 +2780,7 @@
     </p:spTree>
     <p:extLst>
       <p:ext uri="{BB962C8B-B14F-4D97-AF65-F5344CB8AC3E}">
-        <p14:creationId xmlns:p14="http://schemas.microsoft.com/office/powerpoint/2010/main" val="3513346197"/>
+        <p14:creationId xmlns="" xmlns:p14="http://schemas.microsoft.com/office/powerpoint/2010/main" val="3513346197"/>
       </p:ext>
     </p:extLst>
   </p:cSld>
@@ -2937,7 +2960,8 @@
           <a:p>
             <a:fld id="{C169E291-5783-4E82-882C-941255731AFB}" type="datetimeFigureOut">
               <a:rPr lang="en-AU" smtClean="0"/>
-              <a:t>28/07/2023</a:t>
+              <a:pPr/>
+              <a:t>7/08/2023</a:t>
             </a:fld>
             <a:endParaRPr lang="en-AU"/>
           </a:p>
@@ -3027,6 +3051,7 @@
           <a:p>
             <a:fld id="{93BE8613-482D-469F-8E0F-EB728C16900D}" type="slidenum">
               <a:rPr lang="en-AU" smtClean="0"/>
+              <a:pPr/>
               <a:t>‹#›</a:t>
             </a:fld>
             <a:endParaRPr lang="en-AU"/>
@@ -3036,7 +3061,7 @@
     </p:spTree>
     <p:extLst>
       <p:ext uri="{BB962C8B-B14F-4D97-AF65-F5344CB8AC3E}">
-        <p14:creationId xmlns:p14="http://schemas.microsoft.com/office/powerpoint/2010/main" val="1722224151"/>
+        <p14:creationId xmlns="" xmlns:p14="http://schemas.microsoft.com/office/powerpoint/2010/main" val="1722224151"/>
       </p:ext>
     </p:extLst>
   </p:cSld>
@@ -3627,7 +3652,7 @@
             <p:nvPr/>
           </p:nvPicPr>
           <p:blipFill>
-            <a:blip r:embed="rId2"/>
+            <a:blip r:embed="rId2" cstate="print"/>
             <a:stretch>
               <a:fillRect/>
             </a:stretch>
@@ -4467,7 +4492,7 @@
           <p:nvPr/>
         </p:nvPicPr>
         <p:blipFill>
-          <a:blip r:embed="rId3"/>
+          <a:blip r:embed="rId3" cstate="print"/>
           <a:stretch>
             <a:fillRect/>
           </a:stretch>
@@ -4497,10 +4522,10 @@
           <p:nvPr/>
         </p:nvPicPr>
         <p:blipFill>
-          <a:blip r:embed="rId4">
+          <a:blip r:embed="rId4" cstate="print">
             <a:extLst>
               <a:ext uri="{28A0092B-C50C-407E-A947-70E740481C1C}">
-                <a14:useLocalDpi xmlns:a14="http://schemas.microsoft.com/office/drawing/2010/main" val="0"/>
+                <a14:useLocalDpi xmlns="" xmlns:a14="http://schemas.microsoft.com/office/drawing/2010/main" val="0"/>
               </a:ext>
             </a:extLst>
           </a:blip>
@@ -4520,7 +4545,7 @@
           <a:noFill/>
           <a:extLst>
             <a:ext uri="{909E8E84-426E-40DD-AFC4-6F175D3DCCD1}">
-              <a14:hiddenFill xmlns:a14="http://schemas.microsoft.com/office/drawing/2010/main">
+              <a14:hiddenFill xmlns="" xmlns:a14="http://schemas.microsoft.com/office/drawing/2010/main">
                 <a:solidFill>
                   <a:srgbClr val="FFFFFF"/>
                 </a:solidFill>
@@ -4953,7 +4978,7 @@
     </p:spTree>
     <p:extLst>
       <p:ext uri="{BB962C8B-B14F-4D97-AF65-F5344CB8AC3E}">
-        <p14:creationId xmlns:p14="http://schemas.microsoft.com/office/powerpoint/2010/main" val="3655546031"/>
+        <p14:creationId xmlns="" xmlns:p14="http://schemas.microsoft.com/office/powerpoint/2010/main" val="3655546031"/>
       </p:ext>
     </p:extLst>
   </p:cSld>
@@ -5376,7 +5401,7 @@
             <p:nvPr/>
           </p:nvPicPr>
           <p:blipFill>
-            <a:blip r:embed="rId2"/>
+            <a:blip r:embed="rId2" cstate="print"/>
             <a:stretch>
               <a:fillRect/>
             </a:stretch>
@@ -5983,7 +6008,7 @@
           <p:nvPr/>
         </p:nvPicPr>
         <p:blipFill>
-          <a:blip r:embed="rId3"/>
+          <a:blip r:embed="rId3" cstate="print"/>
           <a:stretch>
             <a:fillRect/>
           </a:stretch>
@@ -6963,7 +6988,7 @@
     </p:spTree>
     <p:extLst>
       <p:ext uri="{BB962C8B-B14F-4D97-AF65-F5344CB8AC3E}">
-        <p14:creationId xmlns:p14="http://schemas.microsoft.com/office/powerpoint/2010/main" val="4256432844"/>
+        <p14:creationId xmlns="" xmlns:p14="http://schemas.microsoft.com/office/powerpoint/2010/main" val="4256432844"/>
       </p:ext>
     </p:extLst>
   </p:cSld>
@@ -7092,7 +7117,7 @@
             <p:nvPr/>
           </p:nvPicPr>
           <p:blipFill>
-            <a:blip r:embed="rId2"/>
+            <a:blip r:embed="rId2" cstate="print"/>
             <a:stretch>
               <a:fillRect/>
             </a:stretch>
@@ -7686,10 +7711,10 @@
       </p:sp>
       <p:pic>
         <p:nvPicPr>
-          <p:cNvPr id="5" name="Picture 4">
-            <a:extLst>
-              <a:ext uri="{FF2B5EF4-FFF2-40B4-BE49-F238E27FC236}">
-                <a16:creationId xmlns="" xmlns:a16="http://schemas.microsoft.com/office/drawing/2014/main" id="{8ACA1744-6AFE-83EE-AE44-BD8037F7B7AD}"/>
+          <p:cNvPr id="15" name="Picture 14">
+            <a:extLst>
+              <a:ext uri="{FF2B5EF4-FFF2-40B4-BE49-F238E27FC236}">
+                <a16:creationId xmlns="" xmlns:a16="http://schemas.microsoft.com/office/drawing/2014/main" id="{5AC50144-AF05-C85A-104D-1288F48190FC}"/>
               </a:ext>
             </a:extLst>
           </p:cNvPr>
@@ -7699,92 +7724,10 @@
           <p:nvPr/>
         </p:nvPicPr>
         <p:blipFill>
-          <a:blip r:embed="rId3">
+          <a:blip r:embed="rId3" cstate="print">
             <a:extLst>
               <a:ext uri="{28A0092B-C50C-407E-A947-70E740481C1C}">
-                <a14:useLocalDpi xmlns:a14="http://schemas.microsoft.com/office/drawing/2010/main" val="0"/>
-              </a:ext>
-            </a:extLst>
-          </a:blip>
-          <a:stretch>
-            <a:fillRect/>
-          </a:stretch>
-        </p:blipFill>
-        <p:spPr>
-          <a:xfrm>
-            <a:off x="1250950" y="1689100"/>
-            <a:ext cx="3994150" cy="1625612"/>
-          </a:xfrm>
-          <a:prstGeom prst="rect">
-            <a:avLst/>
-          </a:prstGeom>
-          <a:ln>
-            <a:solidFill>
-              <a:schemeClr val="accent2"/>
-            </a:solidFill>
-          </a:ln>
-        </p:spPr>
-      </p:pic>
-      <p:pic>
-        <p:nvPicPr>
-          <p:cNvPr id="7" name="Picture 6">
-            <a:extLst>
-              <a:ext uri="{FF2B5EF4-FFF2-40B4-BE49-F238E27FC236}">
-                <a16:creationId xmlns="" xmlns:a16="http://schemas.microsoft.com/office/drawing/2014/main" id="{F404EAFB-2D66-F44C-CA64-7928759EE0BE}"/>
-              </a:ext>
-            </a:extLst>
-          </p:cNvPr>
-          <p:cNvPicPr>
-            <a:picLocks noChangeAspect="1"/>
-          </p:cNvPicPr>
-          <p:nvPr/>
-        </p:nvPicPr>
-        <p:blipFill>
-          <a:blip r:embed="rId4">
-            <a:extLst>
-              <a:ext uri="{28A0092B-C50C-407E-A947-70E740481C1C}">
-                <a14:useLocalDpi xmlns:a14="http://schemas.microsoft.com/office/drawing/2010/main" val="0"/>
-              </a:ext>
-            </a:extLst>
-          </a:blip>
-          <a:stretch>
-            <a:fillRect/>
-          </a:stretch>
-        </p:blipFill>
-        <p:spPr>
-          <a:xfrm>
-            <a:off x="5313422" y="1689099"/>
-            <a:ext cx="6299179" cy="4322365"/>
-          </a:xfrm>
-          <a:prstGeom prst="rect">
-            <a:avLst/>
-          </a:prstGeom>
-          <a:ln>
-            <a:solidFill>
-              <a:schemeClr val="accent2"/>
-            </a:solidFill>
-          </a:ln>
-        </p:spPr>
-      </p:pic>
-      <p:pic>
-        <p:nvPicPr>
-          <p:cNvPr id="15" name="Picture 14">
-            <a:extLst>
-              <a:ext uri="{FF2B5EF4-FFF2-40B4-BE49-F238E27FC236}">
-                <a16:creationId xmlns="" xmlns:a16="http://schemas.microsoft.com/office/drawing/2014/main" id="{5AC50144-AF05-C85A-104D-1288F48190FC}"/>
-              </a:ext>
-            </a:extLst>
-          </p:cNvPr>
-          <p:cNvPicPr>
-            <a:picLocks noChangeAspect="1"/>
-          </p:cNvPicPr>
-          <p:nvPr/>
-        </p:nvPicPr>
-        <p:blipFill>
-          <a:blip r:embed="rId5">
-            <a:extLst>
-              <a:ext uri="{28A0092B-C50C-407E-A947-70E740481C1C}">
-                <a14:useLocalDpi xmlns:a14="http://schemas.microsoft.com/office/drawing/2010/main" val="0"/>
+                <a14:useLocalDpi xmlns="" xmlns:a14="http://schemas.microsoft.com/office/drawing/2010/main" val="0"/>
               </a:ext>
             </a:extLst>
           </a:blip>
@@ -7802,10 +7745,58 @@
           </a:prstGeom>
         </p:spPr>
       </p:pic>
+      <p:pic>
+        <p:nvPicPr>
+          <p:cNvPr id="11" name="Picture 10" descr="Variables-in-Java-1.png"/>
+          <p:cNvPicPr>
+            <a:picLocks noChangeAspect="1"/>
+          </p:cNvPicPr>
+          <p:nvPr/>
+        </p:nvPicPr>
+        <p:blipFill>
+          <a:blip r:embed="rId4" cstate="print"/>
+          <a:stretch>
+            <a:fillRect/>
+          </a:stretch>
+        </p:blipFill>
+        <p:spPr>
+          <a:xfrm>
+            <a:off x="1388777" y="1310393"/>
+            <a:ext cx="3819717" cy="1924319"/>
+          </a:xfrm>
+          <a:prstGeom prst="rect">
+            <a:avLst/>
+          </a:prstGeom>
+        </p:spPr>
+      </p:pic>
+      <p:pic>
+        <p:nvPicPr>
+          <p:cNvPr id="12" name="Picture 11" descr="DataTypes.png"/>
+          <p:cNvPicPr>
+            <a:picLocks noChangeAspect="1"/>
+          </p:cNvPicPr>
+          <p:nvPr/>
+        </p:nvPicPr>
+        <p:blipFill>
+          <a:blip r:embed="rId5" cstate="print"/>
+          <a:stretch>
+            <a:fillRect/>
+          </a:stretch>
+        </p:blipFill>
+        <p:spPr>
+          <a:xfrm>
+            <a:off x="5373965" y="1634404"/>
+            <a:ext cx="6666119" cy="4327130"/>
+          </a:xfrm>
+          <a:prstGeom prst="rect">
+            <a:avLst/>
+          </a:prstGeom>
+        </p:spPr>
+      </p:pic>
     </p:spTree>
     <p:extLst>
       <p:ext uri="{BB962C8B-B14F-4D97-AF65-F5344CB8AC3E}">
-        <p14:creationId xmlns:p14="http://schemas.microsoft.com/office/powerpoint/2010/main" val="1140587063"/>
+        <p14:creationId xmlns="" xmlns:p14="http://schemas.microsoft.com/office/powerpoint/2010/main" val="1140587063"/>
       </p:ext>
     </p:extLst>
   </p:cSld>
@@ -7934,7 +7925,7 @@
             <p:nvPr/>
           </p:nvPicPr>
           <p:blipFill>
-            <a:blip r:embed="rId2"/>
+            <a:blip r:embed="rId2" cstate="print"/>
             <a:stretch>
               <a:fillRect/>
             </a:stretch>
@@ -8544,10 +8535,10 @@
           <p:nvPr/>
         </p:nvPicPr>
         <p:blipFill>
-          <a:blip r:embed="rId3">
+          <a:blip r:embed="rId3" cstate="print">
             <a:extLst>
               <a:ext uri="{28A0092B-C50C-407E-A947-70E740481C1C}">
-                <a14:useLocalDpi xmlns:a14="http://schemas.microsoft.com/office/drawing/2010/main" val="0"/>
+                <a14:useLocalDpi xmlns="" xmlns:a14="http://schemas.microsoft.com/office/drawing/2010/main" val="0"/>
               </a:ext>
             </a:extLst>
           </a:blip>
@@ -8574,10 +8565,10 @@
           <p:nvPr/>
         </p:nvPicPr>
         <p:blipFill>
-          <a:blip r:embed="rId4">
+          <a:blip r:embed="rId4" cstate="print">
             <a:extLst>
               <a:ext uri="{28A0092B-C50C-407E-A947-70E740481C1C}">
-                <a14:useLocalDpi xmlns:a14="http://schemas.microsoft.com/office/drawing/2010/main" val="0"/>
+                <a14:useLocalDpi xmlns="" xmlns:a14="http://schemas.microsoft.com/office/drawing/2010/main" val="0"/>
               </a:ext>
             </a:extLst>
           </a:blip>
@@ -8604,10 +8595,10 @@
           <p:nvPr/>
         </p:nvPicPr>
         <p:blipFill>
-          <a:blip r:embed="rId5">
+          <a:blip r:embed="rId5" cstate="print">
             <a:extLst>
               <a:ext uri="{28A0092B-C50C-407E-A947-70E740481C1C}">
-                <a14:useLocalDpi xmlns:a14="http://schemas.microsoft.com/office/drawing/2010/main" val="0"/>
+                <a14:useLocalDpi xmlns="" xmlns:a14="http://schemas.microsoft.com/office/drawing/2010/main" val="0"/>
               </a:ext>
             </a:extLst>
           </a:blip>
@@ -8628,7 +8619,7 @@
     </p:spTree>
     <p:extLst>
       <p:ext uri="{BB962C8B-B14F-4D97-AF65-F5344CB8AC3E}">
-        <p14:creationId xmlns:p14="http://schemas.microsoft.com/office/powerpoint/2010/main" val="4220448626"/>
+        <p14:creationId xmlns="" xmlns:p14="http://schemas.microsoft.com/office/powerpoint/2010/main" val="4220448626"/>
       </p:ext>
     </p:extLst>
   </p:cSld>
@@ -8757,7 +8748,7 @@
             <p:nvPr/>
           </p:nvPicPr>
           <p:blipFill>
-            <a:blip r:embed="rId2"/>
+            <a:blip r:embed="rId2" cstate="print"/>
             <a:stretch>
               <a:fillRect/>
             </a:stretch>
@@ -9370,7 +9361,7 @@
           <a:blip r:embed="rId3" cstate="print">
             <a:extLst>
               <a:ext uri="{28A0092B-C50C-407E-A947-70E740481C1C}">
-                <a14:useLocalDpi xmlns:a14="http://schemas.microsoft.com/office/drawing/2010/main" val="0"/>
+                <a14:useLocalDpi xmlns="" xmlns:a14="http://schemas.microsoft.com/office/drawing/2010/main" val="0"/>
               </a:ext>
             </a:extLst>
           </a:blip>
@@ -9397,10 +9388,10 @@
           <p:nvPr/>
         </p:nvPicPr>
         <p:blipFill>
-          <a:blip r:embed="rId4">
+          <a:blip r:embed="rId4" cstate="print">
             <a:extLst>
               <a:ext uri="{28A0092B-C50C-407E-A947-70E740481C1C}">
-                <a14:useLocalDpi xmlns:a14="http://schemas.microsoft.com/office/drawing/2010/main" val="0"/>
+                <a14:useLocalDpi xmlns="" xmlns:a14="http://schemas.microsoft.com/office/drawing/2010/main" val="0"/>
               </a:ext>
             </a:extLst>
           </a:blip>
@@ -9427,10 +9418,10 @@
           <p:nvPr/>
         </p:nvPicPr>
         <p:blipFill>
-          <a:blip r:embed="rId5">
+          <a:blip r:embed="rId5" cstate="print">
             <a:extLst>
               <a:ext uri="{28A0092B-C50C-407E-A947-70E740481C1C}">
-                <a14:useLocalDpi xmlns:a14="http://schemas.microsoft.com/office/drawing/2010/main" val="0"/>
+                <a14:useLocalDpi xmlns="" xmlns:a14="http://schemas.microsoft.com/office/drawing/2010/main" val="0"/>
               </a:ext>
             </a:extLst>
           </a:blip>
@@ -9457,10 +9448,10 @@
           <p:nvPr/>
         </p:nvPicPr>
         <p:blipFill>
-          <a:blip r:embed="rId6">
+          <a:blip r:embed="rId6" cstate="print">
             <a:extLst>
               <a:ext uri="{28A0092B-C50C-407E-A947-70E740481C1C}">
-                <a14:useLocalDpi xmlns:a14="http://schemas.microsoft.com/office/drawing/2010/main" val="0"/>
+                <a14:useLocalDpi xmlns="" xmlns:a14="http://schemas.microsoft.com/office/drawing/2010/main" val="0"/>
               </a:ext>
             </a:extLst>
           </a:blip>
@@ -9487,10 +9478,10 @@
           <p:nvPr/>
         </p:nvPicPr>
         <p:blipFill>
-          <a:blip r:embed="rId7">
+          <a:blip r:embed="rId7" cstate="print">
             <a:extLst>
               <a:ext uri="{28A0092B-C50C-407E-A947-70E740481C1C}">
-                <a14:useLocalDpi xmlns:a14="http://schemas.microsoft.com/office/drawing/2010/main" val="0"/>
+                <a14:useLocalDpi xmlns="" xmlns:a14="http://schemas.microsoft.com/office/drawing/2010/main" val="0"/>
               </a:ext>
             </a:extLst>
           </a:blip>
@@ -9511,7 +9502,7 @@
     </p:spTree>
     <p:extLst>
       <p:ext uri="{BB962C8B-B14F-4D97-AF65-F5344CB8AC3E}">
-        <p14:creationId xmlns:p14="http://schemas.microsoft.com/office/powerpoint/2010/main" val="2629951794"/>
+        <p14:creationId xmlns="" xmlns:p14="http://schemas.microsoft.com/office/powerpoint/2010/main" val="2629951794"/>
       </p:ext>
     </p:extLst>
   </p:cSld>
@@ -9640,7 +9631,7 @@
             <p:nvPr/>
           </p:nvPicPr>
           <p:blipFill>
-            <a:blip r:embed="rId2"/>
+            <a:blip r:embed="rId2" cstate="print"/>
             <a:stretch>
               <a:fillRect/>
             </a:stretch>
@@ -10250,10 +10241,10 @@
           <p:nvPr/>
         </p:nvPicPr>
         <p:blipFill>
-          <a:blip r:embed="rId3">
+          <a:blip r:embed="rId3" cstate="print">
             <a:extLst>
               <a:ext uri="{28A0092B-C50C-407E-A947-70E740481C1C}">
-                <a14:useLocalDpi xmlns:a14="http://schemas.microsoft.com/office/drawing/2010/main" val="0"/>
+                <a14:useLocalDpi xmlns="" xmlns:a14="http://schemas.microsoft.com/office/drawing/2010/main" val="0"/>
               </a:ext>
             </a:extLst>
           </a:blip>
@@ -10280,10 +10271,10 @@
           <p:nvPr/>
         </p:nvPicPr>
         <p:blipFill>
-          <a:blip r:embed="rId4">
+          <a:blip r:embed="rId4" cstate="print">
             <a:extLst>
               <a:ext uri="{28A0092B-C50C-407E-A947-70E740481C1C}">
-                <a14:useLocalDpi xmlns:a14="http://schemas.microsoft.com/office/drawing/2010/main" val="0"/>
+                <a14:useLocalDpi xmlns="" xmlns:a14="http://schemas.microsoft.com/office/drawing/2010/main" val="0"/>
               </a:ext>
             </a:extLst>
           </a:blip>
@@ -10304,7 +10295,7 @@
     </p:spTree>
     <p:extLst>
       <p:ext uri="{BB962C8B-B14F-4D97-AF65-F5344CB8AC3E}">
-        <p14:creationId xmlns:p14="http://schemas.microsoft.com/office/powerpoint/2010/main" val="264393542"/>
+        <p14:creationId xmlns="" xmlns:p14="http://schemas.microsoft.com/office/powerpoint/2010/main" val="264393542"/>
       </p:ext>
     </p:extLst>
   </p:cSld>
@@ -10433,7 +10424,7 @@
             <p:nvPr/>
           </p:nvPicPr>
           <p:blipFill>
-            <a:blip r:embed="rId2"/>
+            <a:blip r:embed="rId2" cstate="print"/>
             <a:stretch>
               <a:fillRect/>
             </a:stretch>
@@ -11043,10 +11034,10 @@
           <p:nvPr/>
         </p:nvPicPr>
         <p:blipFill>
-          <a:blip r:embed="rId3">
+          <a:blip r:embed="rId3" cstate="print">
             <a:extLst>
               <a:ext uri="{28A0092B-C50C-407E-A947-70E740481C1C}">
-                <a14:useLocalDpi xmlns:a14="http://schemas.microsoft.com/office/drawing/2010/main" val="0"/>
+                <a14:useLocalDpi xmlns="" xmlns:a14="http://schemas.microsoft.com/office/drawing/2010/main" val="0"/>
               </a:ext>
             </a:extLst>
           </a:blip>
@@ -11067,7 +11058,7 @@
     </p:spTree>
     <p:extLst>
       <p:ext uri="{BB962C8B-B14F-4D97-AF65-F5344CB8AC3E}">
-        <p14:creationId xmlns:p14="http://schemas.microsoft.com/office/powerpoint/2010/main" val="3239871548"/>
+        <p14:creationId xmlns="" xmlns:p14="http://schemas.microsoft.com/office/powerpoint/2010/main" val="3239871548"/>
       </p:ext>
     </p:extLst>
   </p:cSld>
@@ -11196,7 +11187,7 @@
             <p:nvPr/>
           </p:nvPicPr>
           <p:blipFill>
-            <a:blip r:embed="rId2"/>
+            <a:blip r:embed="rId2" cstate="print"/>
             <a:stretch>
               <a:fillRect/>
             </a:stretch>
@@ -11806,10 +11797,10 @@
           <p:nvPr/>
         </p:nvPicPr>
         <p:blipFill>
-          <a:blip r:embed="rId3">
+          <a:blip r:embed="rId3" cstate="print">
             <a:extLst>
               <a:ext uri="{28A0092B-C50C-407E-A947-70E740481C1C}">
-                <a14:useLocalDpi xmlns:a14="http://schemas.microsoft.com/office/drawing/2010/main" val="0"/>
+                <a14:useLocalDpi xmlns="" xmlns:a14="http://schemas.microsoft.com/office/drawing/2010/main" val="0"/>
               </a:ext>
             </a:extLst>
           </a:blip>
@@ -11830,7 +11821,800 @@
     </p:spTree>
     <p:extLst>
       <p:ext uri="{BB962C8B-B14F-4D97-AF65-F5344CB8AC3E}">
-        <p14:creationId xmlns:p14="http://schemas.microsoft.com/office/powerpoint/2010/main" val="1154986028"/>
+        <p14:creationId xmlns="" xmlns:p14="http://schemas.microsoft.com/office/powerpoint/2010/main" val="1154986028"/>
+      </p:ext>
+    </p:extLst>
+  </p:cSld>
+  <p:clrMapOvr>
+    <a:masterClrMapping/>
+  </p:clrMapOvr>
+  <p:timing>
+    <p:tnLst>
+      <p:par>
+        <p:cTn id="1" dur="indefinite" restart="never" nodeType="tmRoot"/>
+      </p:par>
+    </p:tnLst>
+  </p:timing>
+</p:sld>
+</file>
+
+<file path=ppt/slides/slide9.xml><?xml version="1.0" encoding="utf-8"?>
+<p:sld xmlns:a="http://schemas.openxmlformats.org/drawingml/2006/main" xmlns:r="http://schemas.openxmlformats.org/officeDocument/2006/relationships" xmlns:p="http://schemas.openxmlformats.org/presentationml/2006/main">
+  <p:cSld>
+    <p:spTree>
+      <p:nvGrpSpPr>
+        <p:cNvPr id="1" name=""/>
+        <p:cNvGrpSpPr/>
+        <p:nvPr/>
+      </p:nvGrpSpPr>
+      <p:grpSpPr>
+        <a:xfrm>
+          <a:off x="0" y="0"/>
+          <a:ext cx="0" cy="0"/>
+          <a:chOff x="0" y="0"/>
+          <a:chExt cx="0" cy="0"/>
+        </a:xfrm>
+      </p:grpSpPr>
+      <p:sp>
+        <p:nvSpPr>
+          <p:cNvPr id="8" name="Rectangle 7">
+            <a:extLst>
+              <a:ext uri="{FF2B5EF4-FFF2-40B4-BE49-F238E27FC236}">
+                <a16:creationId xmlns="" xmlns:a16="http://schemas.microsoft.com/office/drawing/2014/main" id="{583FBC17-A62F-4E87-B8DE-0F79DF4336A0}"/>
+              </a:ext>
+            </a:extLst>
+          </p:cNvPr>
+          <p:cNvSpPr/>
+          <p:nvPr/>
+        </p:nvSpPr>
+        <p:spPr>
+          <a:xfrm>
+            <a:off x="3824624" y="5691"/>
+            <a:ext cx="8367376" cy="770637"/>
+          </a:xfrm>
+          <a:prstGeom prst="rect">
+            <a:avLst/>
+          </a:prstGeom>
+          <a:solidFill>
+            <a:schemeClr val="bg1">
+              <a:lumMod val="95000"/>
+            </a:schemeClr>
+          </a:solidFill>
+          <a:ln>
+            <a:noFill/>
+          </a:ln>
+        </p:spPr>
+        <p:style>
+          <a:lnRef idx="2">
+            <a:schemeClr val="accent1">
+              <a:shade val="50000"/>
+            </a:schemeClr>
+          </a:lnRef>
+          <a:fillRef idx="1">
+            <a:schemeClr val="accent1"/>
+          </a:fillRef>
+          <a:effectRef idx="0">
+            <a:schemeClr val="accent1"/>
+          </a:effectRef>
+          <a:fontRef idx="minor">
+            <a:schemeClr val="lt1"/>
+          </a:fontRef>
+        </p:style>
+        <p:txBody>
+          <a:bodyPr rtlCol="0" anchor="ctr"/>
+          <a:lstStyle/>
+          <a:p>
+            <a:endParaRPr lang="en-AU" sz="800" dirty="0">
+              <a:solidFill>
+                <a:schemeClr val="bg1">
+                  <a:lumMod val="50000"/>
+                </a:schemeClr>
+              </a:solidFill>
+              <a:latin typeface="Oxygen" panose="02000503000000000000" pitchFamily="2" charset="0"/>
+            </a:endParaRPr>
+          </a:p>
+        </p:txBody>
+      </p:sp>
+      <p:grpSp>
+        <p:nvGrpSpPr>
+          <p:cNvPr id="2" name="Group 18">
+            <a:extLst>
+              <a:ext uri="{FF2B5EF4-FFF2-40B4-BE49-F238E27FC236}">
+                <a16:creationId xmlns="" xmlns:a16="http://schemas.microsoft.com/office/drawing/2014/main" id="{C587FE1B-2243-4627-BC52-851BDA62444B}"/>
+              </a:ext>
+            </a:extLst>
+          </p:cNvPr>
+          <p:cNvGrpSpPr/>
+          <p:nvPr/>
+        </p:nvGrpSpPr>
+        <p:grpSpPr>
+          <a:xfrm>
+            <a:off x="687804" y="156881"/>
+            <a:ext cx="2471777" cy="1145371"/>
+            <a:chOff x="4600575" y="2600315"/>
+            <a:chExt cx="2990850" cy="1385897"/>
+          </a:xfrm>
+        </p:grpSpPr>
+        <p:pic>
+          <p:nvPicPr>
+            <p:cNvPr id="20" name="Picture 19">
+              <a:extLst>
+                <a:ext uri="{FF2B5EF4-FFF2-40B4-BE49-F238E27FC236}">
+                  <a16:creationId xmlns="" xmlns:a16="http://schemas.microsoft.com/office/drawing/2014/main" id="{0F2E3E05-4A48-4C06-BA49-75E2E366C715}"/>
+                </a:ext>
+              </a:extLst>
+            </p:cNvPr>
+            <p:cNvPicPr>
+              <a:picLocks noChangeAspect="1"/>
+            </p:cNvPicPr>
+            <p:nvPr/>
+          </p:nvPicPr>
+          <p:blipFill>
+            <a:blip r:embed="rId2" cstate="print"/>
+            <a:stretch>
+              <a:fillRect/>
+            </a:stretch>
+          </p:blipFill>
+          <p:spPr>
+            <a:xfrm>
+              <a:off x="4600575" y="2871787"/>
+              <a:ext cx="2990850" cy="1114425"/>
+            </a:xfrm>
+            <a:prstGeom prst="rect">
+              <a:avLst/>
+            </a:prstGeom>
+          </p:spPr>
+        </p:pic>
+        <p:sp>
+          <p:nvSpPr>
+            <p:cNvPr id="21" name="Freeform 22">
+              <a:extLst>
+                <a:ext uri="{FF2B5EF4-FFF2-40B4-BE49-F238E27FC236}">
+                  <a16:creationId xmlns="" xmlns:a16="http://schemas.microsoft.com/office/drawing/2014/main" id="{8413CF68-A7E3-43A0-B613-5438D5382AB1}"/>
+                </a:ext>
+              </a:extLst>
+            </p:cNvPr>
+            <p:cNvSpPr/>
+            <p:nvPr/>
+          </p:nvSpPr>
+          <p:spPr>
+            <a:xfrm>
+              <a:off x="4739363" y="2600315"/>
+              <a:ext cx="971569" cy="971569"/>
+            </a:xfrm>
+            <a:custGeom>
+              <a:avLst/>
+              <a:gdLst>
+                <a:gd name="connsiteX0" fmla="*/ 1080000 w 2160000"/>
+                <a:gd name="connsiteY0" fmla="*/ 0 h 2160000"/>
+                <a:gd name="connsiteX1" fmla="*/ 2154424 w 2160000"/>
+                <a:gd name="connsiteY1" fmla="*/ 969576 h 2160000"/>
+                <a:gd name="connsiteX2" fmla="*/ 2157027 w 2160000"/>
+                <a:gd name="connsiteY2" fmla="*/ 1021127 h 2160000"/>
+                <a:gd name="connsiteX3" fmla="*/ 2159999 w 2160000"/>
+                <a:gd name="connsiteY3" fmla="*/ 1021127 h 2160000"/>
+                <a:gd name="connsiteX4" fmla="*/ 2159999 w 2160000"/>
+                <a:gd name="connsiteY4" fmla="*/ 1079980 h 2160000"/>
+                <a:gd name="connsiteX5" fmla="*/ 2160000 w 2160000"/>
+                <a:gd name="connsiteY5" fmla="*/ 1080000 h 2160000"/>
+                <a:gd name="connsiteX6" fmla="*/ 2159999 w 2160000"/>
+                <a:gd name="connsiteY6" fmla="*/ 1080021 h 2160000"/>
+                <a:gd name="connsiteX7" fmla="*/ 2159999 w 2160000"/>
+                <a:gd name="connsiteY7" fmla="*/ 1716639 h 2160000"/>
+                <a:gd name="connsiteX8" fmla="*/ 2157838 w 2160000"/>
+                <a:gd name="connsiteY8" fmla="*/ 1716639 h 2160000"/>
+                <a:gd name="connsiteX9" fmla="*/ 2160000 w 2160000"/>
+                <a:gd name="connsiteY9" fmla="*/ 1738544 h 2160000"/>
+                <a:gd name="connsiteX10" fmla="*/ 1891921 w 2160000"/>
+                <a:gd name="connsiteY10" fmla="*/ 2012333 h 2160000"/>
+                <a:gd name="connsiteX11" fmla="*/ 1623842 w 2160000"/>
+                <a:gd name="connsiteY11" fmla="*/ 1738544 h 2160000"/>
+                <a:gd name="connsiteX12" fmla="*/ 1626005 w 2160000"/>
+                <a:gd name="connsiteY12" fmla="*/ 1716639 h 2160000"/>
+                <a:gd name="connsiteX13" fmla="*/ 1620298 w 2160000"/>
+                <a:gd name="connsiteY13" fmla="*/ 1716639 h 2160000"/>
+                <a:gd name="connsiteX14" fmla="*/ 1620298 w 2160000"/>
+                <a:gd name="connsiteY14" fmla="*/ 1090950 h 2160000"/>
+                <a:gd name="connsiteX15" fmla="*/ 1618898 w 2160000"/>
+                <a:gd name="connsiteY15" fmla="*/ 1090937 h 2160000"/>
+                <a:gd name="connsiteX16" fmla="*/ 1620000 w 2160000"/>
+                <a:gd name="connsiteY16" fmla="*/ 1080000 h 2160000"/>
+                <a:gd name="connsiteX17" fmla="*/ 1080000 w 2160000"/>
+                <a:gd name="connsiteY17" fmla="*/ 540000 h 2160000"/>
+                <a:gd name="connsiteX18" fmla="*/ 540000 w 2160000"/>
+                <a:gd name="connsiteY18" fmla="*/ 1080000 h 2160000"/>
+                <a:gd name="connsiteX19" fmla="*/ 1080000 w 2160000"/>
+                <a:gd name="connsiteY19" fmla="*/ 1620000 h 2160000"/>
+                <a:gd name="connsiteX20" fmla="*/ 1172144 w 2160000"/>
+                <a:gd name="connsiteY20" fmla="*/ 1610711 h 2160000"/>
+                <a:gd name="connsiteX21" fmla="*/ 1192722 w 2160000"/>
+                <a:gd name="connsiteY21" fmla="*/ 1599542 h 2160000"/>
+                <a:gd name="connsiteX22" fmla="*/ 1205334 w 2160000"/>
+                <a:gd name="connsiteY22" fmla="*/ 1595627 h 2160000"/>
+                <a:gd name="connsiteX23" fmla="*/ 1218649 w 2160000"/>
+                <a:gd name="connsiteY23" fmla="*/ 1594482 h 2160000"/>
+                <a:gd name="connsiteX24" fmla="*/ 1273176 w 2160000"/>
+                <a:gd name="connsiteY24" fmla="*/ 1581875 h 2160000"/>
+                <a:gd name="connsiteX25" fmla="*/ 1277433 w 2160000"/>
+                <a:gd name="connsiteY25" fmla="*/ 1580379 h 2160000"/>
+                <a:gd name="connsiteX26" fmla="*/ 1297818 w 2160000"/>
+                <a:gd name="connsiteY26" fmla="*/ 1578324 h 2160000"/>
+                <a:gd name="connsiteX27" fmla="*/ 1567818 w 2160000"/>
+                <a:gd name="connsiteY27" fmla="*/ 1848324 h 2160000"/>
+                <a:gd name="connsiteX28" fmla="*/ 1469563 w 2160000"/>
+                <a:gd name="connsiteY28" fmla="*/ 2056669 h 2160000"/>
+                <a:gd name="connsiteX29" fmla="*/ 1412948 w 2160000"/>
+                <a:gd name="connsiteY29" fmla="*/ 2091019 h 2160000"/>
+                <a:gd name="connsiteX30" fmla="*/ 1398272 w 2160000"/>
+                <a:gd name="connsiteY30" fmla="*/ 2101498 h 2160000"/>
+                <a:gd name="connsiteX31" fmla="*/ 1374464 w 2160000"/>
+                <a:gd name="connsiteY31" fmla="*/ 2110955 h 2160000"/>
+                <a:gd name="connsiteX32" fmla="*/ 1376211 w 2160000"/>
+                <a:gd name="connsiteY32" fmla="*/ 2117860 h 2160000"/>
+                <a:gd name="connsiteX33" fmla="*/ 1321962 w 2160000"/>
+                <a:gd name="connsiteY33" fmla="*/ 2131809 h 2160000"/>
+                <a:gd name="connsiteX34" fmla="*/ 1306247 w 2160000"/>
+                <a:gd name="connsiteY34" fmla="*/ 2138051 h 2160000"/>
+                <a:gd name="connsiteX35" fmla="*/ 1267530 w 2160000"/>
+                <a:gd name="connsiteY35" fmla="*/ 2142656 h 2160000"/>
+                <a:gd name="connsiteX36" fmla="*/ 1190424 w 2160000"/>
+                <a:gd name="connsiteY36" fmla="*/ 2154424 h 2160000"/>
+                <a:gd name="connsiteX37" fmla="*/ 1080000 w 2160000"/>
+                <a:gd name="connsiteY37" fmla="*/ 2160000 h 2160000"/>
+                <a:gd name="connsiteX38" fmla="*/ 0 w 2160000"/>
+                <a:gd name="connsiteY38" fmla="*/ 1080000 h 2160000"/>
+                <a:gd name="connsiteX39" fmla="*/ 1080000 w 2160000"/>
+                <a:gd name="connsiteY39" fmla="*/ 0 h 2160000"/>
+              </a:gdLst>
+              <a:ahLst/>
+              <a:cxnLst>
+                <a:cxn ang="0">
+                  <a:pos x="connsiteX0" y="connsiteY0"/>
+                </a:cxn>
+                <a:cxn ang="0">
+                  <a:pos x="connsiteX1" y="connsiteY1"/>
+                </a:cxn>
+                <a:cxn ang="0">
+                  <a:pos x="connsiteX2" y="connsiteY2"/>
+                </a:cxn>
+                <a:cxn ang="0">
+                  <a:pos x="connsiteX3" y="connsiteY3"/>
+                </a:cxn>
+                <a:cxn ang="0">
+                  <a:pos x="connsiteX4" y="connsiteY4"/>
+                </a:cxn>
+                <a:cxn ang="0">
+                  <a:pos x="connsiteX5" y="connsiteY5"/>
+                </a:cxn>
+                <a:cxn ang="0">
+                  <a:pos x="connsiteX6" y="connsiteY6"/>
+                </a:cxn>
+                <a:cxn ang="0">
+                  <a:pos x="connsiteX7" y="connsiteY7"/>
+                </a:cxn>
+                <a:cxn ang="0">
+                  <a:pos x="connsiteX8" y="connsiteY8"/>
+                </a:cxn>
+                <a:cxn ang="0">
+                  <a:pos x="connsiteX9" y="connsiteY9"/>
+                </a:cxn>
+                <a:cxn ang="0">
+                  <a:pos x="connsiteX10" y="connsiteY10"/>
+                </a:cxn>
+                <a:cxn ang="0">
+                  <a:pos x="connsiteX11" y="connsiteY11"/>
+                </a:cxn>
+                <a:cxn ang="0">
+                  <a:pos x="connsiteX12" y="connsiteY12"/>
+                </a:cxn>
+                <a:cxn ang="0">
+                  <a:pos x="connsiteX13" y="connsiteY13"/>
+                </a:cxn>
+                <a:cxn ang="0">
+                  <a:pos x="connsiteX14" y="connsiteY14"/>
+                </a:cxn>
+                <a:cxn ang="0">
+                  <a:pos x="connsiteX15" y="connsiteY15"/>
+                </a:cxn>
+                <a:cxn ang="0">
+                  <a:pos x="connsiteX16" y="connsiteY16"/>
+                </a:cxn>
+                <a:cxn ang="0">
+                  <a:pos x="connsiteX17" y="connsiteY17"/>
+                </a:cxn>
+                <a:cxn ang="0">
+                  <a:pos x="connsiteX18" y="connsiteY18"/>
+                </a:cxn>
+                <a:cxn ang="0">
+                  <a:pos x="connsiteX19" y="connsiteY19"/>
+                </a:cxn>
+                <a:cxn ang="0">
+                  <a:pos x="connsiteX20" y="connsiteY20"/>
+                </a:cxn>
+                <a:cxn ang="0">
+                  <a:pos x="connsiteX21" y="connsiteY21"/>
+                </a:cxn>
+                <a:cxn ang="0">
+                  <a:pos x="connsiteX22" y="connsiteY22"/>
+                </a:cxn>
+                <a:cxn ang="0">
+                  <a:pos x="connsiteX23" y="connsiteY23"/>
+                </a:cxn>
+                <a:cxn ang="0">
+                  <a:pos x="connsiteX24" y="connsiteY24"/>
+                </a:cxn>
+                <a:cxn ang="0">
+                  <a:pos x="connsiteX25" y="connsiteY25"/>
+                </a:cxn>
+                <a:cxn ang="0">
+                  <a:pos x="connsiteX26" y="connsiteY26"/>
+                </a:cxn>
+                <a:cxn ang="0">
+                  <a:pos x="connsiteX27" y="connsiteY27"/>
+                </a:cxn>
+                <a:cxn ang="0">
+                  <a:pos x="connsiteX28" y="connsiteY28"/>
+                </a:cxn>
+                <a:cxn ang="0">
+                  <a:pos x="connsiteX29" y="connsiteY29"/>
+                </a:cxn>
+                <a:cxn ang="0">
+                  <a:pos x="connsiteX30" y="connsiteY30"/>
+                </a:cxn>
+                <a:cxn ang="0">
+                  <a:pos x="connsiteX31" y="connsiteY31"/>
+                </a:cxn>
+                <a:cxn ang="0">
+                  <a:pos x="connsiteX32" y="connsiteY32"/>
+                </a:cxn>
+                <a:cxn ang="0">
+                  <a:pos x="connsiteX33" y="connsiteY33"/>
+                </a:cxn>
+                <a:cxn ang="0">
+                  <a:pos x="connsiteX34" y="connsiteY34"/>
+                </a:cxn>
+                <a:cxn ang="0">
+                  <a:pos x="connsiteX35" y="connsiteY35"/>
+                </a:cxn>
+                <a:cxn ang="0">
+                  <a:pos x="connsiteX36" y="connsiteY36"/>
+                </a:cxn>
+                <a:cxn ang="0">
+                  <a:pos x="connsiteX37" y="connsiteY37"/>
+                </a:cxn>
+                <a:cxn ang="0">
+                  <a:pos x="connsiteX38" y="connsiteY38"/>
+                </a:cxn>
+                <a:cxn ang="0">
+                  <a:pos x="connsiteX39" y="connsiteY39"/>
+                </a:cxn>
+              </a:cxnLst>
+              <a:rect l="l" t="t" r="r" b="b"/>
+              <a:pathLst>
+                <a:path w="2160000" h="2160000">
+                  <a:moveTo>
+                    <a:pt x="1080000" y="0"/>
+                  </a:moveTo>
+                  <a:cubicBezTo>
+                    <a:pt x="1639189" y="0"/>
+                    <a:pt x="2099117" y="424979"/>
+                    <a:pt x="2154424" y="969576"/>
+                  </a:cubicBezTo>
+                  <a:lnTo>
+                    <a:pt x="2157027" y="1021127"/>
+                  </a:lnTo>
+                  <a:lnTo>
+                    <a:pt x="2159999" y="1021127"/>
+                  </a:lnTo>
+                  <a:lnTo>
+                    <a:pt x="2159999" y="1079980"/>
+                  </a:lnTo>
+                  <a:lnTo>
+                    <a:pt x="2160000" y="1080000"/>
+                  </a:lnTo>
+                  <a:lnTo>
+                    <a:pt x="2159999" y="1080021"/>
+                  </a:lnTo>
+                  <a:lnTo>
+                    <a:pt x="2159999" y="1716639"/>
+                  </a:lnTo>
+                  <a:lnTo>
+                    <a:pt x="2157838" y="1716639"/>
+                  </a:lnTo>
+                  <a:lnTo>
+                    <a:pt x="2160000" y="1738544"/>
+                  </a:lnTo>
+                  <a:cubicBezTo>
+                    <a:pt x="2160000" y="1889753"/>
+                    <a:pt x="2039977" y="2012333"/>
+                    <a:pt x="1891921" y="2012333"/>
+                  </a:cubicBezTo>
+                  <a:cubicBezTo>
+                    <a:pt x="1743865" y="2012333"/>
+                    <a:pt x="1623842" y="1889753"/>
+                    <a:pt x="1623842" y="1738544"/>
+                  </a:cubicBezTo>
+                  <a:lnTo>
+                    <a:pt x="1626005" y="1716639"/>
+                  </a:lnTo>
+                  <a:lnTo>
+                    <a:pt x="1620298" y="1716639"/>
+                  </a:lnTo>
+                  <a:lnTo>
+                    <a:pt x="1620298" y="1090950"/>
+                  </a:lnTo>
+                  <a:lnTo>
+                    <a:pt x="1618898" y="1090937"/>
+                  </a:lnTo>
+                  <a:lnTo>
+                    <a:pt x="1620000" y="1080000"/>
+                  </a:lnTo>
+                  <a:cubicBezTo>
+                    <a:pt x="1620000" y="781766"/>
+                    <a:pt x="1378234" y="540000"/>
+                    <a:pt x="1080000" y="540000"/>
+                  </a:cubicBezTo>
+                  <a:cubicBezTo>
+                    <a:pt x="781766" y="540000"/>
+                    <a:pt x="540000" y="781766"/>
+                    <a:pt x="540000" y="1080000"/>
+                  </a:cubicBezTo>
+                  <a:cubicBezTo>
+                    <a:pt x="540000" y="1378234"/>
+                    <a:pt x="781766" y="1620000"/>
+                    <a:pt x="1080000" y="1620000"/>
+                  </a:cubicBezTo>
+                  <a:lnTo>
+                    <a:pt x="1172144" y="1610711"/>
+                  </a:lnTo>
+                  <a:lnTo>
+                    <a:pt x="1192722" y="1599542"/>
+                  </a:lnTo>
+                  <a:lnTo>
+                    <a:pt x="1205334" y="1595627"/>
+                  </a:lnTo>
+                  <a:lnTo>
+                    <a:pt x="1218649" y="1594482"/>
+                  </a:lnTo>
+                  <a:cubicBezTo>
+                    <a:pt x="1237851" y="1591023"/>
+                    <a:pt x="1256099" y="1586790"/>
+                    <a:pt x="1273176" y="1581875"/>
+                  </a:cubicBezTo>
+                  <a:lnTo>
+                    <a:pt x="1277433" y="1580379"/>
+                  </a:lnTo>
+                  <a:lnTo>
+                    <a:pt x="1297818" y="1578324"/>
+                  </a:lnTo>
+                  <a:cubicBezTo>
+                    <a:pt x="1446935" y="1578324"/>
+                    <a:pt x="1567818" y="1699207"/>
+                    <a:pt x="1567818" y="1848324"/>
+                  </a:cubicBezTo>
+                  <a:cubicBezTo>
+                    <a:pt x="1567818" y="1932202"/>
+                    <a:pt x="1529570" y="2007147"/>
+                    <a:pt x="1469563" y="2056669"/>
+                  </a:cubicBezTo>
+                  <a:lnTo>
+                    <a:pt x="1412948" y="2091019"/>
+                  </a:lnTo>
+                  <a:lnTo>
+                    <a:pt x="1398272" y="2101498"/>
+                  </a:lnTo>
+                  <a:lnTo>
+                    <a:pt x="1374464" y="2110955"/>
+                  </a:lnTo>
+                  <a:lnTo>
+                    <a:pt x="1376211" y="2117860"/>
+                  </a:lnTo>
+                  <a:lnTo>
+                    <a:pt x="1321962" y="2131809"/>
+                  </a:lnTo>
+                  <a:lnTo>
+                    <a:pt x="1306247" y="2138051"/>
+                  </a:lnTo>
+                  <a:lnTo>
+                    <a:pt x="1267530" y="2142656"/>
+                  </a:lnTo>
+                  <a:lnTo>
+                    <a:pt x="1190424" y="2154424"/>
+                  </a:lnTo>
+                  <a:cubicBezTo>
+                    <a:pt x="1154118" y="2158111"/>
+                    <a:pt x="1117280" y="2160000"/>
+                    <a:pt x="1080000" y="2160000"/>
+                  </a:cubicBezTo>
+                  <a:cubicBezTo>
+                    <a:pt x="483532" y="2160000"/>
+                    <a:pt x="0" y="1676468"/>
+                    <a:pt x="0" y="1080000"/>
+                  </a:cubicBezTo>
+                  <a:cubicBezTo>
+                    <a:pt x="0" y="483532"/>
+                    <a:pt x="483532" y="0"/>
+                    <a:pt x="1080000" y="0"/>
+                  </a:cubicBezTo>
+                  <a:close/>
+                </a:path>
+              </a:pathLst>
+            </a:custGeom>
+            <a:solidFill>
+              <a:srgbClr val="FF8C52"/>
+            </a:solidFill>
+            <a:ln>
+              <a:solidFill>
+                <a:srgbClr val="FF8C52"/>
+              </a:solidFill>
+            </a:ln>
+          </p:spPr>
+          <p:style>
+            <a:lnRef idx="2">
+              <a:schemeClr val="accent1">
+                <a:shade val="50000"/>
+              </a:schemeClr>
+            </a:lnRef>
+            <a:fillRef idx="1">
+              <a:schemeClr val="accent1"/>
+            </a:fillRef>
+            <a:effectRef idx="0">
+              <a:schemeClr val="accent1"/>
+            </a:effectRef>
+            <a:fontRef idx="minor">
+              <a:schemeClr val="lt1"/>
+            </a:fontRef>
+          </p:style>
+          <p:txBody>
+            <a:bodyPr rtlCol="0" anchor="ctr"/>
+            <a:lstStyle/>
+            <a:p>
+              <a:pPr algn="ctr"/>
+              <a:endParaRPr lang="en-AU" dirty="0">
+                <a:latin typeface="Oxygen" panose="02000503000000000000" pitchFamily="2" charset="0"/>
+              </a:endParaRPr>
+            </a:p>
+          </p:txBody>
+        </p:sp>
+      </p:grpSp>
+      <p:sp>
+        <p:nvSpPr>
+          <p:cNvPr id="22" name="TextBox 21">
+            <a:extLst>
+              <a:ext uri="{FF2B5EF4-FFF2-40B4-BE49-F238E27FC236}">
+                <a16:creationId xmlns="" xmlns:a16="http://schemas.microsoft.com/office/drawing/2014/main" id="{97653B96-F2E2-406B-A513-F42319FDB50F}"/>
+              </a:ext>
+            </a:extLst>
+          </p:cNvPr>
+          <p:cNvSpPr txBox="1"/>
+          <p:nvPr/>
+        </p:nvSpPr>
+        <p:spPr>
+          <a:xfrm>
+            <a:off x="7235978" y="178480"/>
+            <a:ext cx="2250937" cy="369332"/>
+          </a:xfrm>
+          <a:prstGeom prst="rect">
+            <a:avLst/>
+          </a:prstGeom>
+          <a:noFill/>
+        </p:spPr>
+        <p:txBody>
+          <a:bodyPr wrap="none" rtlCol="0">
+            <a:spAutoFit/>
+          </a:bodyPr>
+          <a:lstStyle/>
+          <a:p>
+            <a:r>
+              <a:rPr lang="en-AU" b="1" dirty="0" smtClean="0">
+                <a:solidFill>
+                  <a:schemeClr val="bg2">
+                    <a:lumMod val="75000"/>
+                  </a:schemeClr>
+                </a:solidFill>
+                <a:latin typeface="Oxygen" panose="02000503000000000000" pitchFamily="2" charset="0"/>
+                <a:cs typeface="Arial" panose="020B0604020202020204" pitchFamily="34" charset="0"/>
+              </a:rPr>
+              <a:t> Java </a:t>
+            </a:r>
+            <a:r>
+              <a:rPr lang="en-AU" b="1" dirty="0" err="1" smtClean="0">
+                <a:solidFill>
+                  <a:schemeClr val="bg2">
+                    <a:lumMod val="75000"/>
+                  </a:schemeClr>
+                </a:solidFill>
+                <a:latin typeface="Oxygen" panose="02000503000000000000" pitchFamily="2" charset="0"/>
+                <a:cs typeface="Arial" panose="020B0604020202020204" pitchFamily="34" charset="0"/>
+              </a:rPr>
+              <a:t>Input/Output</a:t>
+            </a:r>
+            <a:endParaRPr lang="en-AU" b="1" dirty="0">
+              <a:solidFill>
+                <a:schemeClr val="bg2">
+                  <a:lumMod val="75000"/>
+                </a:schemeClr>
+              </a:solidFill>
+              <a:latin typeface="Oxygen" panose="02000503000000000000" pitchFamily="2" charset="0"/>
+              <a:cs typeface="Arial" panose="020B0604020202020204" pitchFamily="34" charset="0"/>
+            </a:endParaRPr>
+          </a:p>
+        </p:txBody>
+      </p:sp>
+      <p:sp>
+        <p:nvSpPr>
+          <p:cNvPr id="33" name="Rectangle 32">
+            <a:extLst>
+              <a:ext uri="{FF2B5EF4-FFF2-40B4-BE49-F238E27FC236}">
+                <a16:creationId xmlns="" xmlns:a16="http://schemas.microsoft.com/office/drawing/2014/main" id="{E02B0EB1-C543-469A-90DE-9FA0F478E35F}"/>
+              </a:ext>
+            </a:extLst>
+          </p:cNvPr>
+          <p:cNvSpPr/>
+          <p:nvPr/>
+        </p:nvSpPr>
+        <p:spPr>
+          <a:xfrm>
+            <a:off x="0" y="6543676"/>
+            <a:ext cx="12192000" cy="314325"/>
+          </a:xfrm>
+          <a:prstGeom prst="rect">
+            <a:avLst/>
+          </a:prstGeom>
+          <a:solidFill>
+            <a:schemeClr val="bg1">
+              <a:lumMod val="95000"/>
+            </a:schemeClr>
+          </a:solidFill>
+          <a:ln>
+            <a:noFill/>
+          </a:ln>
+        </p:spPr>
+        <p:style>
+          <a:lnRef idx="2">
+            <a:schemeClr val="accent1">
+              <a:shade val="50000"/>
+            </a:schemeClr>
+          </a:lnRef>
+          <a:fillRef idx="1">
+            <a:schemeClr val="accent1"/>
+          </a:fillRef>
+          <a:effectRef idx="0">
+            <a:schemeClr val="accent1"/>
+          </a:effectRef>
+          <a:fontRef idx="minor">
+            <a:schemeClr val="lt1"/>
+          </a:fontRef>
+        </p:style>
+        <p:txBody>
+          <a:bodyPr rtlCol="0" anchor="ctr"/>
+          <a:lstStyle/>
+          <a:p>
+            <a:r>
+              <a:rPr lang="en-US" sz="800" dirty="0">
+                <a:solidFill>
+                  <a:schemeClr val="bg1">
+                    <a:lumMod val="50000"/>
+                  </a:schemeClr>
+                </a:solidFill>
+                <a:latin typeface="Oxygen" panose="02000503000000000000" pitchFamily="2" charset="0"/>
+              </a:rPr>
+              <a:t>                                                                                                                            </a:t>
+            </a:r>
+            <a:r>
+              <a:rPr lang="en-US" sz="800" b="1" dirty="0">
+                <a:solidFill>
+                  <a:schemeClr val="bg1">
+                    <a:lumMod val="50000"/>
+                  </a:schemeClr>
+                </a:solidFill>
+                <a:latin typeface="Oxygen" panose="02000503000000000000" pitchFamily="2" charset="0"/>
+              </a:rPr>
+              <a:t> </a:t>
+            </a:r>
+            <a:r>
+              <a:rPr lang="en-US" sz="800" b="1" dirty="0">
+                <a:solidFill>
+                  <a:srgbClr val="FF8C52"/>
+                </a:solidFill>
+                <a:latin typeface="Oxygen" panose="02000503000000000000" pitchFamily="2" charset="0"/>
+              </a:rPr>
+              <a:t>CONCEPTION      &gt;&gt;      PRACTICE        &gt;&gt;        CONFIDENCE      &gt;&gt;       HIGHEST GRADES</a:t>
+            </a:r>
+            <a:r>
+              <a:rPr lang="en-US" sz="800" dirty="0">
+                <a:solidFill>
+                  <a:srgbClr val="FF8C52"/>
+                </a:solidFill>
+                <a:latin typeface="Oxygen" panose="02000503000000000000" pitchFamily="2" charset="0"/>
+              </a:rPr>
+              <a:t>                                                                             </a:t>
+            </a:r>
+            <a:r>
+              <a:rPr lang="en-US" sz="700" dirty="0">
+                <a:solidFill>
+                  <a:schemeClr val="bg1">
+                    <a:lumMod val="50000"/>
+                  </a:schemeClr>
+                </a:solidFill>
+                <a:latin typeface="Oxygen" panose="02000503000000000000" pitchFamily="2" charset="0"/>
+              </a:rPr>
+              <a:t>© </a:t>
+            </a:r>
+            <a:r>
+              <a:rPr lang="pt-BR" sz="700" dirty="0">
+                <a:solidFill>
+                  <a:schemeClr val="bg1">
+                    <a:lumMod val="50000"/>
+                  </a:schemeClr>
+                </a:solidFill>
+                <a:latin typeface="Oxygen" panose="02000503000000000000" pitchFamily="2" charset="0"/>
+              </a:rPr>
+              <a:t>PROTECTED ANODIAM 2023     ||     PRIVATE &amp; CONFIDENTIAL</a:t>
+            </a:r>
+            <a:endParaRPr lang="en-AU" sz="700" dirty="0">
+              <a:solidFill>
+                <a:schemeClr val="bg1">
+                  <a:lumMod val="50000"/>
+                </a:schemeClr>
+              </a:solidFill>
+              <a:latin typeface="Oxygen" panose="02000503000000000000" pitchFamily="2" charset="0"/>
+            </a:endParaRPr>
+          </a:p>
+        </p:txBody>
+      </p:sp>
+      <p:pic>
+        <p:nvPicPr>
+          <p:cNvPr id="9" name="Picture 8" descr="Java-Input-Output-Stream.jpg"/>
+          <p:cNvPicPr>
+            <a:picLocks noChangeAspect="1"/>
+          </p:cNvPicPr>
+          <p:nvPr/>
+        </p:nvPicPr>
+        <p:blipFill>
+          <a:blip r:embed="rId3" cstate="print"/>
+          <a:stretch>
+            <a:fillRect/>
+          </a:stretch>
+        </p:blipFill>
+        <p:spPr>
+          <a:xfrm>
+            <a:off x="3893484" y="934291"/>
+            <a:ext cx="7581340" cy="1290299"/>
+          </a:xfrm>
+          <a:prstGeom prst="rect">
+            <a:avLst/>
+          </a:prstGeom>
+        </p:spPr>
+      </p:pic>
+      <p:pic>
+        <p:nvPicPr>
+          <p:cNvPr id="10" name="Picture 9" descr="Java-stream-classification-filetype2.png"/>
+          <p:cNvPicPr>
+            <a:picLocks noChangeAspect="1"/>
+          </p:cNvPicPr>
+          <p:nvPr/>
+        </p:nvPicPr>
+        <p:blipFill>
+          <a:blip r:embed="rId4" cstate="print"/>
+          <a:stretch>
+            <a:fillRect/>
+          </a:stretch>
+        </p:blipFill>
+        <p:spPr>
+          <a:xfrm>
+            <a:off x="2034988" y="2124635"/>
+            <a:ext cx="9157218" cy="4320987"/>
+          </a:xfrm>
+          <a:prstGeom prst="rect">
+            <a:avLst/>
+          </a:prstGeom>
+        </p:spPr>
+      </p:pic>
+    </p:spTree>
+    <p:extLst>
+      <p:ext uri="{BB962C8B-B14F-4D97-AF65-F5344CB8AC3E}">
+        <p14:creationId xmlns="" xmlns:p14="http://schemas.microsoft.com/office/powerpoint/2010/main" val="1154986028"/>
       </p:ext>
     </p:extLst>
   </p:cSld>
@@ -11890,7 +12674,7 @@
     </a:clrScheme>
     <a:fontScheme name="Office">
       <a:majorFont>
-        <a:latin typeface="Calibri Light" panose="020F0302020204030204"/>
+        <a:latin typeface="Calibri Light"/>
         <a:ea typeface=""/>
         <a:cs typeface=""/>
         <a:font script="Jpan" typeface="游ゴシック Light"/>
@@ -11942,7 +12726,7 @@
         <a:font script="Tfng" typeface="Ebrima"/>
       </a:majorFont>
       <a:minorFont>
-        <a:latin typeface="Calibri" panose="020F0502020204030204"/>
+        <a:latin typeface="Calibri"/>
         <a:ea typeface=""/>
         <a:cs typeface=""/>
         <a:font script="Jpan" typeface="游ゴシック"/>
@@ -12136,7 +12920,7 @@
   <a:extraClrSchemeLst/>
   <a:extLst>
     <a:ext uri="{05A4C25C-085E-4340-85A3-A5531E510DB2}">
-      <thm15:themeFamily xmlns:thm15="http://schemas.microsoft.com/office/thememl/2012/main" name="Office Theme" id="{62F939B6-93AF-4DB8-9C6B-D6C7DFDC589F}" vid="{4A3C46E8-61CC-4603-A589-7422A47A8E4A}"/>
+      <thm15:themeFamily xmlns="" xmlns:thm15="http://schemas.microsoft.com/office/thememl/2012/main" name="Office Theme" id="{62F939B6-93AF-4DB8-9C6B-D6C7DFDC589F}" vid="{4A3C46E8-61CC-4603-A589-7422A47A8E4A}"/>
     </a:ext>
   </a:extLst>
 </a:theme>

</xml_diff>